<commit_message>
vault backup: 2024-04-22 14:18:21
</commit_message>
<xml_diff>
--- a/git-pres/git-pres.pptx
+++ b/git-pres/git-pres.pptx
@@ -4576,7 +4576,7 @@
             </a:pPr>
             <a:r>
               <a:rPr/>
-              <a:t>Tagged Commits cont.5</a:t>
+              <a:t>Tagged Commits cont.</a:t>
             </a:r>
           </a:p>
         </p:txBody>
@@ -5073,12 +5073,24 @@
           <a:bodyPr/>
           <a:lstStyle/>
           <a:p>
-            <a:pPr lvl="0" indent="0" marL="0">
-              <a:buNone/>
-            </a:pPr>
-            <a:r>
-              <a:rPr/>
-              <a:t>git is a command-line, snapshot-based versioning tool - created by Linux Torvalds to manage massive open source projects. i.e. the Linux kernel - used widely across the globe, for personal and enterprise use</a:t>
+            <a:pPr lvl="0"/>
+            <a:r>
+              <a:rPr/>
+              <a:t>git is a command-line, snapshot-based versioning tool</a:t>
+            </a:r>
+          </a:p>
+          <a:p>
+            <a:pPr lvl="0"/>
+            <a:r>
+              <a:rPr/>
+              <a:t>created by Linux Torvalds to manage massive open source projects. i.e. the Linux kernel</a:t>
+            </a:r>
+          </a:p>
+          <a:p>
+            <a:pPr lvl="0"/>
+            <a:r>
+              <a:rPr/>
+              <a:t>used widely across the globe, for personal and enterprise use</a:t>
             </a:r>
           </a:p>
         </p:txBody>

</xml_diff>

<commit_message>
vault backup: 2024-04-22 14:48:08
</commit_message>
<xml_diff>
--- a/git-pres/git-pres.pptx
+++ b/git-pres/git-pres.pptx
@@ -30,13 +30,13 @@
     <p:sldId id="278" r:id="rId24"/>
     <p:sldId id="279" r:id="rId25"/>
   </p:sldIdLst>
-  <p:sldSz cx="9144000" cy="5143500" type="screen16x9"/>
+  <p:sldSz cx="12192000" cy="6858000"/>
   <p:notesSz cx="6858000" cy="9144000"/>
   <p:defaultTextStyle>
     <a:defPPr>
       <a:defRPr lang="en-US"/>
     </a:defPPr>
-    <a:lvl1pPr algn="l" defTabSz="457200" eaLnBrk="1" hangingPunct="1" latinLnBrk="0" marL="0" rtl="0">
+    <a:lvl1pPr algn="l" defTabSz="914400" eaLnBrk="1" hangingPunct="1" latinLnBrk="0" marL="0" rtl="0">
       <a:defRPr kern="1200" sz="1800">
         <a:solidFill>
           <a:schemeClr val="tx1"/>
@@ -46,7 +46,7 @@
         <a:cs typeface="+mn-cs"/>
       </a:defRPr>
     </a:lvl1pPr>
-    <a:lvl2pPr algn="l" defTabSz="457200" eaLnBrk="1" hangingPunct="1" latinLnBrk="0" marL="457200" rtl="0">
+    <a:lvl2pPr algn="l" defTabSz="914400" eaLnBrk="1" hangingPunct="1" latinLnBrk="0" marL="457200" rtl="0">
       <a:defRPr kern="1200" sz="1800">
         <a:solidFill>
           <a:schemeClr val="tx1"/>
@@ -56,7 +56,7 @@
         <a:cs typeface="+mn-cs"/>
       </a:defRPr>
     </a:lvl2pPr>
-    <a:lvl3pPr algn="l" defTabSz="457200" eaLnBrk="1" hangingPunct="1" latinLnBrk="0" marL="914400" rtl="0">
+    <a:lvl3pPr algn="l" defTabSz="914400" eaLnBrk="1" hangingPunct="1" latinLnBrk="0" marL="914400" rtl="0">
       <a:defRPr kern="1200" sz="1800">
         <a:solidFill>
           <a:schemeClr val="tx1"/>
@@ -66,7 +66,7 @@
         <a:cs typeface="+mn-cs"/>
       </a:defRPr>
     </a:lvl3pPr>
-    <a:lvl4pPr algn="l" defTabSz="457200" eaLnBrk="1" hangingPunct="1" latinLnBrk="0" marL="1371600" rtl="0">
+    <a:lvl4pPr algn="l" defTabSz="914400" eaLnBrk="1" hangingPunct="1" latinLnBrk="0" marL="1371600" rtl="0">
       <a:defRPr kern="1200" sz="1800">
         <a:solidFill>
           <a:schemeClr val="tx1"/>
@@ -76,7 +76,7 @@
         <a:cs typeface="+mn-cs"/>
       </a:defRPr>
     </a:lvl4pPr>
-    <a:lvl5pPr algn="l" defTabSz="457200" eaLnBrk="1" hangingPunct="1" latinLnBrk="0" marL="1828800" rtl="0">
+    <a:lvl5pPr algn="l" defTabSz="914400" eaLnBrk="1" hangingPunct="1" latinLnBrk="0" marL="1828800" rtl="0">
       <a:defRPr kern="1200" sz="1800">
         <a:solidFill>
           <a:schemeClr val="tx1"/>
@@ -86,7 +86,7 @@
         <a:cs typeface="+mn-cs"/>
       </a:defRPr>
     </a:lvl5pPr>
-    <a:lvl6pPr algn="l" defTabSz="457200" eaLnBrk="1" hangingPunct="1" latinLnBrk="0" marL="2286000" rtl="0">
+    <a:lvl6pPr algn="l" defTabSz="914400" eaLnBrk="1" hangingPunct="1" latinLnBrk="0" marL="2286000" rtl="0">
       <a:defRPr kern="1200" sz="1800">
         <a:solidFill>
           <a:schemeClr val="tx1"/>
@@ -96,7 +96,7 @@
         <a:cs typeface="+mn-cs"/>
       </a:defRPr>
     </a:lvl6pPr>
-    <a:lvl7pPr algn="l" defTabSz="457200" eaLnBrk="1" hangingPunct="1" latinLnBrk="0" marL="2743200" rtl="0">
+    <a:lvl7pPr algn="l" defTabSz="914400" eaLnBrk="1" hangingPunct="1" latinLnBrk="0" marL="2743200" rtl="0">
       <a:defRPr kern="1200" sz="1800">
         <a:solidFill>
           <a:schemeClr val="tx1"/>
@@ -106,7 +106,7 @@
         <a:cs typeface="+mn-cs"/>
       </a:defRPr>
     </a:lvl7pPr>
-    <a:lvl8pPr algn="l" defTabSz="457200" eaLnBrk="1" hangingPunct="1" latinLnBrk="0" marL="3200400" rtl="0">
+    <a:lvl8pPr algn="l" defTabSz="914400" eaLnBrk="1" hangingPunct="1" latinLnBrk="0" marL="3200400" rtl="0">
       <a:defRPr kern="1200" sz="1800">
         <a:solidFill>
           <a:schemeClr val="tx1"/>
@@ -116,7 +116,7 @@
         <a:cs typeface="+mn-cs"/>
       </a:defRPr>
     </a:lvl8pPr>
-    <a:lvl9pPr algn="l" defTabSz="457200" eaLnBrk="1" hangingPunct="1" latinLnBrk="0" marL="3657600" rtl="0">
+    <a:lvl9pPr algn="l" defTabSz="914400" eaLnBrk="1" hangingPunct="1" latinLnBrk="0" marL="3657600" rtl="0">
       <a:defRPr kern="1200" sz="1800">
         <a:solidFill>
           <a:schemeClr val="tx1"/>
@@ -129,18 +129,7 @@
   </p:defaultTextStyle>
   <p:extLst>
     <p:ext uri="{EFAFB233-063F-42B5-8137-9DF3F51BA10A}">
-      <p15:sldGuideLst xmlns:p15="http://schemas.microsoft.com/office/powerpoint/2012/main">
-        <p15:guide id="1" orient="horz" pos="1620" userDrawn="1">
-          <p15:clr>
-            <a:srgbClr val="A4A3A4"/>
-          </p15:clr>
-        </p15:guide>
-        <p15:guide id="2" pos="2880" userDrawn="1">
-          <p15:clr>
-            <a:srgbClr val="A4A3A4"/>
-          </p15:clr>
-        </p15:guide>
-      </p15:sldGuideLst>
+      <p15:sldGuideLst xmlns:p15="http://schemas.microsoft.com/office/powerpoint/2012/main"/>
     </p:ext>
   </p:extLst>
 </p:presentation>
@@ -165,7 +154,13 @@
       </p:grpSpPr>
       <p:sp>
         <p:nvSpPr>
-          <p:cNvPr id="2" name="Title 1"/>
+          <p:cNvPr id="2" name="Title 1">
+            <a:extLst>
+              <a:ext uri="{FF2B5EF4-FFF2-40B4-BE49-F238E27FC236}">
+                <a16:creationId xmlns:a16="http://schemas.microsoft.com/office/drawing/2014/main" id="{54A9766F-B35E-DD24-6EE8-5B4A00B11314}"/>
+              </a:ext>
+            </a:extLst>
+          </p:cNvPr>
           <p:cNvSpPr>
             <a:spLocks noGrp="1"/>
           </p:cNvSpPr>
@@ -175,13 +170,17 @@
         </p:nvSpPr>
         <p:spPr>
           <a:xfrm>
-            <a:off x="685800" y="1597819"/>
-            <a:ext cx="7772400" cy="1102519"/>
+            <a:off x="1524000" y="1122363"/>
+            <a:ext cx="9144000" cy="2387600"/>
           </a:xfrm>
         </p:spPr>
         <p:txBody>
-          <a:bodyPr/>
-          <a:lstStyle/>
+          <a:bodyPr anchor="b"/>
+          <a:lstStyle>
+            <a:lvl1pPr algn="ctr">
+              <a:defRPr sz="6000"/>
+            </a:lvl1pPr>
+          </a:lstStyle>
           <a:p>
             <a:r>
               <a:rPr lang="en-US"/>
@@ -192,7 +191,13 @@
       </p:sp>
       <p:sp>
         <p:nvSpPr>
-          <p:cNvPr id="3" name="Subtitle 2"/>
+          <p:cNvPr id="3" name="Subtitle 2">
+            <a:extLst>
+              <a:ext uri="{FF2B5EF4-FFF2-40B4-BE49-F238E27FC236}">
+                <a16:creationId xmlns:a16="http://schemas.microsoft.com/office/drawing/2014/main" id="{AC3D4351-CC8D-D79B-1ED3-78F1614FAB0F}"/>
+              </a:ext>
+            </a:extLst>
+          </p:cNvPr>
           <p:cNvSpPr>
             <a:spLocks noGrp="1"/>
           </p:cNvSpPr>
@@ -202,8 +207,8 @@
         </p:nvSpPr>
         <p:spPr>
           <a:xfrm>
-            <a:off x="1371600" y="2914650"/>
-            <a:ext cx="6400800" cy="1314450"/>
+            <a:off x="1524000" y="3602038"/>
+            <a:ext cx="9144000" cy="1655762"/>
           </a:xfrm>
         </p:spPr>
         <p:txBody>
@@ -211,93 +216,39 @@
           <a:lstStyle>
             <a:lvl1pPr marL="0" indent="0" algn="ctr">
               <a:buNone/>
-              <a:defRPr>
-                <a:solidFill>
-                  <a:schemeClr val="tx1">
-                    <a:tint val="75000"/>
-                  </a:schemeClr>
-                </a:solidFill>
-              </a:defRPr>
+              <a:defRPr sz="2400"/>
             </a:lvl1pPr>
-            <a:lvl2pPr marL="342900" indent="0" algn="ctr">
-              <a:buNone/>
-              <a:defRPr>
-                <a:solidFill>
-                  <a:schemeClr val="tx1">
-                    <a:tint val="75000"/>
-                  </a:schemeClr>
-                </a:solidFill>
-              </a:defRPr>
+            <a:lvl2pPr marL="457200" indent="0" algn="ctr">
+              <a:buNone/>
+              <a:defRPr sz="2000"/>
             </a:lvl2pPr>
-            <a:lvl3pPr marL="685800" indent="0" algn="ctr">
-              <a:buNone/>
-              <a:defRPr>
-                <a:solidFill>
-                  <a:schemeClr val="tx1">
-                    <a:tint val="75000"/>
-                  </a:schemeClr>
-                </a:solidFill>
-              </a:defRPr>
+            <a:lvl3pPr marL="914400" indent="0" algn="ctr">
+              <a:buNone/>
+              <a:defRPr sz="1800"/>
             </a:lvl3pPr>
-            <a:lvl4pPr marL="1028700" indent="0" algn="ctr">
-              <a:buNone/>
-              <a:defRPr>
-                <a:solidFill>
-                  <a:schemeClr val="tx1">
-                    <a:tint val="75000"/>
-                  </a:schemeClr>
-                </a:solidFill>
-              </a:defRPr>
+            <a:lvl4pPr marL="1371600" indent="0" algn="ctr">
+              <a:buNone/>
+              <a:defRPr sz="1600"/>
             </a:lvl4pPr>
-            <a:lvl5pPr marL="1371600" indent="0" algn="ctr">
-              <a:buNone/>
-              <a:defRPr>
-                <a:solidFill>
-                  <a:schemeClr val="tx1">
-                    <a:tint val="75000"/>
-                  </a:schemeClr>
-                </a:solidFill>
-              </a:defRPr>
+            <a:lvl5pPr marL="1828800" indent="0" algn="ctr">
+              <a:buNone/>
+              <a:defRPr sz="1600"/>
             </a:lvl5pPr>
-            <a:lvl6pPr marL="1714500" indent="0" algn="ctr">
-              <a:buNone/>
-              <a:defRPr>
-                <a:solidFill>
-                  <a:schemeClr val="tx1">
-                    <a:tint val="75000"/>
-                  </a:schemeClr>
-                </a:solidFill>
-              </a:defRPr>
+            <a:lvl6pPr marL="2286000" indent="0" algn="ctr">
+              <a:buNone/>
+              <a:defRPr sz="1600"/>
             </a:lvl6pPr>
-            <a:lvl7pPr marL="2057400" indent="0" algn="ctr">
-              <a:buNone/>
-              <a:defRPr>
-                <a:solidFill>
-                  <a:schemeClr val="tx1">
-                    <a:tint val="75000"/>
-                  </a:schemeClr>
-                </a:solidFill>
-              </a:defRPr>
+            <a:lvl7pPr marL="2743200" indent="0" algn="ctr">
+              <a:buNone/>
+              <a:defRPr sz="1600"/>
             </a:lvl7pPr>
-            <a:lvl8pPr marL="2400300" indent="0" algn="ctr">
-              <a:buNone/>
-              <a:defRPr>
-                <a:solidFill>
-                  <a:schemeClr val="tx1">
-                    <a:tint val="75000"/>
-                  </a:schemeClr>
-                </a:solidFill>
-              </a:defRPr>
+            <a:lvl8pPr marL="3200400" indent="0" algn="ctr">
+              <a:buNone/>
+              <a:defRPr sz="1600"/>
             </a:lvl8pPr>
-            <a:lvl9pPr marL="2743200" indent="0" algn="ctr">
-              <a:buNone/>
-              <a:defRPr>
-                <a:solidFill>
-                  <a:schemeClr val="tx1">
-                    <a:tint val="75000"/>
-                  </a:schemeClr>
-                </a:solidFill>
-              </a:defRPr>
+            <a:lvl9pPr marL="3657600" indent="0" algn="ctr">
+              <a:buNone/>
+              <a:defRPr sz="1600"/>
             </a:lvl9pPr>
           </a:lstStyle>
           <a:p>
@@ -310,7 +261,13 @@
       </p:sp>
       <p:sp>
         <p:nvSpPr>
-          <p:cNvPr id="4" name="Date Placeholder 3"/>
+          <p:cNvPr id="4" name="Date Placeholder 3">
+            <a:extLst>
+              <a:ext uri="{FF2B5EF4-FFF2-40B4-BE49-F238E27FC236}">
+                <a16:creationId xmlns:a16="http://schemas.microsoft.com/office/drawing/2014/main" id="{A9F1E45F-B0E7-448F-0809-45CCE5CB7755}"/>
+              </a:ext>
+            </a:extLst>
+          </p:cNvPr>
           <p:cNvSpPr>
             <a:spLocks noGrp="1"/>
           </p:cNvSpPr>
@@ -323,9 +280,9 @@
           <a:bodyPr/>
           <a:lstStyle/>
           <a:p>
-            <a:fld id="{241EB5C9-1307-BA42-ABA2-0BC069CD8E7F}" type="datetimeFigureOut">
+            <a:fld id="{F4FC6662-9247-444B-ADF5-BDC4693D4AA0}" type="datetimeFigureOut">
               <a:rPr lang="en-US" smtClean="0"/>
-              <a:t>1/2/22</a:t>
+              <a:t>4/22/2024</a:t>
             </a:fld>
             <a:endParaRPr lang="en-US"/>
           </a:p>
@@ -333,7 +290,13 @@
       </p:sp>
       <p:sp>
         <p:nvSpPr>
-          <p:cNvPr id="5" name="Footer Placeholder 4"/>
+          <p:cNvPr id="5" name="Footer Placeholder 4">
+            <a:extLst>
+              <a:ext uri="{FF2B5EF4-FFF2-40B4-BE49-F238E27FC236}">
+                <a16:creationId xmlns:a16="http://schemas.microsoft.com/office/drawing/2014/main" id="{FD06D032-6196-080A-B076-B960FEF3525D}"/>
+              </a:ext>
+            </a:extLst>
+          </p:cNvPr>
           <p:cNvSpPr>
             <a:spLocks noGrp="1"/>
           </p:cNvSpPr>
@@ -352,7 +315,13 @@
       </p:sp>
       <p:sp>
         <p:nvSpPr>
-          <p:cNvPr id="6" name="Slide Number Placeholder 5"/>
+          <p:cNvPr id="6" name="Slide Number Placeholder 5">
+            <a:extLst>
+              <a:ext uri="{FF2B5EF4-FFF2-40B4-BE49-F238E27FC236}">
+                <a16:creationId xmlns:a16="http://schemas.microsoft.com/office/drawing/2014/main" id="{A7C740A2-9E64-046B-B7E8-BABA247FB0F2}"/>
+              </a:ext>
+            </a:extLst>
+          </p:cNvPr>
           <p:cNvSpPr>
             <a:spLocks noGrp="1"/>
           </p:cNvSpPr>
@@ -365,7 +334,7 @@
           <a:bodyPr/>
           <a:lstStyle/>
           <a:p>
-            <a:fld id="{C5EF2332-01BF-834F-8236-50238282D533}" type="slidenum">
+            <a:fld id="{87F339C6-D84C-874E-B4F5-90CEABF287B1}" type="slidenum">
               <a:rPr lang="en-US" smtClean="0"/>
               <a:t>‹#›</a:t>
             </a:fld>
@@ -376,7 +345,7 @@
     </p:spTree>
     <p:extLst>
       <p:ext uri="{BB962C8B-B14F-4D97-AF65-F5344CB8AC3E}">
-        <p14:creationId xmlns:p14="http://schemas.microsoft.com/office/powerpoint/2010/main" val="1444357513"/>
+        <p14:creationId xmlns:p14="http://schemas.microsoft.com/office/powerpoint/2010/main" val="1043440884"/>
       </p:ext>
     </p:extLst>
   </p:cSld>
@@ -405,7 +374,13 @@
       </p:grpSpPr>
       <p:sp>
         <p:nvSpPr>
-          <p:cNvPr id="2" name="Title 1"/>
+          <p:cNvPr id="2" name="Title 1">
+            <a:extLst>
+              <a:ext uri="{FF2B5EF4-FFF2-40B4-BE49-F238E27FC236}">
+                <a16:creationId xmlns:a16="http://schemas.microsoft.com/office/drawing/2014/main" id="{A216D389-C037-D6DC-B081-E31D04EC4AF4}"/>
+              </a:ext>
+            </a:extLst>
+          </p:cNvPr>
           <p:cNvSpPr>
             <a:spLocks noGrp="1"/>
           </p:cNvSpPr>
@@ -427,7 +402,13 @@
       </p:sp>
       <p:sp>
         <p:nvSpPr>
-          <p:cNvPr id="3" name="Vertical Text Placeholder 2"/>
+          <p:cNvPr id="3" name="Vertical Text Placeholder 2">
+            <a:extLst>
+              <a:ext uri="{FF2B5EF4-FFF2-40B4-BE49-F238E27FC236}">
+                <a16:creationId xmlns:a16="http://schemas.microsoft.com/office/drawing/2014/main" id="{D0EF7C4B-0F5E-8FB3-D72F-4C0CCEA33AC0}"/>
+              </a:ext>
+            </a:extLst>
+          </p:cNvPr>
           <p:cNvSpPr>
             <a:spLocks noGrp="1"/>
           </p:cNvSpPr>
@@ -478,7 +459,13 @@
       </p:sp>
       <p:sp>
         <p:nvSpPr>
-          <p:cNvPr id="4" name="Date Placeholder 3"/>
+          <p:cNvPr id="4" name="Date Placeholder 3">
+            <a:extLst>
+              <a:ext uri="{FF2B5EF4-FFF2-40B4-BE49-F238E27FC236}">
+                <a16:creationId xmlns:a16="http://schemas.microsoft.com/office/drawing/2014/main" id="{72196289-A474-C6AA-A2D2-659ECF1E8F77}"/>
+              </a:ext>
+            </a:extLst>
+          </p:cNvPr>
           <p:cNvSpPr>
             <a:spLocks noGrp="1"/>
           </p:cNvSpPr>
@@ -491,9 +478,9 @@
           <a:bodyPr/>
           <a:lstStyle/>
           <a:p>
-            <a:fld id="{241EB5C9-1307-BA42-ABA2-0BC069CD8E7F}" type="datetimeFigureOut">
+            <a:fld id="{F4FC6662-9247-444B-ADF5-BDC4693D4AA0}" type="datetimeFigureOut">
               <a:rPr lang="en-US" smtClean="0"/>
-              <a:t>1/2/22</a:t>
+              <a:t>4/22/2024</a:t>
             </a:fld>
             <a:endParaRPr lang="en-US"/>
           </a:p>
@@ -501,7 +488,13 @@
       </p:sp>
       <p:sp>
         <p:nvSpPr>
-          <p:cNvPr id="5" name="Footer Placeholder 4"/>
+          <p:cNvPr id="5" name="Footer Placeholder 4">
+            <a:extLst>
+              <a:ext uri="{FF2B5EF4-FFF2-40B4-BE49-F238E27FC236}">
+                <a16:creationId xmlns:a16="http://schemas.microsoft.com/office/drawing/2014/main" id="{1BF1933E-A33D-640D-1199-D89CBD3A519A}"/>
+              </a:ext>
+            </a:extLst>
+          </p:cNvPr>
           <p:cNvSpPr>
             <a:spLocks noGrp="1"/>
           </p:cNvSpPr>
@@ -520,7 +513,13 @@
       </p:sp>
       <p:sp>
         <p:nvSpPr>
-          <p:cNvPr id="6" name="Slide Number Placeholder 5"/>
+          <p:cNvPr id="6" name="Slide Number Placeholder 5">
+            <a:extLst>
+              <a:ext uri="{FF2B5EF4-FFF2-40B4-BE49-F238E27FC236}">
+                <a16:creationId xmlns:a16="http://schemas.microsoft.com/office/drawing/2014/main" id="{D13F676B-DB4D-8AEB-263B-718F28D1EF29}"/>
+              </a:ext>
+            </a:extLst>
+          </p:cNvPr>
           <p:cNvSpPr>
             <a:spLocks noGrp="1"/>
           </p:cNvSpPr>
@@ -533,7 +532,7 @@
           <a:bodyPr/>
           <a:lstStyle/>
           <a:p>
-            <a:fld id="{C5EF2332-01BF-834F-8236-50238282D533}" type="slidenum">
+            <a:fld id="{87F339C6-D84C-874E-B4F5-90CEABF287B1}" type="slidenum">
               <a:rPr lang="en-US" smtClean="0"/>
               <a:t>‹#›</a:t>
             </a:fld>
@@ -544,7 +543,7 @@
     </p:spTree>
     <p:extLst>
       <p:ext uri="{BB962C8B-B14F-4D97-AF65-F5344CB8AC3E}">
-        <p14:creationId xmlns:p14="http://schemas.microsoft.com/office/powerpoint/2010/main" val="313914798"/>
+        <p14:creationId xmlns:p14="http://schemas.microsoft.com/office/powerpoint/2010/main" val="2455954565"/>
       </p:ext>
     </p:extLst>
   </p:cSld>
@@ -573,7 +572,13 @@
       </p:grpSpPr>
       <p:sp>
         <p:nvSpPr>
-          <p:cNvPr id="2" name="Vertical Title 1"/>
+          <p:cNvPr id="2" name="Vertical Title 1">
+            <a:extLst>
+              <a:ext uri="{FF2B5EF4-FFF2-40B4-BE49-F238E27FC236}">
+                <a16:creationId xmlns:a16="http://schemas.microsoft.com/office/drawing/2014/main" id="{EEB82250-5E99-9A80-02BB-A3F3F6FCA67F}"/>
+              </a:ext>
+            </a:extLst>
+          </p:cNvPr>
           <p:cNvSpPr>
             <a:spLocks noGrp="1"/>
           </p:cNvSpPr>
@@ -583,8 +588,8 @@
         </p:nvSpPr>
         <p:spPr>
           <a:xfrm>
-            <a:off x="6629400" y="205979"/>
-            <a:ext cx="2057400" cy="4388644"/>
+            <a:off x="8724900" y="365125"/>
+            <a:ext cx="2628900" cy="5811838"/>
           </a:xfrm>
         </p:spPr>
         <p:txBody>
@@ -600,7 +605,13 @@
       </p:sp>
       <p:sp>
         <p:nvSpPr>
-          <p:cNvPr id="3" name="Vertical Text Placeholder 2"/>
+          <p:cNvPr id="3" name="Vertical Text Placeholder 2">
+            <a:extLst>
+              <a:ext uri="{FF2B5EF4-FFF2-40B4-BE49-F238E27FC236}">
+                <a16:creationId xmlns:a16="http://schemas.microsoft.com/office/drawing/2014/main" id="{2231EEE6-F09B-2CB2-C28C-24EE799A89F1}"/>
+              </a:ext>
+            </a:extLst>
+          </p:cNvPr>
           <p:cNvSpPr>
             <a:spLocks noGrp="1"/>
           </p:cNvSpPr>
@@ -610,8 +621,8 @@
         </p:nvSpPr>
         <p:spPr>
           <a:xfrm>
-            <a:off x="457200" y="205979"/>
-            <a:ext cx="6019800" cy="4388644"/>
+            <a:off x="838200" y="365125"/>
+            <a:ext cx="7734300" cy="5811838"/>
           </a:xfrm>
         </p:spPr>
         <p:txBody>
@@ -656,7 +667,13 @@
       </p:sp>
       <p:sp>
         <p:nvSpPr>
-          <p:cNvPr id="4" name="Date Placeholder 3"/>
+          <p:cNvPr id="4" name="Date Placeholder 3">
+            <a:extLst>
+              <a:ext uri="{FF2B5EF4-FFF2-40B4-BE49-F238E27FC236}">
+                <a16:creationId xmlns:a16="http://schemas.microsoft.com/office/drawing/2014/main" id="{69C252A5-C314-62D2-A3F7-2445D77D43A8}"/>
+              </a:ext>
+            </a:extLst>
+          </p:cNvPr>
           <p:cNvSpPr>
             <a:spLocks noGrp="1"/>
           </p:cNvSpPr>
@@ -669,9 +686,9 @@
           <a:bodyPr/>
           <a:lstStyle/>
           <a:p>
-            <a:fld id="{241EB5C9-1307-BA42-ABA2-0BC069CD8E7F}" type="datetimeFigureOut">
+            <a:fld id="{F4FC6662-9247-444B-ADF5-BDC4693D4AA0}" type="datetimeFigureOut">
               <a:rPr lang="en-US" smtClean="0"/>
-              <a:t>1/2/22</a:t>
+              <a:t>4/22/2024</a:t>
             </a:fld>
             <a:endParaRPr lang="en-US"/>
           </a:p>
@@ -679,7 +696,13 @@
       </p:sp>
       <p:sp>
         <p:nvSpPr>
-          <p:cNvPr id="5" name="Footer Placeholder 4"/>
+          <p:cNvPr id="5" name="Footer Placeholder 4">
+            <a:extLst>
+              <a:ext uri="{FF2B5EF4-FFF2-40B4-BE49-F238E27FC236}">
+                <a16:creationId xmlns:a16="http://schemas.microsoft.com/office/drawing/2014/main" id="{B06E5EC8-EB23-554A-D184-D959FE6021E0}"/>
+              </a:ext>
+            </a:extLst>
+          </p:cNvPr>
           <p:cNvSpPr>
             <a:spLocks noGrp="1"/>
           </p:cNvSpPr>
@@ -698,7 +721,13 @@
       </p:sp>
       <p:sp>
         <p:nvSpPr>
-          <p:cNvPr id="6" name="Slide Number Placeholder 5"/>
+          <p:cNvPr id="6" name="Slide Number Placeholder 5">
+            <a:extLst>
+              <a:ext uri="{FF2B5EF4-FFF2-40B4-BE49-F238E27FC236}">
+                <a16:creationId xmlns:a16="http://schemas.microsoft.com/office/drawing/2014/main" id="{64C840B0-F02A-4DD0-F9C2-113C5E3726A8}"/>
+              </a:ext>
+            </a:extLst>
+          </p:cNvPr>
           <p:cNvSpPr>
             <a:spLocks noGrp="1"/>
           </p:cNvSpPr>
@@ -711,7 +740,7 @@
           <a:bodyPr/>
           <a:lstStyle/>
           <a:p>
-            <a:fld id="{C5EF2332-01BF-834F-8236-50238282D533}" type="slidenum">
+            <a:fld id="{87F339C6-D84C-874E-B4F5-90CEABF287B1}" type="slidenum">
               <a:rPr lang="en-US" smtClean="0"/>
               <a:t>‹#›</a:t>
             </a:fld>
@@ -722,7 +751,7 @@
     </p:spTree>
     <p:extLst>
       <p:ext uri="{BB962C8B-B14F-4D97-AF65-F5344CB8AC3E}">
-        <p14:creationId xmlns:p14="http://schemas.microsoft.com/office/powerpoint/2010/main" val="2581529045"/>
+        <p14:creationId xmlns:p14="http://schemas.microsoft.com/office/powerpoint/2010/main" val="1678142098"/>
       </p:ext>
     </p:extLst>
   </p:cSld>
@@ -751,7 +780,13 @@
       </p:grpSpPr>
       <p:sp>
         <p:nvSpPr>
-          <p:cNvPr id="2" name="Title 1"/>
+          <p:cNvPr id="2" name="Title 1">
+            <a:extLst>
+              <a:ext uri="{FF2B5EF4-FFF2-40B4-BE49-F238E27FC236}">
+                <a16:creationId xmlns:a16="http://schemas.microsoft.com/office/drawing/2014/main" id="{7DE2BA23-27DE-9A84-D049-94BD2FDDFB12}"/>
+              </a:ext>
+            </a:extLst>
+          </p:cNvPr>
           <p:cNvSpPr>
             <a:spLocks noGrp="1"/>
           </p:cNvSpPr>
@@ -773,7 +808,13 @@
       </p:sp>
       <p:sp>
         <p:nvSpPr>
-          <p:cNvPr id="3" name="Content Placeholder 2"/>
+          <p:cNvPr id="3" name="Content Placeholder 2">
+            <a:extLst>
+              <a:ext uri="{FF2B5EF4-FFF2-40B4-BE49-F238E27FC236}">
+                <a16:creationId xmlns:a16="http://schemas.microsoft.com/office/drawing/2014/main" id="{45969992-D875-2929-E350-487E7B6CD246}"/>
+              </a:ext>
+            </a:extLst>
+          </p:cNvPr>
           <p:cNvSpPr>
             <a:spLocks noGrp="1"/>
           </p:cNvSpPr>
@@ -824,7 +865,13 @@
       </p:sp>
       <p:sp>
         <p:nvSpPr>
-          <p:cNvPr id="4" name="Date Placeholder 3"/>
+          <p:cNvPr id="4" name="Date Placeholder 3">
+            <a:extLst>
+              <a:ext uri="{FF2B5EF4-FFF2-40B4-BE49-F238E27FC236}">
+                <a16:creationId xmlns:a16="http://schemas.microsoft.com/office/drawing/2014/main" id="{2BD965FD-C9C5-74DA-9B28-2F462EC4226E}"/>
+              </a:ext>
+            </a:extLst>
+          </p:cNvPr>
           <p:cNvSpPr>
             <a:spLocks noGrp="1"/>
           </p:cNvSpPr>
@@ -837,9 +884,9 @@
           <a:bodyPr/>
           <a:lstStyle/>
           <a:p>
-            <a:fld id="{241EB5C9-1307-BA42-ABA2-0BC069CD8E7F}" type="datetimeFigureOut">
+            <a:fld id="{F4FC6662-9247-444B-ADF5-BDC4693D4AA0}" type="datetimeFigureOut">
               <a:rPr lang="en-US" smtClean="0"/>
-              <a:t>1/2/22</a:t>
+              <a:t>4/22/2024</a:t>
             </a:fld>
             <a:endParaRPr lang="en-US"/>
           </a:p>
@@ -847,7 +894,13 @@
       </p:sp>
       <p:sp>
         <p:nvSpPr>
-          <p:cNvPr id="5" name="Footer Placeholder 4"/>
+          <p:cNvPr id="5" name="Footer Placeholder 4">
+            <a:extLst>
+              <a:ext uri="{FF2B5EF4-FFF2-40B4-BE49-F238E27FC236}">
+                <a16:creationId xmlns:a16="http://schemas.microsoft.com/office/drawing/2014/main" id="{745233D1-6005-3C35-CA01-A07E8C38A7A7}"/>
+              </a:ext>
+            </a:extLst>
+          </p:cNvPr>
           <p:cNvSpPr>
             <a:spLocks noGrp="1"/>
           </p:cNvSpPr>
@@ -866,7 +919,13 @@
       </p:sp>
       <p:sp>
         <p:nvSpPr>
-          <p:cNvPr id="6" name="Slide Number Placeholder 5"/>
+          <p:cNvPr id="6" name="Slide Number Placeholder 5">
+            <a:extLst>
+              <a:ext uri="{FF2B5EF4-FFF2-40B4-BE49-F238E27FC236}">
+                <a16:creationId xmlns:a16="http://schemas.microsoft.com/office/drawing/2014/main" id="{0B58ECFC-50BB-F567-C263-35BDC7177A4A}"/>
+              </a:ext>
+            </a:extLst>
+          </p:cNvPr>
           <p:cNvSpPr>
             <a:spLocks noGrp="1"/>
           </p:cNvSpPr>
@@ -879,7 +938,7 @@
           <a:bodyPr/>
           <a:lstStyle/>
           <a:p>
-            <a:fld id="{C5EF2332-01BF-834F-8236-50238282D533}" type="slidenum">
+            <a:fld id="{87F339C6-D84C-874E-B4F5-90CEABF287B1}" type="slidenum">
               <a:rPr lang="en-US" smtClean="0"/>
               <a:t>‹#›</a:t>
             </a:fld>
@@ -890,7 +949,7 @@
     </p:spTree>
     <p:extLst>
       <p:ext uri="{BB962C8B-B14F-4D97-AF65-F5344CB8AC3E}">
-        <p14:creationId xmlns:p14="http://schemas.microsoft.com/office/powerpoint/2010/main" val="338346009"/>
+        <p14:creationId xmlns:p14="http://schemas.microsoft.com/office/powerpoint/2010/main" val="3286831115"/>
       </p:ext>
     </p:extLst>
   </p:cSld>
@@ -919,7 +978,13 @@
       </p:grpSpPr>
       <p:sp>
         <p:nvSpPr>
-          <p:cNvPr id="2" name="Title 1"/>
+          <p:cNvPr id="2" name="Title 1">
+            <a:extLst>
+              <a:ext uri="{FF2B5EF4-FFF2-40B4-BE49-F238E27FC236}">
+                <a16:creationId xmlns:a16="http://schemas.microsoft.com/office/drawing/2014/main" id="{80A0CCEB-5AA3-9405-44C4-629E4B8A8924}"/>
+              </a:ext>
+            </a:extLst>
+          </p:cNvPr>
           <p:cNvSpPr>
             <a:spLocks noGrp="1"/>
           </p:cNvSpPr>
@@ -929,15 +994,15 @@
         </p:nvSpPr>
         <p:spPr>
           <a:xfrm>
-            <a:off x="722313" y="3305176"/>
-            <a:ext cx="7772400" cy="1021556"/>
+            <a:off x="831850" y="1709738"/>
+            <a:ext cx="10515600" cy="2852737"/>
           </a:xfrm>
         </p:spPr>
         <p:txBody>
-          <a:bodyPr anchor="t"/>
+          <a:bodyPr anchor="b"/>
           <a:lstStyle>
-            <a:lvl1pPr algn="l">
-              <a:defRPr sz="3000" b="1" cap="all"/>
+            <a:lvl1pPr>
+              <a:defRPr sz="6000"/>
             </a:lvl1pPr>
           </a:lstStyle>
           <a:p>
@@ -950,7 +1015,13 @@
       </p:sp>
       <p:sp>
         <p:nvSpPr>
-          <p:cNvPr id="3" name="Text Placeholder 2"/>
+          <p:cNvPr id="3" name="Text Placeholder 2">
+            <a:extLst>
+              <a:ext uri="{FF2B5EF4-FFF2-40B4-BE49-F238E27FC236}">
+                <a16:creationId xmlns:a16="http://schemas.microsoft.com/office/drawing/2014/main" id="{8EA4C9DC-7405-7951-3C82-E2F1FF78D8F5}"/>
+              </a:ext>
+            </a:extLst>
+          </p:cNvPr>
           <p:cNvSpPr>
             <a:spLocks noGrp="1"/>
           </p:cNvSpPr>
@@ -960,16 +1031,16 @@
         </p:nvSpPr>
         <p:spPr>
           <a:xfrm>
-            <a:off x="722313" y="2180035"/>
-            <a:ext cx="7772400" cy="1125140"/>
+            <a:off x="831850" y="4589463"/>
+            <a:ext cx="10515600" cy="1500187"/>
           </a:xfrm>
         </p:spPr>
         <p:txBody>
-          <a:bodyPr anchor="b"/>
+          <a:bodyPr/>
           <a:lstStyle>
             <a:lvl1pPr marL="0" indent="0">
               <a:buNone/>
-              <a:defRPr sz="1500">
+              <a:defRPr sz="2400">
                 <a:solidFill>
                   <a:schemeClr val="tx1">
                     <a:tint val="75000"/>
@@ -977,9 +1048,9 @@
                 </a:solidFill>
               </a:defRPr>
             </a:lvl1pPr>
-            <a:lvl2pPr marL="342900" indent="0">
-              <a:buNone/>
-              <a:defRPr sz="1350">
+            <a:lvl2pPr marL="457200" indent="0">
+              <a:buNone/>
+              <a:defRPr sz="2000">
                 <a:solidFill>
                   <a:schemeClr val="tx1">
                     <a:tint val="75000"/>
@@ -987,9 +1058,9 @@
                 </a:solidFill>
               </a:defRPr>
             </a:lvl2pPr>
-            <a:lvl3pPr marL="685800" indent="0">
-              <a:buNone/>
-              <a:defRPr sz="1200">
+            <a:lvl3pPr marL="914400" indent="0">
+              <a:buNone/>
+              <a:defRPr sz="1800">
                 <a:solidFill>
                   <a:schemeClr val="tx1">
                     <a:tint val="75000"/>
@@ -997,9 +1068,9 @@
                 </a:solidFill>
               </a:defRPr>
             </a:lvl3pPr>
-            <a:lvl4pPr marL="1028700" indent="0">
-              <a:buNone/>
-              <a:defRPr sz="1050">
+            <a:lvl4pPr marL="1371600" indent="0">
+              <a:buNone/>
+              <a:defRPr sz="1600">
                 <a:solidFill>
                   <a:schemeClr val="tx1">
                     <a:tint val="75000"/>
@@ -1007,9 +1078,9 @@
                 </a:solidFill>
               </a:defRPr>
             </a:lvl4pPr>
-            <a:lvl5pPr marL="1371600" indent="0">
-              <a:buNone/>
-              <a:defRPr sz="1050">
+            <a:lvl5pPr marL="1828800" indent="0">
+              <a:buNone/>
+              <a:defRPr sz="1600">
                 <a:solidFill>
                   <a:schemeClr val="tx1">
                     <a:tint val="75000"/>
@@ -1017,9 +1088,9 @@
                 </a:solidFill>
               </a:defRPr>
             </a:lvl5pPr>
-            <a:lvl6pPr marL="1714500" indent="0">
-              <a:buNone/>
-              <a:defRPr sz="1050">
+            <a:lvl6pPr marL="2286000" indent="0">
+              <a:buNone/>
+              <a:defRPr sz="1600">
                 <a:solidFill>
                   <a:schemeClr val="tx1">
                     <a:tint val="75000"/>
@@ -1027,9 +1098,9 @@
                 </a:solidFill>
               </a:defRPr>
             </a:lvl6pPr>
-            <a:lvl7pPr marL="2057400" indent="0">
-              <a:buNone/>
-              <a:defRPr sz="1050">
+            <a:lvl7pPr marL="2743200" indent="0">
+              <a:buNone/>
+              <a:defRPr sz="1600">
                 <a:solidFill>
                   <a:schemeClr val="tx1">
                     <a:tint val="75000"/>
@@ -1037,9 +1108,9 @@
                 </a:solidFill>
               </a:defRPr>
             </a:lvl7pPr>
-            <a:lvl8pPr marL="2400300" indent="0">
-              <a:buNone/>
-              <a:defRPr sz="1050">
+            <a:lvl8pPr marL="3200400" indent="0">
+              <a:buNone/>
+              <a:defRPr sz="1600">
                 <a:solidFill>
                   <a:schemeClr val="tx1">
                     <a:tint val="75000"/>
@@ -1047,9 +1118,9 @@
                 </a:solidFill>
               </a:defRPr>
             </a:lvl8pPr>
-            <a:lvl9pPr marL="2743200" indent="0">
-              <a:buNone/>
-              <a:defRPr sz="1050">
+            <a:lvl9pPr marL="3657600" indent="0">
+              <a:buNone/>
+              <a:defRPr sz="1600">
                 <a:solidFill>
                   <a:schemeClr val="tx1">
                     <a:tint val="75000"/>
@@ -1069,7 +1140,13 @@
       </p:sp>
       <p:sp>
         <p:nvSpPr>
-          <p:cNvPr id="4" name="Date Placeholder 3"/>
+          <p:cNvPr id="4" name="Date Placeholder 3">
+            <a:extLst>
+              <a:ext uri="{FF2B5EF4-FFF2-40B4-BE49-F238E27FC236}">
+                <a16:creationId xmlns:a16="http://schemas.microsoft.com/office/drawing/2014/main" id="{85DCD653-DED2-C1AC-88FC-6B90ACA28670}"/>
+              </a:ext>
+            </a:extLst>
+          </p:cNvPr>
           <p:cNvSpPr>
             <a:spLocks noGrp="1"/>
           </p:cNvSpPr>
@@ -1082,9 +1159,9 @@
           <a:bodyPr/>
           <a:lstStyle/>
           <a:p>
-            <a:fld id="{241EB5C9-1307-BA42-ABA2-0BC069CD8E7F}" type="datetimeFigureOut">
+            <a:fld id="{F4FC6662-9247-444B-ADF5-BDC4693D4AA0}" type="datetimeFigureOut">
               <a:rPr lang="en-US" smtClean="0"/>
-              <a:t>1/2/22</a:t>
+              <a:t>4/22/2024</a:t>
             </a:fld>
             <a:endParaRPr lang="en-US"/>
           </a:p>
@@ -1092,7 +1169,13 @@
       </p:sp>
       <p:sp>
         <p:nvSpPr>
-          <p:cNvPr id="5" name="Footer Placeholder 4"/>
+          <p:cNvPr id="5" name="Footer Placeholder 4">
+            <a:extLst>
+              <a:ext uri="{FF2B5EF4-FFF2-40B4-BE49-F238E27FC236}">
+                <a16:creationId xmlns:a16="http://schemas.microsoft.com/office/drawing/2014/main" id="{765C20DB-8DC8-E810-057C-230B9C35659A}"/>
+              </a:ext>
+            </a:extLst>
+          </p:cNvPr>
           <p:cNvSpPr>
             <a:spLocks noGrp="1"/>
           </p:cNvSpPr>
@@ -1111,7 +1194,13 @@
       </p:sp>
       <p:sp>
         <p:nvSpPr>
-          <p:cNvPr id="6" name="Slide Number Placeholder 5"/>
+          <p:cNvPr id="6" name="Slide Number Placeholder 5">
+            <a:extLst>
+              <a:ext uri="{FF2B5EF4-FFF2-40B4-BE49-F238E27FC236}">
+                <a16:creationId xmlns:a16="http://schemas.microsoft.com/office/drawing/2014/main" id="{A800D20A-2C27-1EC9-6E78-269B7E9B1534}"/>
+              </a:ext>
+            </a:extLst>
+          </p:cNvPr>
           <p:cNvSpPr>
             <a:spLocks noGrp="1"/>
           </p:cNvSpPr>
@@ -1124,7 +1213,7 @@
           <a:bodyPr/>
           <a:lstStyle/>
           <a:p>
-            <a:fld id="{C5EF2332-01BF-834F-8236-50238282D533}" type="slidenum">
+            <a:fld id="{87F339C6-D84C-874E-B4F5-90CEABF287B1}" type="slidenum">
               <a:rPr lang="en-US" smtClean="0"/>
               <a:t>‹#›</a:t>
             </a:fld>
@@ -1135,7 +1224,7 @@
     </p:spTree>
     <p:extLst>
       <p:ext uri="{BB962C8B-B14F-4D97-AF65-F5344CB8AC3E}">
-        <p14:creationId xmlns:p14="http://schemas.microsoft.com/office/powerpoint/2010/main" val="1073069076"/>
+        <p14:creationId xmlns:p14="http://schemas.microsoft.com/office/powerpoint/2010/main" val="4127086873"/>
       </p:ext>
     </p:extLst>
   </p:cSld>
@@ -1164,7 +1253,13 @@
       </p:grpSpPr>
       <p:sp>
         <p:nvSpPr>
-          <p:cNvPr id="2" name="Title 1"/>
+          <p:cNvPr id="2" name="Title 1">
+            <a:extLst>
+              <a:ext uri="{FF2B5EF4-FFF2-40B4-BE49-F238E27FC236}">
+                <a16:creationId xmlns:a16="http://schemas.microsoft.com/office/drawing/2014/main" id="{8716FE55-FB22-E504-1900-26C94E0182F6}"/>
+              </a:ext>
+            </a:extLst>
+          </p:cNvPr>
           <p:cNvSpPr>
             <a:spLocks noGrp="1"/>
           </p:cNvSpPr>
@@ -1186,7 +1281,13 @@
       </p:sp>
       <p:sp>
         <p:nvSpPr>
-          <p:cNvPr id="3" name="Content Placeholder 2"/>
+          <p:cNvPr id="3" name="Content Placeholder 2">
+            <a:extLst>
+              <a:ext uri="{FF2B5EF4-FFF2-40B4-BE49-F238E27FC236}">
+                <a16:creationId xmlns:a16="http://schemas.microsoft.com/office/drawing/2014/main" id="{53CAB199-7042-D3E0-A6DC-33D6CFE2E164}"/>
+              </a:ext>
+            </a:extLst>
+          </p:cNvPr>
           <p:cNvSpPr>
             <a:spLocks noGrp="1"/>
           </p:cNvSpPr>
@@ -1196,41 +1297,13 @@
         </p:nvSpPr>
         <p:spPr>
           <a:xfrm>
-            <a:off x="457200" y="1200151"/>
-            <a:ext cx="4038600" cy="3394472"/>
+            <a:off x="838200" y="1825625"/>
+            <a:ext cx="5181600" cy="4351338"/>
           </a:xfrm>
         </p:spPr>
         <p:txBody>
           <a:bodyPr/>
-          <a:lstStyle>
-            <a:lvl1pPr>
-              <a:defRPr sz="2100"/>
-            </a:lvl1pPr>
-            <a:lvl2pPr>
-              <a:defRPr sz="1800"/>
-            </a:lvl2pPr>
-            <a:lvl3pPr>
-              <a:defRPr sz="1500"/>
-            </a:lvl3pPr>
-            <a:lvl4pPr>
-              <a:defRPr sz="1350"/>
-            </a:lvl4pPr>
-            <a:lvl5pPr>
-              <a:defRPr sz="1350"/>
-            </a:lvl5pPr>
-            <a:lvl6pPr>
-              <a:defRPr sz="1350"/>
-            </a:lvl6pPr>
-            <a:lvl7pPr>
-              <a:defRPr sz="1350"/>
-            </a:lvl7pPr>
-            <a:lvl8pPr>
-              <a:defRPr sz="1350"/>
-            </a:lvl8pPr>
-            <a:lvl9pPr>
-              <a:defRPr sz="1350"/>
-            </a:lvl9pPr>
-          </a:lstStyle>
+          <a:lstStyle/>
           <a:p>
             <a:pPr lvl="0"/>
             <a:r>
@@ -1270,7 +1343,13 @@
       </p:sp>
       <p:sp>
         <p:nvSpPr>
-          <p:cNvPr id="4" name="Content Placeholder 3"/>
+          <p:cNvPr id="4" name="Content Placeholder 3">
+            <a:extLst>
+              <a:ext uri="{FF2B5EF4-FFF2-40B4-BE49-F238E27FC236}">
+                <a16:creationId xmlns:a16="http://schemas.microsoft.com/office/drawing/2014/main" id="{D28ACE5D-C2A1-90AF-81C4-D06D05ACE358}"/>
+              </a:ext>
+            </a:extLst>
+          </p:cNvPr>
           <p:cNvSpPr>
             <a:spLocks noGrp="1"/>
           </p:cNvSpPr>
@@ -1280,41 +1359,13 @@
         </p:nvSpPr>
         <p:spPr>
           <a:xfrm>
-            <a:off x="4648200" y="1200151"/>
-            <a:ext cx="4038600" cy="3394472"/>
+            <a:off x="6172200" y="1825625"/>
+            <a:ext cx="5181600" cy="4351338"/>
           </a:xfrm>
         </p:spPr>
         <p:txBody>
           <a:bodyPr/>
-          <a:lstStyle>
-            <a:lvl1pPr>
-              <a:defRPr sz="2100"/>
-            </a:lvl1pPr>
-            <a:lvl2pPr>
-              <a:defRPr sz="1800"/>
-            </a:lvl2pPr>
-            <a:lvl3pPr>
-              <a:defRPr sz="1500"/>
-            </a:lvl3pPr>
-            <a:lvl4pPr>
-              <a:defRPr sz="1350"/>
-            </a:lvl4pPr>
-            <a:lvl5pPr>
-              <a:defRPr sz="1350"/>
-            </a:lvl5pPr>
-            <a:lvl6pPr>
-              <a:defRPr sz="1350"/>
-            </a:lvl6pPr>
-            <a:lvl7pPr>
-              <a:defRPr sz="1350"/>
-            </a:lvl7pPr>
-            <a:lvl8pPr>
-              <a:defRPr sz="1350"/>
-            </a:lvl8pPr>
-            <a:lvl9pPr>
-              <a:defRPr sz="1350"/>
-            </a:lvl9pPr>
-          </a:lstStyle>
+          <a:lstStyle/>
           <a:p>
             <a:pPr lvl="0"/>
             <a:r>
@@ -1354,7 +1405,13 @@
       </p:sp>
       <p:sp>
         <p:nvSpPr>
-          <p:cNvPr id="5" name="Date Placeholder 4"/>
+          <p:cNvPr id="5" name="Date Placeholder 4">
+            <a:extLst>
+              <a:ext uri="{FF2B5EF4-FFF2-40B4-BE49-F238E27FC236}">
+                <a16:creationId xmlns:a16="http://schemas.microsoft.com/office/drawing/2014/main" id="{2EDB2742-6B2A-9098-1832-8595E8FF959D}"/>
+              </a:ext>
+            </a:extLst>
+          </p:cNvPr>
           <p:cNvSpPr>
             <a:spLocks noGrp="1"/>
           </p:cNvSpPr>
@@ -1367,9 +1424,9 @@
           <a:bodyPr/>
           <a:lstStyle/>
           <a:p>
-            <a:fld id="{241EB5C9-1307-BA42-ABA2-0BC069CD8E7F}" type="datetimeFigureOut">
+            <a:fld id="{F4FC6662-9247-444B-ADF5-BDC4693D4AA0}" type="datetimeFigureOut">
               <a:rPr lang="en-US" smtClean="0"/>
-              <a:t>1/2/22</a:t>
+              <a:t>4/22/2024</a:t>
             </a:fld>
             <a:endParaRPr lang="en-US"/>
           </a:p>
@@ -1377,7 +1434,13 @@
       </p:sp>
       <p:sp>
         <p:nvSpPr>
-          <p:cNvPr id="6" name="Footer Placeholder 5"/>
+          <p:cNvPr id="6" name="Footer Placeholder 5">
+            <a:extLst>
+              <a:ext uri="{FF2B5EF4-FFF2-40B4-BE49-F238E27FC236}">
+                <a16:creationId xmlns:a16="http://schemas.microsoft.com/office/drawing/2014/main" id="{5247BBA0-661E-719C-562B-F887D6FA033F}"/>
+              </a:ext>
+            </a:extLst>
+          </p:cNvPr>
           <p:cNvSpPr>
             <a:spLocks noGrp="1"/>
           </p:cNvSpPr>
@@ -1396,7 +1459,13 @@
       </p:sp>
       <p:sp>
         <p:nvSpPr>
-          <p:cNvPr id="7" name="Slide Number Placeholder 6"/>
+          <p:cNvPr id="7" name="Slide Number Placeholder 6">
+            <a:extLst>
+              <a:ext uri="{FF2B5EF4-FFF2-40B4-BE49-F238E27FC236}">
+                <a16:creationId xmlns:a16="http://schemas.microsoft.com/office/drawing/2014/main" id="{CC8F8A08-7932-5245-59E3-ACF804BBBD34}"/>
+              </a:ext>
+            </a:extLst>
+          </p:cNvPr>
           <p:cNvSpPr>
             <a:spLocks noGrp="1"/>
           </p:cNvSpPr>
@@ -1409,7 +1478,7 @@
           <a:bodyPr/>
           <a:lstStyle/>
           <a:p>
-            <a:fld id="{C5EF2332-01BF-834F-8236-50238282D533}" type="slidenum">
+            <a:fld id="{87F339C6-D84C-874E-B4F5-90CEABF287B1}" type="slidenum">
               <a:rPr lang="en-US" smtClean="0"/>
               <a:t>‹#›</a:t>
             </a:fld>
@@ -1420,7 +1489,7 @@
     </p:spTree>
     <p:extLst>
       <p:ext uri="{BB962C8B-B14F-4D97-AF65-F5344CB8AC3E}">
-        <p14:creationId xmlns:p14="http://schemas.microsoft.com/office/powerpoint/2010/main" val="2619886245"/>
+        <p14:creationId xmlns:p14="http://schemas.microsoft.com/office/powerpoint/2010/main" val="3301033312"/>
       </p:ext>
     </p:extLst>
   </p:cSld>
@@ -1449,7 +1518,13 @@
       </p:grpSpPr>
       <p:sp>
         <p:nvSpPr>
-          <p:cNvPr id="2" name="Title 1"/>
+          <p:cNvPr id="2" name="Title 1">
+            <a:extLst>
+              <a:ext uri="{FF2B5EF4-FFF2-40B4-BE49-F238E27FC236}">
+                <a16:creationId xmlns:a16="http://schemas.microsoft.com/office/drawing/2014/main" id="{3E291763-00A6-A381-61DD-4B9F4C08E656}"/>
+              </a:ext>
+            </a:extLst>
+          </p:cNvPr>
           <p:cNvSpPr>
             <a:spLocks noGrp="1"/>
           </p:cNvSpPr>
@@ -1457,14 +1532,15 @@
             <p:ph type="title"/>
           </p:nvPr>
         </p:nvSpPr>
-        <p:spPr/>
-        <p:txBody>
-          <a:bodyPr/>
-          <a:lstStyle>
-            <a:lvl1pPr>
-              <a:defRPr/>
-            </a:lvl1pPr>
-          </a:lstStyle>
+        <p:spPr>
+          <a:xfrm>
+            <a:off x="839788" y="365125"/>
+            <a:ext cx="10515600" cy="1325563"/>
+          </a:xfrm>
+        </p:spPr>
+        <p:txBody>
+          <a:bodyPr/>
+          <a:lstStyle/>
           <a:p>
             <a:r>
               <a:rPr lang="en-US"/>
@@ -1475,7 +1551,13 @@
       </p:sp>
       <p:sp>
         <p:nvSpPr>
-          <p:cNvPr id="3" name="Text Placeholder 2"/>
+          <p:cNvPr id="3" name="Text Placeholder 2">
+            <a:extLst>
+              <a:ext uri="{FF2B5EF4-FFF2-40B4-BE49-F238E27FC236}">
+                <a16:creationId xmlns:a16="http://schemas.microsoft.com/office/drawing/2014/main" id="{12340FA3-C56F-5008-9582-97C3F40EDA31}"/>
+              </a:ext>
+            </a:extLst>
+          </p:cNvPr>
           <p:cNvSpPr>
             <a:spLocks noGrp="1"/>
           </p:cNvSpPr>
@@ -1485,8 +1567,8 @@
         </p:nvSpPr>
         <p:spPr>
           <a:xfrm>
-            <a:off x="457200" y="1151335"/>
-            <a:ext cx="4040188" cy="479822"/>
+            <a:off x="839788" y="1681163"/>
+            <a:ext cx="5157787" cy="823912"/>
           </a:xfrm>
         </p:spPr>
         <p:txBody>
@@ -1494,39 +1576,39 @@
           <a:lstStyle>
             <a:lvl1pPr marL="0" indent="0">
               <a:buNone/>
+              <a:defRPr sz="2400" b="1"/>
+            </a:lvl1pPr>
+            <a:lvl2pPr marL="457200" indent="0">
+              <a:buNone/>
+              <a:defRPr sz="2000" b="1"/>
+            </a:lvl2pPr>
+            <a:lvl3pPr marL="914400" indent="0">
+              <a:buNone/>
               <a:defRPr sz="1800" b="1"/>
-            </a:lvl1pPr>
-            <a:lvl2pPr marL="342900" indent="0">
-              <a:buNone/>
-              <a:defRPr sz="1500" b="1"/>
-            </a:lvl2pPr>
-            <a:lvl3pPr marL="685800" indent="0">
-              <a:buNone/>
-              <a:defRPr sz="1350" b="1"/>
             </a:lvl3pPr>
-            <a:lvl4pPr marL="1028700" indent="0">
-              <a:buNone/>
-              <a:defRPr sz="1200" b="1"/>
+            <a:lvl4pPr marL="1371600" indent="0">
+              <a:buNone/>
+              <a:defRPr sz="1600" b="1"/>
             </a:lvl4pPr>
-            <a:lvl5pPr marL="1371600" indent="0">
-              <a:buNone/>
-              <a:defRPr sz="1200" b="1"/>
+            <a:lvl5pPr marL="1828800" indent="0">
+              <a:buNone/>
+              <a:defRPr sz="1600" b="1"/>
             </a:lvl5pPr>
-            <a:lvl6pPr marL="1714500" indent="0">
-              <a:buNone/>
-              <a:defRPr sz="1200" b="1"/>
+            <a:lvl6pPr marL="2286000" indent="0">
+              <a:buNone/>
+              <a:defRPr sz="1600" b="1"/>
             </a:lvl6pPr>
-            <a:lvl7pPr marL="2057400" indent="0">
-              <a:buNone/>
-              <a:defRPr sz="1200" b="1"/>
+            <a:lvl7pPr marL="2743200" indent="0">
+              <a:buNone/>
+              <a:defRPr sz="1600" b="1"/>
             </a:lvl7pPr>
-            <a:lvl8pPr marL="2400300" indent="0">
-              <a:buNone/>
-              <a:defRPr sz="1200" b="1"/>
+            <a:lvl8pPr marL="3200400" indent="0">
+              <a:buNone/>
+              <a:defRPr sz="1600" b="1"/>
             </a:lvl8pPr>
-            <a:lvl9pPr marL="2743200" indent="0">
-              <a:buNone/>
-              <a:defRPr sz="1200" b="1"/>
+            <a:lvl9pPr marL="3657600" indent="0">
+              <a:buNone/>
+              <a:defRPr sz="1600" b="1"/>
             </a:lvl9pPr>
           </a:lstStyle>
           <a:p>
@@ -1540,7 +1622,13 @@
       </p:sp>
       <p:sp>
         <p:nvSpPr>
-          <p:cNvPr id="4" name="Content Placeholder 3"/>
+          <p:cNvPr id="4" name="Content Placeholder 3">
+            <a:extLst>
+              <a:ext uri="{FF2B5EF4-FFF2-40B4-BE49-F238E27FC236}">
+                <a16:creationId xmlns:a16="http://schemas.microsoft.com/office/drawing/2014/main" id="{1886872A-71A6-010C-793A-218A13E3CCFC}"/>
+              </a:ext>
+            </a:extLst>
+          </p:cNvPr>
           <p:cNvSpPr>
             <a:spLocks noGrp="1"/>
           </p:cNvSpPr>
@@ -1550,41 +1638,13 @@
         </p:nvSpPr>
         <p:spPr>
           <a:xfrm>
-            <a:off x="457200" y="1631156"/>
-            <a:ext cx="4040188" cy="2963466"/>
+            <a:off x="839788" y="2505075"/>
+            <a:ext cx="5157787" cy="3684588"/>
           </a:xfrm>
         </p:spPr>
         <p:txBody>
           <a:bodyPr/>
-          <a:lstStyle>
-            <a:lvl1pPr>
-              <a:defRPr sz="1800"/>
-            </a:lvl1pPr>
-            <a:lvl2pPr>
-              <a:defRPr sz="1500"/>
-            </a:lvl2pPr>
-            <a:lvl3pPr>
-              <a:defRPr sz="1350"/>
-            </a:lvl3pPr>
-            <a:lvl4pPr>
-              <a:defRPr sz="1200"/>
-            </a:lvl4pPr>
-            <a:lvl5pPr>
-              <a:defRPr sz="1200"/>
-            </a:lvl5pPr>
-            <a:lvl6pPr>
-              <a:defRPr sz="1200"/>
-            </a:lvl6pPr>
-            <a:lvl7pPr>
-              <a:defRPr sz="1200"/>
-            </a:lvl7pPr>
-            <a:lvl8pPr>
-              <a:defRPr sz="1200"/>
-            </a:lvl8pPr>
-            <a:lvl9pPr>
-              <a:defRPr sz="1200"/>
-            </a:lvl9pPr>
-          </a:lstStyle>
+          <a:lstStyle/>
           <a:p>
             <a:pPr lvl="0"/>
             <a:r>
@@ -1624,7 +1684,13 @@
       </p:sp>
       <p:sp>
         <p:nvSpPr>
-          <p:cNvPr id="5" name="Text Placeholder 4"/>
+          <p:cNvPr id="5" name="Text Placeholder 4">
+            <a:extLst>
+              <a:ext uri="{FF2B5EF4-FFF2-40B4-BE49-F238E27FC236}">
+                <a16:creationId xmlns:a16="http://schemas.microsoft.com/office/drawing/2014/main" id="{3E723369-4221-2AAF-0FCA-13614AC9C2F1}"/>
+              </a:ext>
+            </a:extLst>
+          </p:cNvPr>
           <p:cNvSpPr>
             <a:spLocks noGrp="1"/>
           </p:cNvSpPr>
@@ -1634,8 +1700,8 @@
         </p:nvSpPr>
         <p:spPr>
           <a:xfrm>
-            <a:off x="4645026" y="1151335"/>
-            <a:ext cx="4041775" cy="479822"/>
+            <a:off x="6172200" y="1681163"/>
+            <a:ext cx="5183188" cy="823912"/>
           </a:xfrm>
         </p:spPr>
         <p:txBody>
@@ -1643,39 +1709,39 @@
           <a:lstStyle>
             <a:lvl1pPr marL="0" indent="0">
               <a:buNone/>
+              <a:defRPr sz="2400" b="1"/>
+            </a:lvl1pPr>
+            <a:lvl2pPr marL="457200" indent="0">
+              <a:buNone/>
+              <a:defRPr sz="2000" b="1"/>
+            </a:lvl2pPr>
+            <a:lvl3pPr marL="914400" indent="0">
+              <a:buNone/>
               <a:defRPr sz="1800" b="1"/>
-            </a:lvl1pPr>
-            <a:lvl2pPr marL="342900" indent="0">
-              <a:buNone/>
-              <a:defRPr sz="1500" b="1"/>
-            </a:lvl2pPr>
-            <a:lvl3pPr marL="685800" indent="0">
-              <a:buNone/>
-              <a:defRPr sz="1350" b="1"/>
             </a:lvl3pPr>
-            <a:lvl4pPr marL="1028700" indent="0">
-              <a:buNone/>
-              <a:defRPr sz="1200" b="1"/>
+            <a:lvl4pPr marL="1371600" indent="0">
+              <a:buNone/>
+              <a:defRPr sz="1600" b="1"/>
             </a:lvl4pPr>
-            <a:lvl5pPr marL="1371600" indent="0">
-              <a:buNone/>
-              <a:defRPr sz="1200" b="1"/>
+            <a:lvl5pPr marL="1828800" indent="0">
+              <a:buNone/>
+              <a:defRPr sz="1600" b="1"/>
             </a:lvl5pPr>
-            <a:lvl6pPr marL="1714500" indent="0">
-              <a:buNone/>
-              <a:defRPr sz="1200" b="1"/>
+            <a:lvl6pPr marL="2286000" indent="0">
+              <a:buNone/>
+              <a:defRPr sz="1600" b="1"/>
             </a:lvl6pPr>
-            <a:lvl7pPr marL="2057400" indent="0">
-              <a:buNone/>
-              <a:defRPr sz="1200" b="1"/>
+            <a:lvl7pPr marL="2743200" indent="0">
+              <a:buNone/>
+              <a:defRPr sz="1600" b="1"/>
             </a:lvl7pPr>
-            <a:lvl8pPr marL="2400300" indent="0">
-              <a:buNone/>
-              <a:defRPr sz="1200" b="1"/>
+            <a:lvl8pPr marL="3200400" indent="0">
+              <a:buNone/>
+              <a:defRPr sz="1600" b="1"/>
             </a:lvl8pPr>
-            <a:lvl9pPr marL="2743200" indent="0">
-              <a:buNone/>
-              <a:defRPr sz="1200" b="1"/>
+            <a:lvl9pPr marL="3657600" indent="0">
+              <a:buNone/>
+              <a:defRPr sz="1600" b="1"/>
             </a:lvl9pPr>
           </a:lstStyle>
           <a:p>
@@ -1689,7 +1755,13 @@
       </p:sp>
       <p:sp>
         <p:nvSpPr>
-          <p:cNvPr id="6" name="Content Placeholder 5"/>
+          <p:cNvPr id="6" name="Content Placeholder 5">
+            <a:extLst>
+              <a:ext uri="{FF2B5EF4-FFF2-40B4-BE49-F238E27FC236}">
+                <a16:creationId xmlns:a16="http://schemas.microsoft.com/office/drawing/2014/main" id="{1A7AE0DD-9BF5-5FA5-6AA2-66837F36644B}"/>
+              </a:ext>
+            </a:extLst>
+          </p:cNvPr>
           <p:cNvSpPr>
             <a:spLocks noGrp="1"/>
           </p:cNvSpPr>
@@ -1699,41 +1771,13 @@
         </p:nvSpPr>
         <p:spPr>
           <a:xfrm>
-            <a:off x="4645026" y="1631156"/>
-            <a:ext cx="4041775" cy="2963466"/>
+            <a:off x="6172200" y="2505075"/>
+            <a:ext cx="5183188" cy="3684588"/>
           </a:xfrm>
         </p:spPr>
         <p:txBody>
           <a:bodyPr/>
-          <a:lstStyle>
-            <a:lvl1pPr>
-              <a:defRPr sz="1800"/>
-            </a:lvl1pPr>
-            <a:lvl2pPr>
-              <a:defRPr sz="1500"/>
-            </a:lvl2pPr>
-            <a:lvl3pPr>
-              <a:defRPr sz="1350"/>
-            </a:lvl3pPr>
-            <a:lvl4pPr>
-              <a:defRPr sz="1200"/>
-            </a:lvl4pPr>
-            <a:lvl5pPr>
-              <a:defRPr sz="1200"/>
-            </a:lvl5pPr>
-            <a:lvl6pPr>
-              <a:defRPr sz="1200"/>
-            </a:lvl6pPr>
-            <a:lvl7pPr>
-              <a:defRPr sz="1200"/>
-            </a:lvl7pPr>
-            <a:lvl8pPr>
-              <a:defRPr sz="1200"/>
-            </a:lvl8pPr>
-            <a:lvl9pPr>
-              <a:defRPr sz="1200"/>
-            </a:lvl9pPr>
-          </a:lstStyle>
+          <a:lstStyle/>
           <a:p>
             <a:pPr lvl="0"/>
             <a:r>
@@ -1773,7 +1817,13 @@
       </p:sp>
       <p:sp>
         <p:nvSpPr>
-          <p:cNvPr id="7" name="Date Placeholder 6"/>
+          <p:cNvPr id="7" name="Date Placeholder 6">
+            <a:extLst>
+              <a:ext uri="{FF2B5EF4-FFF2-40B4-BE49-F238E27FC236}">
+                <a16:creationId xmlns:a16="http://schemas.microsoft.com/office/drawing/2014/main" id="{76C23D32-DAE6-D23D-BDF6-B284655CEEA0}"/>
+              </a:ext>
+            </a:extLst>
+          </p:cNvPr>
           <p:cNvSpPr>
             <a:spLocks noGrp="1"/>
           </p:cNvSpPr>
@@ -1786,9 +1836,9 @@
           <a:bodyPr/>
           <a:lstStyle/>
           <a:p>
-            <a:fld id="{241EB5C9-1307-BA42-ABA2-0BC069CD8E7F}" type="datetimeFigureOut">
+            <a:fld id="{F4FC6662-9247-444B-ADF5-BDC4693D4AA0}" type="datetimeFigureOut">
               <a:rPr lang="en-US" smtClean="0"/>
-              <a:t>1/2/22</a:t>
+              <a:t>4/22/2024</a:t>
             </a:fld>
             <a:endParaRPr lang="en-US"/>
           </a:p>
@@ -1796,7 +1846,13 @@
       </p:sp>
       <p:sp>
         <p:nvSpPr>
-          <p:cNvPr id="8" name="Footer Placeholder 7"/>
+          <p:cNvPr id="8" name="Footer Placeholder 7">
+            <a:extLst>
+              <a:ext uri="{FF2B5EF4-FFF2-40B4-BE49-F238E27FC236}">
+                <a16:creationId xmlns:a16="http://schemas.microsoft.com/office/drawing/2014/main" id="{B6489EE6-F480-1950-279B-277AA1520461}"/>
+              </a:ext>
+            </a:extLst>
+          </p:cNvPr>
           <p:cNvSpPr>
             <a:spLocks noGrp="1"/>
           </p:cNvSpPr>
@@ -1815,7 +1871,13 @@
       </p:sp>
       <p:sp>
         <p:nvSpPr>
-          <p:cNvPr id="9" name="Slide Number Placeholder 8"/>
+          <p:cNvPr id="9" name="Slide Number Placeholder 8">
+            <a:extLst>
+              <a:ext uri="{FF2B5EF4-FFF2-40B4-BE49-F238E27FC236}">
+                <a16:creationId xmlns:a16="http://schemas.microsoft.com/office/drawing/2014/main" id="{5A2C7707-3BB2-A740-1293-01A650448BD6}"/>
+              </a:ext>
+            </a:extLst>
+          </p:cNvPr>
           <p:cNvSpPr>
             <a:spLocks noGrp="1"/>
           </p:cNvSpPr>
@@ -1828,7 +1890,7 @@
           <a:bodyPr/>
           <a:lstStyle/>
           <a:p>
-            <a:fld id="{C5EF2332-01BF-834F-8236-50238282D533}" type="slidenum">
+            <a:fld id="{87F339C6-D84C-874E-B4F5-90CEABF287B1}" type="slidenum">
               <a:rPr lang="en-US" smtClean="0"/>
               <a:t>‹#›</a:t>
             </a:fld>
@@ -1839,7 +1901,7 @@
     </p:spTree>
     <p:extLst>
       <p:ext uri="{BB962C8B-B14F-4D97-AF65-F5344CB8AC3E}">
-        <p14:creationId xmlns:p14="http://schemas.microsoft.com/office/powerpoint/2010/main" val="2535793967"/>
+        <p14:creationId xmlns:p14="http://schemas.microsoft.com/office/powerpoint/2010/main" val="792354096"/>
       </p:ext>
     </p:extLst>
   </p:cSld>
@@ -1868,7 +1930,13 @@
       </p:grpSpPr>
       <p:sp>
         <p:nvSpPr>
-          <p:cNvPr id="2" name="Title 1"/>
+          <p:cNvPr id="2" name="Title 1">
+            <a:extLst>
+              <a:ext uri="{FF2B5EF4-FFF2-40B4-BE49-F238E27FC236}">
+                <a16:creationId xmlns:a16="http://schemas.microsoft.com/office/drawing/2014/main" id="{300C31D0-7786-6F0C-7F42-47ED4C0A603A}"/>
+              </a:ext>
+            </a:extLst>
+          </p:cNvPr>
           <p:cNvSpPr>
             <a:spLocks noGrp="1"/>
           </p:cNvSpPr>
@@ -1890,7 +1958,13 @@
       </p:sp>
       <p:sp>
         <p:nvSpPr>
-          <p:cNvPr id="3" name="Date Placeholder 2"/>
+          <p:cNvPr id="3" name="Date Placeholder 2">
+            <a:extLst>
+              <a:ext uri="{FF2B5EF4-FFF2-40B4-BE49-F238E27FC236}">
+                <a16:creationId xmlns:a16="http://schemas.microsoft.com/office/drawing/2014/main" id="{3B02AB3A-D1A1-1F6B-3CAE-D7E6B2A3495E}"/>
+              </a:ext>
+            </a:extLst>
+          </p:cNvPr>
           <p:cNvSpPr>
             <a:spLocks noGrp="1"/>
           </p:cNvSpPr>
@@ -1903,9 +1977,9 @@
           <a:bodyPr/>
           <a:lstStyle/>
           <a:p>
-            <a:fld id="{241EB5C9-1307-BA42-ABA2-0BC069CD8E7F}" type="datetimeFigureOut">
+            <a:fld id="{F4FC6662-9247-444B-ADF5-BDC4693D4AA0}" type="datetimeFigureOut">
               <a:rPr lang="en-US" smtClean="0"/>
-              <a:t>1/2/22</a:t>
+              <a:t>4/22/2024</a:t>
             </a:fld>
             <a:endParaRPr lang="en-US"/>
           </a:p>
@@ -1913,7 +1987,13 @@
       </p:sp>
       <p:sp>
         <p:nvSpPr>
-          <p:cNvPr id="4" name="Footer Placeholder 3"/>
+          <p:cNvPr id="4" name="Footer Placeholder 3">
+            <a:extLst>
+              <a:ext uri="{FF2B5EF4-FFF2-40B4-BE49-F238E27FC236}">
+                <a16:creationId xmlns:a16="http://schemas.microsoft.com/office/drawing/2014/main" id="{6DAA5F2E-60B3-F38B-EEE5-ED1796D2541E}"/>
+              </a:ext>
+            </a:extLst>
+          </p:cNvPr>
           <p:cNvSpPr>
             <a:spLocks noGrp="1"/>
           </p:cNvSpPr>
@@ -1932,7 +2012,13 @@
       </p:sp>
       <p:sp>
         <p:nvSpPr>
-          <p:cNvPr id="5" name="Slide Number Placeholder 4"/>
+          <p:cNvPr id="5" name="Slide Number Placeholder 4">
+            <a:extLst>
+              <a:ext uri="{FF2B5EF4-FFF2-40B4-BE49-F238E27FC236}">
+                <a16:creationId xmlns:a16="http://schemas.microsoft.com/office/drawing/2014/main" id="{B6F257F6-4788-FE02-F585-9A27B59A14B0}"/>
+              </a:ext>
+            </a:extLst>
+          </p:cNvPr>
           <p:cNvSpPr>
             <a:spLocks noGrp="1"/>
           </p:cNvSpPr>
@@ -1945,7 +2031,7 @@
           <a:bodyPr/>
           <a:lstStyle/>
           <a:p>
-            <a:fld id="{C5EF2332-01BF-834F-8236-50238282D533}" type="slidenum">
+            <a:fld id="{87F339C6-D84C-874E-B4F5-90CEABF287B1}" type="slidenum">
               <a:rPr lang="en-US" smtClean="0"/>
               <a:t>‹#›</a:t>
             </a:fld>
@@ -1956,7 +2042,7 @@
     </p:spTree>
     <p:extLst>
       <p:ext uri="{BB962C8B-B14F-4D97-AF65-F5344CB8AC3E}">
-        <p14:creationId xmlns:p14="http://schemas.microsoft.com/office/powerpoint/2010/main" val="3472721253"/>
+        <p14:creationId xmlns:p14="http://schemas.microsoft.com/office/powerpoint/2010/main" val="3919555321"/>
       </p:ext>
     </p:extLst>
   </p:cSld>
@@ -1985,7 +2071,13 @@
       </p:grpSpPr>
       <p:sp>
         <p:nvSpPr>
-          <p:cNvPr id="2" name="Date Placeholder 1"/>
+          <p:cNvPr id="2" name="Date Placeholder 1">
+            <a:extLst>
+              <a:ext uri="{FF2B5EF4-FFF2-40B4-BE49-F238E27FC236}">
+                <a16:creationId xmlns:a16="http://schemas.microsoft.com/office/drawing/2014/main" id="{C33DC568-0943-D43D-2918-A69B608F6D75}"/>
+              </a:ext>
+            </a:extLst>
+          </p:cNvPr>
           <p:cNvSpPr>
             <a:spLocks noGrp="1"/>
           </p:cNvSpPr>
@@ -1998,9 +2090,9 @@
           <a:bodyPr/>
           <a:lstStyle/>
           <a:p>
-            <a:fld id="{241EB5C9-1307-BA42-ABA2-0BC069CD8E7F}" type="datetimeFigureOut">
+            <a:fld id="{F4FC6662-9247-444B-ADF5-BDC4693D4AA0}" type="datetimeFigureOut">
               <a:rPr lang="en-US" smtClean="0"/>
-              <a:t>1/2/22</a:t>
+              <a:t>4/22/2024</a:t>
             </a:fld>
             <a:endParaRPr lang="en-US"/>
           </a:p>
@@ -2008,7 +2100,13 @@
       </p:sp>
       <p:sp>
         <p:nvSpPr>
-          <p:cNvPr id="3" name="Footer Placeholder 2"/>
+          <p:cNvPr id="3" name="Footer Placeholder 2">
+            <a:extLst>
+              <a:ext uri="{FF2B5EF4-FFF2-40B4-BE49-F238E27FC236}">
+                <a16:creationId xmlns:a16="http://schemas.microsoft.com/office/drawing/2014/main" id="{B764EC3A-9234-31A2-0C48-87DCD76D7581}"/>
+              </a:ext>
+            </a:extLst>
+          </p:cNvPr>
           <p:cNvSpPr>
             <a:spLocks noGrp="1"/>
           </p:cNvSpPr>
@@ -2027,7 +2125,13 @@
       </p:sp>
       <p:sp>
         <p:nvSpPr>
-          <p:cNvPr id="4" name="Slide Number Placeholder 3"/>
+          <p:cNvPr id="4" name="Slide Number Placeholder 3">
+            <a:extLst>
+              <a:ext uri="{FF2B5EF4-FFF2-40B4-BE49-F238E27FC236}">
+                <a16:creationId xmlns:a16="http://schemas.microsoft.com/office/drawing/2014/main" id="{F392FC79-7B91-0A51-F343-0E78F81F62F3}"/>
+              </a:ext>
+            </a:extLst>
+          </p:cNvPr>
           <p:cNvSpPr>
             <a:spLocks noGrp="1"/>
           </p:cNvSpPr>
@@ -2040,7 +2144,7 @@
           <a:bodyPr/>
           <a:lstStyle/>
           <a:p>
-            <a:fld id="{C5EF2332-01BF-834F-8236-50238282D533}" type="slidenum">
+            <a:fld id="{87F339C6-D84C-874E-B4F5-90CEABF287B1}" type="slidenum">
               <a:rPr lang="en-US" smtClean="0"/>
               <a:t>‹#›</a:t>
             </a:fld>
@@ -2051,7 +2155,7 @@
     </p:spTree>
     <p:extLst>
       <p:ext uri="{BB962C8B-B14F-4D97-AF65-F5344CB8AC3E}">
-        <p14:creationId xmlns:p14="http://schemas.microsoft.com/office/powerpoint/2010/main" val="2130901097"/>
+        <p14:creationId xmlns:p14="http://schemas.microsoft.com/office/powerpoint/2010/main" val="2686450705"/>
       </p:ext>
     </p:extLst>
   </p:cSld>
@@ -2080,7 +2184,13 @@
       </p:grpSpPr>
       <p:sp>
         <p:nvSpPr>
-          <p:cNvPr id="2" name="Title 1"/>
+          <p:cNvPr id="2" name="Title 1">
+            <a:extLst>
+              <a:ext uri="{FF2B5EF4-FFF2-40B4-BE49-F238E27FC236}">
+                <a16:creationId xmlns:a16="http://schemas.microsoft.com/office/drawing/2014/main" id="{A8C3F926-61C2-35D0-1CBA-030D3685CD1C}"/>
+              </a:ext>
+            </a:extLst>
+          </p:cNvPr>
           <p:cNvSpPr>
             <a:spLocks noGrp="1"/>
           </p:cNvSpPr>
@@ -2090,15 +2200,15 @@
         </p:nvSpPr>
         <p:spPr>
           <a:xfrm>
-            <a:off x="457201" y="204787"/>
-            <a:ext cx="3008313" cy="871538"/>
+            <a:off x="839788" y="457200"/>
+            <a:ext cx="3932237" cy="1600200"/>
           </a:xfrm>
         </p:spPr>
         <p:txBody>
           <a:bodyPr anchor="b"/>
           <a:lstStyle>
-            <a:lvl1pPr algn="l">
-              <a:defRPr sz="1500" b="1"/>
+            <a:lvl1pPr>
+              <a:defRPr sz="3200"/>
             </a:lvl1pPr>
           </a:lstStyle>
           <a:p>
@@ -2111,7 +2221,13 @@
       </p:sp>
       <p:sp>
         <p:nvSpPr>
-          <p:cNvPr id="3" name="Content Placeholder 2"/>
+          <p:cNvPr id="3" name="Content Placeholder 2">
+            <a:extLst>
+              <a:ext uri="{FF2B5EF4-FFF2-40B4-BE49-F238E27FC236}">
+                <a16:creationId xmlns:a16="http://schemas.microsoft.com/office/drawing/2014/main" id="{BED84061-6D24-1225-348B-B5F99466DF44}"/>
+              </a:ext>
+            </a:extLst>
+          </p:cNvPr>
           <p:cNvSpPr>
             <a:spLocks noGrp="1"/>
           </p:cNvSpPr>
@@ -2121,39 +2237,39 @@
         </p:nvSpPr>
         <p:spPr>
           <a:xfrm>
-            <a:off x="3575050" y="204788"/>
-            <a:ext cx="5111750" cy="4389835"/>
+            <a:off x="5183188" y="987425"/>
+            <a:ext cx="6172200" cy="4873625"/>
           </a:xfrm>
         </p:spPr>
         <p:txBody>
           <a:bodyPr/>
           <a:lstStyle>
             <a:lvl1pPr>
-              <a:defRPr sz="2400"/>
+              <a:defRPr sz="3200"/>
             </a:lvl1pPr>
             <a:lvl2pPr>
-              <a:defRPr sz="2100"/>
+              <a:defRPr sz="2800"/>
             </a:lvl2pPr>
             <a:lvl3pPr>
-              <a:defRPr sz="1800"/>
+              <a:defRPr sz="2400"/>
             </a:lvl3pPr>
             <a:lvl4pPr>
-              <a:defRPr sz="1500"/>
+              <a:defRPr sz="2000"/>
             </a:lvl4pPr>
             <a:lvl5pPr>
-              <a:defRPr sz="1500"/>
+              <a:defRPr sz="2000"/>
             </a:lvl5pPr>
             <a:lvl6pPr>
-              <a:defRPr sz="1500"/>
+              <a:defRPr sz="2000"/>
             </a:lvl6pPr>
             <a:lvl7pPr>
-              <a:defRPr sz="1500"/>
+              <a:defRPr sz="2000"/>
             </a:lvl7pPr>
             <a:lvl8pPr>
-              <a:defRPr sz="1500"/>
+              <a:defRPr sz="2000"/>
             </a:lvl8pPr>
             <a:lvl9pPr>
-              <a:defRPr sz="1500"/>
+              <a:defRPr sz="2000"/>
             </a:lvl9pPr>
           </a:lstStyle>
           <a:p>
@@ -2195,7 +2311,13 @@
       </p:sp>
       <p:sp>
         <p:nvSpPr>
-          <p:cNvPr id="4" name="Text Placeholder 3"/>
+          <p:cNvPr id="4" name="Text Placeholder 3">
+            <a:extLst>
+              <a:ext uri="{FF2B5EF4-FFF2-40B4-BE49-F238E27FC236}">
+                <a16:creationId xmlns:a16="http://schemas.microsoft.com/office/drawing/2014/main" id="{45A4F87E-EBFC-7789-E24D-E57D41992466}"/>
+              </a:ext>
+            </a:extLst>
+          </p:cNvPr>
           <p:cNvSpPr>
             <a:spLocks noGrp="1"/>
           </p:cNvSpPr>
@@ -2205,8 +2327,8 @@
         </p:nvSpPr>
         <p:spPr>
           <a:xfrm>
-            <a:off x="457201" y="1076326"/>
-            <a:ext cx="3008313" cy="3518297"/>
+            <a:off x="839788" y="2057400"/>
+            <a:ext cx="3932237" cy="3811588"/>
           </a:xfrm>
         </p:spPr>
         <p:txBody>
@@ -2214,39 +2336,39 @@
           <a:lstStyle>
             <a:lvl1pPr marL="0" indent="0">
               <a:buNone/>
-              <a:defRPr sz="1050"/>
+              <a:defRPr sz="1600"/>
             </a:lvl1pPr>
-            <a:lvl2pPr marL="342900" indent="0">
-              <a:buNone/>
-              <a:defRPr sz="900"/>
+            <a:lvl2pPr marL="457200" indent="0">
+              <a:buNone/>
+              <a:defRPr sz="1400"/>
             </a:lvl2pPr>
-            <a:lvl3pPr marL="685800" indent="0">
-              <a:buNone/>
-              <a:defRPr sz="750"/>
+            <a:lvl3pPr marL="914400" indent="0">
+              <a:buNone/>
+              <a:defRPr sz="1200"/>
             </a:lvl3pPr>
-            <a:lvl4pPr marL="1028700" indent="0">
-              <a:buNone/>
-              <a:defRPr sz="675"/>
+            <a:lvl4pPr marL="1371600" indent="0">
+              <a:buNone/>
+              <a:defRPr sz="1000"/>
             </a:lvl4pPr>
-            <a:lvl5pPr marL="1371600" indent="0">
-              <a:buNone/>
-              <a:defRPr sz="675"/>
+            <a:lvl5pPr marL="1828800" indent="0">
+              <a:buNone/>
+              <a:defRPr sz="1000"/>
             </a:lvl5pPr>
-            <a:lvl6pPr marL="1714500" indent="0">
-              <a:buNone/>
-              <a:defRPr sz="675"/>
+            <a:lvl6pPr marL="2286000" indent="0">
+              <a:buNone/>
+              <a:defRPr sz="1000"/>
             </a:lvl6pPr>
-            <a:lvl7pPr marL="2057400" indent="0">
-              <a:buNone/>
-              <a:defRPr sz="675"/>
+            <a:lvl7pPr marL="2743200" indent="0">
+              <a:buNone/>
+              <a:defRPr sz="1000"/>
             </a:lvl7pPr>
-            <a:lvl8pPr marL="2400300" indent="0">
-              <a:buNone/>
-              <a:defRPr sz="675"/>
+            <a:lvl8pPr marL="3200400" indent="0">
+              <a:buNone/>
+              <a:defRPr sz="1000"/>
             </a:lvl8pPr>
-            <a:lvl9pPr marL="2743200" indent="0">
-              <a:buNone/>
-              <a:defRPr sz="675"/>
+            <a:lvl9pPr marL="3657600" indent="0">
+              <a:buNone/>
+              <a:defRPr sz="1000"/>
             </a:lvl9pPr>
           </a:lstStyle>
           <a:p>
@@ -2260,7 +2382,13 @@
       </p:sp>
       <p:sp>
         <p:nvSpPr>
-          <p:cNvPr id="5" name="Date Placeholder 4"/>
+          <p:cNvPr id="5" name="Date Placeholder 4">
+            <a:extLst>
+              <a:ext uri="{FF2B5EF4-FFF2-40B4-BE49-F238E27FC236}">
+                <a16:creationId xmlns:a16="http://schemas.microsoft.com/office/drawing/2014/main" id="{D738EDB3-4BCD-9A9A-939B-3147C0101F07}"/>
+              </a:ext>
+            </a:extLst>
+          </p:cNvPr>
           <p:cNvSpPr>
             <a:spLocks noGrp="1"/>
           </p:cNvSpPr>
@@ -2273,9 +2401,9 @@
           <a:bodyPr/>
           <a:lstStyle/>
           <a:p>
-            <a:fld id="{241EB5C9-1307-BA42-ABA2-0BC069CD8E7F}" type="datetimeFigureOut">
+            <a:fld id="{F4FC6662-9247-444B-ADF5-BDC4693D4AA0}" type="datetimeFigureOut">
               <a:rPr lang="en-US" smtClean="0"/>
-              <a:t>1/2/22</a:t>
+              <a:t>4/22/2024</a:t>
             </a:fld>
             <a:endParaRPr lang="en-US"/>
           </a:p>
@@ -2283,7 +2411,13 @@
       </p:sp>
       <p:sp>
         <p:nvSpPr>
-          <p:cNvPr id="6" name="Footer Placeholder 5"/>
+          <p:cNvPr id="6" name="Footer Placeholder 5">
+            <a:extLst>
+              <a:ext uri="{FF2B5EF4-FFF2-40B4-BE49-F238E27FC236}">
+                <a16:creationId xmlns:a16="http://schemas.microsoft.com/office/drawing/2014/main" id="{DE3DE6FC-F60E-4B35-AE89-8DDBD9C204DA}"/>
+              </a:ext>
+            </a:extLst>
+          </p:cNvPr>
           <p:cNvSpPr>
             <a:spLocks noGrp="1"/>
           </p:cNvSpPr>
@@ -2302,7 +2436,13 @@
       </p:sp>
       <p:sp>
         <p:nvSpPr>
-          <p:cNvPr id="7" name="Slide Number Placeholder 6"/>
+          <p:cNvPr id="7" name="Slide Number Placeholder 6">
+            <a:extLst>
+              <a:ext uri="{FF2B5EF4-FFF2-40B4-BE49-F238E27FC236}">
+                <a16:creationId xmlns:a16="http://schemas.microsoft.com/office/drawing/2014/main" id="{006B2CDF-913D-2977-3B1C-48BCB5F7A137}"/>
+              </a:ext>
+            </a:extLst>
+          </p:cNvPr>
           <p:cNvSpPr>
             <a:spLocks noGrp="1"/>
           </p:cNvSpPr>
@@ -2315,7 +2455,7 @@
           <a:bodyPr/>
           <a:lstStyle/>
           <a:p>
-            <a:fld id="{C5EF2332-01BF-834F-8236-50238282D533}" type="slidenum">
+            <a:fld id="{87F339C6-D84C-874E-B4F5-90CEABF287B1}" type="slidenum">
               <a:rPr lang="en-US" smtClean="0"/>
               <a:t>‹#›</a:t>
             </a:fld>
@@ -2326,7 +2466,7 @@
     </p:spTree>
     <p:extLst>
       <p:ext uri="{BB962C8B-B14F-4D97-AF65-F5344CB8AC3E}">
-        <p14:creationId xmlns:p14="http://schemas.microsoft.com/office/powerpoint/2010/main" val="3540895647"/>
+        <p14:creationId xmlns:p14="http://schemas.microsoft.com/office/powerpoint/2010/main" val="2831761515"/>
       </p:ext>
     </p:extLst>
   </p:cSld>
@@ -2355,7 +2495,13 @@
       </p:grpSpPr>
       <p:sp>
         <p:nvSpPr>
-          <p:cNvPr id="2" name="Title 1"/>
+          <p:cNvPr id="2" name="Title 1">
+            <a:extLst>
+              <a:ext uri="{FF2B5EF4-FFF2-40B4-BE49-F238E27FC236}">
+                <a16:creationId xmlns:a16="http://schemas.microsoft.com/office/drawing/2014/main" id="{72100C90-B2CA-1AE7-C0B0-5199AD6A3719}"/>
+              </a:ext>
+            </a:extLst>
+          </p:cNvPr>
           <p:cNvSpPr>
             <a:spLocks noGrp="1"/>
           </p:cNvSpPr>
@@ -2365,15 +2511,15 @@
         </p:nvSpPr>
         <p:spPr>
           <a:xfrm>
-            <a:off x="1792288" y="3600450"/>
-            <a:ext cx="5486400" cy="425054"/>
+            <a:off x="839788" y="457200"/>
+            <a:ext cx="3932237" cy="1600200"/>
           </a:xfrm>
         </p:spPr>
         <p:txBody>
           <a:bodyPr anchor="b"/>
           <a:lstStyle>
-            <a:lvl1pPr algn="l">
-              <a:defRPr sz="1500" b="1"/>
+            <a:lvl1pPr>
+              <a:defRPr sz="3200"/>
             </a:lvl1pPr>
           </a:lstStyle>
           <a:p>
@@ -2386,7 +2532,13 @@
       </p:sp>
       <p:sp>
         <p:nvSpPr>
-          <p:cNvPr id="3" name="Picture Placeholder 2"/>
+          <p:cNvPr id="3" name="Picture Placeholder 2">
+            <a:extLst>
+              <a:ext uri="{FF2B5EF4-FFF2-40B4-BE49-F238E27FC236}">
+                <a16:creationId xmlns:a16="http://schemas.microsoft.com/office/drawing/2014/main" id="{112CC5BF-527A-6E0C-A9C8-2D52DC6B3507}"/>
+              </a:ext>
+            </a:extLst>
+          </p:cNvPr>
           <p:cNvSpPr>
             <a:spLocks noGrp="1"/>
           </p:cNvSpPr>
@@ -2396,8 +2548,8 @@
         </p:nvSpPr>
         <p:spPr>
           <a:xfrm>
-            <a:off x="1792288" y="459581"/>
-            <a:ext cx="5486400" cy="3086100"/>
+            <a:off x="5183188" y="987425"/>
+            <a:ext cx="6172200" cy="4873625"/>
           </a:xfrm>
         </p:spPr>
         <p:txBody>
@@ -2405,39 +2557,39 @@
           <a:lstStyle>
             <a:lvl1pPr marL="0" indent="0">
               <a:buNone/>
+              <a:defRPr sz="3200"/>
+            </a:lvl1pPr>
+            <a:lvl2pPr marL="457200" indent="0">
+              <a:buNone/>
+              <a:defRPr sz="2800"/>
+            </a:lvl2pPr>
+            <a:lvl3pPr marL="914400" indent="0">
+              <a:buNone/>
               <a:defRPr sz="2400"/>
-            </a:lvl1pPr>
-            <a:lvl2pPr marL="342900" indent="0">
-              <a:buNone/>
-              <a:defRPr sz="2100"/>
-            </a:lvl2pPr>
-            <a:lvl3pPr marL="685800" indent="0">
-              <a:buNone/>
-              <a:defRPr sz="1800"/>
             </a:lvl3pPr>
-            <a:lvl4pPr marL="1028700" indent="0">
-              <a:buNone/>
-              <a:defRPr sz="1500"/>
+            <a:lvl4pPr marL="1371600" indent="0">
+              <a:buNone/>
+              <a:defRPr sz="2000"/>
             </a:lvl4pPr>
-            <a:lvl5pPr marL="1371600" indent="0">
-              <a:buNone/>
-              <a:defRPr sz="1500"/>
+            <a:lvl5pPr marL="1828800" indent="0">
+              <a:buNone/>
+              <a:defRPr sz="2000"/>
             </a:lvl5pPr>
-            <a:lvl6pPr marL="1714500" indent="0">
-              <a:buNone/>
-              <a:defRPr sz="1500"/>
+            <a:lvl6pPr marL="2286000" indent="0">
+              <a:buNone/>
+              <a:defRPr sz="2000"/>
             </a:lvl6pPr>
-            <a:lvl7pPr marL="2057400" indent="0">
-              <a:buNone/>
-              <a:defRPr sz="1500"/>
+            <a:lvl7pPr marL="2743200" indent="0">
+              <a:buNone/>
+              <a:defRPr sz="2000"/>
             </a:lvl7pPr>
-            <a:lvl8pPr marL="2400300" indent="0">
-              <a:buNone/>
-              <a:defRPr sz="1500"/>
+            <a:lvl8pPr marL="3200400" indent="0">
+              <a:buNone/>
+              <a:defRPr sz="2000"/>
             </a:lvl8pPr>
-            <a:lvl9pPr marL="2743200" indent="0">
-              <a:buNone/>
-              <a:defRPr sz="1500"/>
+            <a:lvl9pPr marL="3657600" indent="0">
+              <a:buNone/>
+              <a:defRPr sz="2000"/>
             </a:lvl9pPr>
           </a:lstStyle>
           <a:p>
@@ -2447,7 +2599,13 @@
       </p:sp>
       <p:sp>
         <p:nvSpPr>
-          <p:cNvPr id="4" name="Text Placeholder 3"/>
+          <p:cNvPr id="4" name="Text Placeholder 3">
+            <a:extLst>
+              <a:ext uri="{FF2B5EF4-FFF2-40B4-BE49-F238E27FC236}">
+                <a16:creationId xmlns:a16="http://schemas.microsoft.com/office/drawing/2014/main" id="{24473AB1-C88A-6906-60DC-F791A92A7061}"/>
+              </a:ext>
+            </a:extLst>
+          </p:cNvPr>
           <p:cNvSpPr>
             <a:spLocks noGrp="1"/>
           </p:cNvSpPr>
@@ -2457,8 +2615,8 @@
         </p:nvSpPr>
         <p:spPr>
           <a:xfrm>
-            <a:off x="1792288" y="4025503"/>
-            <a:ext cx="5486400" cy="603647"/>
+            <a:off x="839788" y="2057400"/>
+            <a:ext cx="3932237" cy="3811588"/>
           </a:xfrm>
         </p:spPr>
         <p:txBody>
@@ -2466,39 +2624,39 @@
           <a:lstStyle>
             <a:lvl1pPr marL="0" indent="0">
               <a:buNone/>
-              <a:defRPr sz="1050"/>
+              <a:defRPr sz="1600"/>
             </a:lvl1pPr>
-            <a:lvl2pPr marL="342900" indent="0">
-              <a:buNone/>
-              <a:defRPr sz="900"/>
+            <a:lvl2pPr marL="457200" indent="0">
+              <a:buNone/>
+              <a:defRPr sz="1400"/>
             </a:lvl2pPr>
-            <a:lvl3pPr marL="685800" indent="0">
-              <a:buNone/>
-              <a:defRPr sz="750"/>
+            <a:lvl3pPr marL="914400" indent="0">
+              <a:buNone/>
+              <a:defRPr sz="1200"/>
             </a:lvl3pPr>
-            <a:lvl4pPr marL="1028700" indent="0">
-              <a:buNone/>
-              <a:defRPr sz="675"/>
+            <a:lvl4pPr marL="1371600" indent="0">
+              <a:buNone/>
+              <a:defRPr sz="1000"/>
             </a:lvl4pPr>
-            <a:lvl5pPr marL="1371600" indent="0">
-              <a:buNone/>
-              <a:defRPr sz="675"/>
+            <a:lvl5pPr marL="1828800" indent="0">
+              <a:buNone/>
+              <a:defRPr sz="1000"/>
             </a:lvl5pPr>
-            <a:lvl6pPr marL="1714500" indent="0">
-              <a:buNone/>
-              <a:defRPr sz="675"/>
+            <a:lvl6pPr marL="2286000" indent="0">
+              <a:buNone/>
+              <a:defRPr sz="1000"/>
             </a:lvl6pPr>
-            <a:lvl7pPr marL="2057400" indent="0">
-              <a:buNone/>
-              <a:defRPr sz="675"/>
+            <a:lvl7pPr marL="2743200" indent="0">
+              <a:buNone/>
+              <a:defRPr sz="1000"/>
             </a:lvl7pPr>
-            <a:lvl8pPr marL="2400300" indent="0">
-              <a:buNone/>
-              <a:defRPr sz="675"/>
+            <a:lvl8pPr marL="3200400" indent="0">
+              <a:buNone/>
+              <a:defRPr sz="1000"/>
             </a:lvl8pPr>
-            <a:lvl9pPr marL="2743200" indent="0">
-              <a:buNone/>
-              <a:defRPr sz="675"/>
+            <a:lvl9pPr marL="3657600" indent="0">
+              <a:buNone/>
+              <a:defRPr sz="1000"/>
             </a:lvl9pPr>
           </a:lstStyle>
           <a:p>
@@ -2512,7 +2670,13 @@
       </p:sp>
       <p:sp>
         <p:nvSpPr>
-          <p:cNvPr id="5" name="Date Placeholder 4"/>
+          <p:cNvPr id="5" name="Date Placeholder 4">
+            <a:extLst>
+              <a:ext uri="{FF2B5EF4-FFF2-40B4-BE49-F238E27FC236}">
+                <a16:creationId xmlns:a16="http://schemas.microsoft.com/office/drawing/2014/main" id="{EEB80915-19FE-78A1-B685-7621868979D2}"/>
+              </a:ext>
+            </a:extLst>
+          </p:cNvPr>
           <p:cNvSpPr>
             <a:spLocks noGrp="1"/>
           </p:cNvSpPr>
@@ -2525,9 +2689,9 @@
           <a:bodyPr/>
           <a:lstStyle/>
           <a:p>
-            <a:fld id="{241EB5C9-1307-BA42-ABA2-0BC069CD8E7F}" type="datetimeFigureOut">
+            <a:fld id="{F4FC6662-9247-444B-ADF5-BDC4693D4AA0}" type="datetimeFigureOut">
               <a:rPr lang="en-US" smtClean="0"/>
-              <a:t>1/2/22</a:t>
+              <a:t>4/22/2024</a:t>
             </a:fld>
             <a:endParaRPr lang="en-US"/>
           </a:p>
@@ -2535,7 +2699,13 @@
       </p:sp>
       <p:sp>
         <p:nvSpPr>
-          <p:cNvPr id="6" name="Footer Placeholder 5"/>
+          <p:cNvPr id="6" name="Footer Placeholder 5">
+            <a:extLst>
+              <a:ext uri="{FF2B5EF4-FFF2-40B4-BE49-F238E27FC236}">
+                <a16:creationId xmlns:a16="http://schemas.microsoft.com/office/drawing/2014/main" id="{C135E525-F130-38B4-8E66-3A5CAA9073BB}"/>
+              </a:ext>
+            </a:extLst>
+          </p:cNvPr>
           <p:cNvSpPr>
             <a:spLocks noGrp="1"/>
           </p:cNvSpPr>
@@ -2554,7 +2724,13 @@
       </p:sp>
       <p:sp>
         <p:nvSpPr>
-          <p:cNvPr id="7" name="Slide Number Placeholder 6"/>
+          <p:cNvPr id="7" name="Slide Number Placeholder 6">
+            <a:extLst>
+              <a:ext uri="{FF2B5EF4-FFF2-40B4-BE49-F238E27FC236}">
+                <a16:creationId xmlns:a16="http://schemas.microsoft.com/office/drawing/2014/main" id="{44F86E31-83A5-21C6-82AA-AD51DD97A641}"/>
+              </a:ext>
+            </a:extLst>
+          </p:cNvPr>
           <p:cNvSpPr>
             <a:spLocks noGrp="1"/>
           </p:cNvSpPr>
@@ -2567,7 +2743,7 @@
           <a:bodyPr/>
           <a:lstStyle/>
           <a:p>
-            <a:fld id="{C5EF2332-01BF-834F-8236-50238282D533}" type="slidenum">
+            <a:fld id="{87F339C6-D84C-874E-B4F5-90CEABF287B1}" type="slidenum">
               <a:rPr lang="en-US" smtClean="0"/>
               <a:t>‹#›</a:t>
             </a:fld>
@@ -2578,7 +2754,7 @@
     </p:spTree>
     <p:extLst>
       <p:ext uri="{BB962C8B-B14F-4D97-AF65-F5344CB8AC3E}">
-        <p14:creationId xmlns:p14="http://schemas.microsoft.com/office/powerpoint/2010/main" val="3566899855"/>
+        <p14:creationId xmlns:p14="http://schemas.microsoft.com/office/powerpoint/2010/main" val="3400384612"/>
       </p:ext>
     </p:extLst>
   </p:cSld>
@@ -2612,7 +2788,13 @@
       </p:grpSpPr>
       <p:sp>
         <p:nvSpPr>
-          <p:cNvPr id="2" name="Title Placeholder 1"/>
+          <p:cNvPr id="2" name="Title Placeholder 1">
+            <a:extLst>
+              <a:ext uri="{FF2B5EF4-FFF2-40B4-BE49-F238E27FC236}">
+                <a16:creationId xmlns:a16="http://schemas.microsoft.com/office/drawing/2014/main" id="{D81C52F8-D26C-D62D-94D8-2AC26AF3319E}"/>
+              </a:ext>
+            </a:extLst>
+          </p:cNvPr>
           <p:cNvSpPr>
             <a:spLocks noGrp="1"/>
           </p:cNvSpPr>
@@ -2622,8 +2804,8 @@
         </p:nvSpPr>
         <p:spPr>
           <a:xfrm>
-            <a:off x="457200" y="205979"/>
-            <a:ext cx="8229600" cy="857250"/>
+            <a:off x="838200" y="365125"/>
+            <a:ext cx="10515600" cy="1325563"/>
           </a:xfrm>
           <a:prstGeom prst="rect">
             <a:avLst/>
@@ -2644,7 +2826,13 @@
       </p:sp>
       <p:sp>
         <p:nvSpPr>
-          <p:cNvPr id="3" name="Text Placeholder 2"/>
+          <p:cNvPr id="3" name="Text Placeholder 2">
+            <a:extLst>
+              <a:ext uri="{FF2B5EF4-FFF2-40B4-BE49-F238E27FC236}">
+                <a16:creationId xmlns:a16="http://schemas.microsoft.com/office/drawing/2014/main" id="{84016077-72CB-6E5A-A0D9-B19B93515B69}"/>
+              </a:ext>
+            </a:extLst>
+          </p:cNvPr>
           <p:cNvSpPr>
             <a:spLocks noGrp="1"/>
           </p:cNvSpPr>
@@ -2654,8 +2842,8 @@
         </p:nvSpPr>
         <p:spPr>
           <a:xfrm>
-            <a:off x="457200" y="1200151"/>
-            <a:ext cx="8229600" cy="3394472"/>
+            <a:off x="838200" y="1825625"/>
+            <a:ext cx="10515600" cy="4351338"/>
           </a:xfrm>
           <a:prstGeom prst="rect">
             <a:avLst/>
@@ -2705,7 +2893,13 @@
       </p:sp>
       <p:sp>
         <p:nvSpPr>
-          <p:cNvPr id="4" name="Date Placeholder 3"/>
+          <p:cNvPr id="4" name="Date Placeholder 3">
+            <a:extLst>
+              <a:ext uri="{FF2B5EF4-FFF2-40B4-BE49-F238E27FC236}">
+                <a16:creationId xmlns:a16="http://schemas.microsoft.com/office/drawing/2014/main" id="{117CB0BA-99FD-9F19-69DA-8B3ACDE3FAF6}"/>
+              </a:ext>
+            </a:extLst>
+          </p:cNvPr>
           <p:cNvSpPr>
             <a:spLocks noGrp="1"/>
           </p:cNvSpPr>
@@ -2715,8 +2909,8 @@
         </p:nvSpPr>
         <p:spPr>
           <a:xfrm>
-            <a:off x="457200" y="4767263"/>
-            <a:ext cx="2133600" cy="273844"/>
+            <a:off x="838200" y="6356350"/>
+            <a:ext cx="2743200" cy="365125"/>
           </a:xfrm>
           <a:prstGeom prst="rect">
             <a:avLst/>
@@ -2726,7 +2920,7 @@
           <a:bodyPr anchor="ctr" bIns="45720" lIns="91440" rIns="91440" rtlCol="0" tIns="45720" vert="horz"/>
           <a:lstStyle>
             <a:lvl1pPr algn="l">
-              <a:defRPr sz="900">
+              <a:defRPr sz="1200">
                 <a:solidFill>
                   <a:schemeClr val="tx1">
                     <a:tint val="75000"/>
@@ -2736,9 +2930,9 @@
             </a:lvl1pPr>
           </a:lstStyle>
           <a:p>
-            <a:fld id="{241EB5C9-1307-BA42-ABA2-0BC069CD8E7F}" type="datetimeFigureOut">
+            <a:fld id="{F4FC6662-9247-444B-ADF5-BDC4693D4AA0}" type="datetimeFigureOut">
               <a:rPr lang="en-US" smtClean="0"/>
-              <a:t>1/2/22</a:t>
+              <a:t>4/22/2024</a:t>
             </a:fld>
             <a:endParaRPr lang="en-US"/>
           </a:p>
@@ -2746,7 +2940,13 @@
       </p:sp>
       <p:sp>
         <p:nvSpPr>
-          <p:cNvPr id="5" name="Footer Placeholder 4"/>
+          <p:cNvPr id="5" name="Footer Placeholder 4">
+            <a:extLst>
+              <a:ext uri="{FF2B5EF4-FFF2-40B4-BE49-F238E27FC236}">
+                <a16:creationId xmlns:a16="http://schemas.microsoft.com/office/drawing/2014/main" id="{9E4A2EF7-25AB-F4B4-4099-5F6FE0DC4FB7}"/>
+              </a:ext>
+            </a:extLst>
+          </p:cNvPr>
           <p:cNvSpPr>
             <a:spLocks noGrp="1"/>
           </p:cNvSpPr>
@@ -2756,8 +2956,8 @@
         </p:nvSpPr>
         <p:spPr>
           <a:xfrm>
-            <a:off x="3124200" y="4767263"/>
-            <a:ext cx="2895600" cy="273844"/>
+            <a:off x="4038600" y="6356350"/>
+            <a:ext cx="4114800" cy="365125"/>
           </a:xfrm>
           <a:prstGeom prst="rect">
             <a:avLst/>
@@ -2767,7 +2967,7 @@
           <a:bodyPr anchor="ctr" bIns="45720" lIns="91440" rIns="91440" rtlCol="0" tIns="45720" vert="horz"/>
           <a:lstStyle>
             <a:lvl1pPr algn="ctr">
-              <a:defRPr sz="900">
+              <a:defRPr sz="1200">
                 <a:solidFill>
                   <a:schemeClr val="tx1">
                     <a:tint val="75000"/>
@@ -2783,7 +2983,13 @@
       </p:sp>
       <p:sp>
         <p:nvSpPr>
-          <p:cNvPr id="6" name="Slide Number Placeholder 5"/>
+          <p:cNvPr id="6" name="Slide Number Placeholder 5">
+            <a:extLst>
+              <a:ext uri="{FF2B5EF4-FFF2-40B4-BE49-F238E27FC236}">
+                <a16:creationId xmlns:a16="http://schemas.microsoft.com/office/drawing/2014/main" id="{181E347C-318D-9F61-859A-48B942C2E264}"/>
+              </a:ext>
+            </a:extLst>
+          </p:cNvPr>
           <p:cNvSpPr>
             <a:spLocks noGrp="1"/>
           </p:cNvSpPr>
@@ -2793,8 +2999,8 @@
         </p:nvSpPr>
         <p:spPr>
           <a:xfrm>
-            <a:off x="6553200" y="4767263"/>
-            <a:ext cx="2133600" cy="273844"/>
+            <a:off x="8610600" y="6356350"/>
+            <a:ext cx="2743200" cy="365125"/>
           </a:xfrm>
           <a:prstGeom prst="rect">
             <a:avLst/>
@@ -2804,7 +3010,7 @@
           <a:bodyPr anchor="ctr" bIns="45720" lIns="91440" rIns="91440" rtlCol="0" tIns="45720" vert="horz"/>
           <a:lstStyle>
             <a:lvl1pPr algn="r">
-              <a:defRPr sz="900">
+              <a:defRPr sz="1200">
                 <a:solidFill>
                   <a:schemeClr val="tx1">
                     <a:tint val="75000"/>
@@ -2814,7 +3020,7 @@
             </a:lvl1pPr>
           </a:lstStyle>
           <a:p>
-            <a:fld id="{C5EF2332-01BF-834F-8236-50238282D533}" type="slidenum">
+            <a:fld id="{87F339C6-D84C-874E-B4F5-90CEABF287B1}" type="slidenum">
               <a:rPr lang="en-US" smtClean="0"/>
               <a:t>‹#›</a:t>
             </a:fld>
@@ -2825,7 +3031,7 @@
     </p:spTree>
     <p:extLst>
       <p:ext uri="{BB962C8B-B14F-4D97-AF65-F5344CB8AC3E}">
-        <p14:creationId xmlns:p14="http://schemas.microsoft.com/office/powerpoint/2010/main" val="3676200875"/>
+        <p14:creationId xmlns:p14="http://schemas.microsoft.com/office/powerpoint/2010/main" val="2275929044"/>
       </p:ext>
     </p:extLst>
   </p:cSld>
@@ -2845,12 +3051,15 @@
   </p:sldLayoutIdLst>
   <p:txStyles>
     <p:titleStyle>
-      <a:lvl1pPr algn="ctr" defTabSz="342900" eaLnBrk="1" hangingPunct="1" latinLnBrk="0" rtl="0">
+      <a:lvl1pPr algn="l" defTabSz="914400" eaLnBrk="1" hangingPunct="1" latinLnBrk="0" rtl="0">
+        <a:lnSpc>
+          <a:spcPct val="90000"/>
+        </a:lnSpc>
         <a:spcBef>
           <a:spcPct val="0"/>
         </a:spcBef>
         <a:buNone/>
-        <a:defRPr kern="1200" sz="3300">
+        <a:defRPr kern="1200" sz="4400">
           <a:solidFill>
             <a:schemeClr val="tx1"/>
           </a:solidFill>
@@ -2861,11 +3070,32 @@
       </a:lvl1pPr>
     </p:titleStyle>
     <p:bodyStyle>
-      <a:lvl1pPr algn="l" defTabSz="342900" eaLnBrk="1" hangingPunct="1" indent="-342900" latinLnBrk="0" marL="342900" rtl="0">
+      <a:lvl1pPr algn="l" defTabSz="914400" eaLnBrk="1" hangingPunct="1" indent="-228600" latinLnBrk="0" marL="228600" rtl="0">
+        <a:lnSpc>
+          <a:spcPct val="90000"/>
+        </a:lnSpc>
         <a:spcBef>
-          <a:spcPct val="20000"/>
+          <a:spcPts val="1000"/>
         </a:spcBef>
-        <a:buFont typeface="Arial"/>
+        <a:buFont charset="0" panose="020B0604020202020204" pitchFamily="34" typeface="Arial"/>
+        <a:buChar char="•"/>
+        <a:defRPr kern="1200" sz="2800">
+          <a:solidFill>
+            <a:schemeClr val="tx1"/>
+          </a:solidFill>
+          <a:latin typeface="+mn-lt"/>
+          <a:ea typeface="+mn-ea"/>
+          <a:cs typeface="+mn-cs"/>
+        </a:defRPr>
+      </a:lvl1pPr>
+      <a:lvl2pPr algn="l" defTabSz="914400" eaLnBrk="1" hangingPunct="1" indent="-228600" latinLnBrk="0" marL="685800" rtl="0">
+        <a:lnSpc>
+          <a:spcPct val="90000"/>
+        </a:lnSpc>
+        <a:spcBef>
+          <a:spcPts val="500"/>
+        </a:spcBef>
+        <a:buFont charset="0" panose="020B0604020202020204" pitchFamily="34" typeface="Arial"/>
         <a:buChar char="•"/>
         <a:defRPr kern="1200" sz="2400">
           <a:solidFill>
@@ -2875,14 +3105,17 @@
           <a:ea typeface="+mn-ea"/>
           <a:cs typeface="+mn-cs"/>
         </a:defRPr>
-      </a:lvl1pPr>
-      <a:lvl2pPr algn="l" defTabSz="342900" eaLnBrk="1" hangingPunct="1" indent="-342900" latinLnBrk="0" marL="685800" rtl="0">
+      </a:lvl2pPr>
+      <a:lvl3pPr algn="l" defTabSz="914400" eaLnBrk="1" hangingPunct="1" indent="-228600" latinLnBrk="0" marL="1143000" rtl="0">
+        <a:lnSpc>
+          <a:spcPct val="90000"/>
+        </a:lnSpc>
         <a:spcBef>
-          <a:spcPct val="20000"/>
+          <a:spcPts val="500"/>
         </a:spcBef>
-        <a:buFont typeface="Arial"/>
-        <a:buChar char="–"/>
-        <a:defRPr kern="1200" sz="2100">
+        <a:buFont charset="0" panose="020B0604020202020204" pitchFamily="34" typeface="Arial"/>
+        <a:buChar char="•"/>
+        <a:defRPr kern="1200" sz="2000">
           <a:solidFill>
             <a:schemeClr val="tx1"/>
           </a:solidFill>
@@ -2890,12 +3123,15 @@
           <a:ea typeface="+mn-ea"/>
           <a:cs typeface="+mn-cs"/>
         </a:defRPr>
-      </a:lvl2pPr>
-      <a:lvl3pPr algn="l" defTabSz="342900" eaLnBrk="1" hangingPunct="1" indent="-342900" latinLnBrk="0" marL="1028700" rtl="0">
+      </a:lvl3pPr>
+      <a:lvl4pPr algn="l" defTabSz="914400" eaLnBrk="1" hangingPunct="1" indent="-228600" latinLnBrk="0" marL="1600200" rtl="0">
+        <a:lnSpc>
+          <a:spcPct val="90000"/>
+        </a:lnSpc>
         <a:spcBef>
-          <a:spcPct val="20000"/>
+          <a:spcPts val="500"/>
         </a:spcBef>
-        <a:buFont typeface="Arial"/>
+        <a:buFont charset="0" panose="020B0604020202020204" pitchFamily="34" typeface="Arial"/>
         <a:buChar char="•"/>
         <a:defRPr kern="1200" sz="1800">
           <a:solidFill>
@@ -2905,29 +3141,17 @@
           <a:ea typeface="+mn-ea"/>
           <a:cs typeface="+mn-cs"/>
         </a:defRPr>
-      </a:lvl3pPr>
-      <a:lvl4pPr algn="l" defTabSz="342900" eaLnBrk="1" hangingPunct="1" indent="-342900" latinLnBrk="0" marL="1371600" rtl="0">
+      </a:lvl4pPr>
+      <a:lvl5pPr algn="l" defTabSz="914400" eaLnBrk="1" hangingPunct="1" indent="-228600" latinLnBrk="0" marL="2057400" rtl="0">
+        <a:lnSpc>
+          <a:spcPct val="90000"/>
+        </a:lnSpc>
         <a:spcBef>
-          <a:spcPct val="20000"/>
+          <a:spcPts val="500"/>
         </a:spcBef>
-        <a:buFont typeface="Arial"/>
-        <a:buChar char="–"/>
-        <a:defRPr kern="1200" sz="1500">
-          <a:solidFill>
-            <a:schemeClr val="tx1"/>
-          </a:solidFill>
-          <a:latin typeface="+mn-lt"/>
-          <a:ea typeface="+mn-ea"/>
-          <a:cs typeface="+mn-cs"/>
-        </a:defRPr>
-      </a:lvl4pPr>
-      <a:lvl5pPr algn="l" defTabSz="342900" eaLnBrk="1" hangingPunct="1" indent="-342900" latinLnBrk="0" marL="1714500" rtl="0">
-        <a:spcBef>
-          <a:spcPct val="20000"/>
-        </a:spcBef>
-        <a:buFont typeface="Arial"/>
-        <a:buChar char="»"/>
-        <a:defRPr kern="1200" sz="1500">
+        <a:buFont charset="0" panose="020B0604020202020204" pitchFamily="34" typeface="Arial"/>
+        <a:buChar char="•"/>
+        <a:defRPr kern="1200" sz="1800">
           <a:solidFill>
             <a:schemeClr val="tx1"/>
           </a:solidFill>
@@ -2936,13 +3160,16 @@
           <a:cs typeface="+mn-cs"/>
         </a:defRPr>
       </a:lvl5pPr>
-      <a:lvl6pPr algn="l" defTabSz="342900" eaLnBrk="1" hangingPunct="1" indent="-342900" latinLnBrk="0" marL="2057400" rtl="0">
+      <a:lvl6pPr algn="l" defTabSz="914400" eaLnBrk="1" hangingPunct="1" indent="-228600" latinLnBrk="0" marL="2514600" rtl="0">
+        <a:lnSpc>
+          <a:spcPct val="90000"/>
+        </a:lnSpc>
         <a:spcBef>
-          <a:spcPct val="20000"/>
+          <a:spcPts val="500"/>
         </a:spcBef>
-        <a:buFont typeface="Arial"/>
+        <a:buFont charset="0" panose="020B0604020202020204" pitchFamily="34" typeface="Arial"/>
         <a:buChar char="•"/>
-        <a:defRPr kern="1200" sz="1500">
+        <a:defRPr kern="1200" sz="1800">
           <a:solidFill>
             <a:schemeClr val="tx1"/>
           </a:solidFill>
@@ -2951,13 +3178,16 @@
           <a:cs typeface="+mn-cs"/>
         </a:defRPr>
       </a:lvl6pPr>
-      <a:lvl7pPr algn="l" defTabSz="342900" eaLnBrk="1" hangingPunct="1" indent="-342900" latinLnBrk="0" marL="2400300" rtl="0">
+      <a:lvl7pPr algn="l" defTabSz="914400" eaLnBrk="1" hangingPunct="1" indent="-228600" latinLnBrk="0" marL="2971800" rtl="0">
+        <a:lnSpc>
+          <a:spcPct val="90000"/>
+        </a:lnSpc>
         <a:spcBef>
-          <a:spcPct val="20000"/>
+          <a:spcPts val="500"/>
         </a:spcBef>
-        <a:buFont typeface="Arial"/>
+        <a:buFont charset="0" panose="020B0604020202020204" pitchFamily="34" typeface="Arial"/>
         <a:buChar char="•"/>
-        <a:defRPr kern="1200" sz="1500">
+        <a:defRPr kern="1200" sz="1800">
           <a:solidFill>
             <a:schemeClr val="tx1"/>
           </a:solidFill>
@@ -2966,13 +3196,16 @@
           <a:cs typeface="+mn-cs"/>
         </a:defRPr>
       </a:lvl7pPr>
-      <a:lvl8pPr algn="l" defTabSz="342900" eaLnBrk="1" hangingPunct="1" indent="-342900" latinLnBrk="0" marL="2743200" rtl="0">
+      <a:lvl8pPr algn="l" defTabSz="914400" eaLnBrk="1" hangingPunct="1" indent="-228600" latinLnBrk="0" marL="3429000" rtl="0">
+        <a:lnSpc>
+          <a:spcPct val="90000"/>
+        </a:lnSpc>
         <a:spcBef>
-          <a:spcPct val="20000"/>
+          <a:spcPts val="500"/>
         </a:spcBef>
-        <a:buFont typeface="Arial"/>
+        <a:buFont charset="0" panose="020B0604020202020204" pitchFamily="34" typeface="Arial"/>
         <a:buChar char="•"/>
-        <a:defRPr kern="1200" sz="1500">
+        <a:defRPr kern="1200" sz="1800">
           <a:solidFill>
             <a:schemeClr val="tx1"/>
           </a:solidFill>
@@ -2981,13 +3214,16 @@
           <a:cs typeface="+mn-cs"/>
         </a:defRPr>
       </a:lvl8pPr>
-      <a:lvl9pPr algn="l" defTabSz="342900" eaLnBrk="1" hangingPunct="1" indent="-342900" latinLnBrk="0" marL="3086100" rtl="0">
+      <a:lvl9pPr algn="l" defTabSz="914400" eaLnBrk="1" hangingPunct="1" indent="-228600" latinLnBrk="0" marL="3886200" rtl="0">
+        <a:lnSpc>
+          <a:spcPct val="90000"/>
+        </a:lnSpc>
         <a:spcBef>
-          <a:spcPct val="20000"/>
+          <a:spcPts val="500"/>
         </a:spcBef>
-        <a:buFont typeface="Arial"/>
+        <a:buFont charset="0" panose="020B0604020202020204" pitchFamily="34" typeface="Arial"/>
         <a:buChar char="•"/>
-        <a:defRPr kern="1200" sz="1500">
+        <a:defRPr kern="1200" sz="1800">
           <a:solidFill>
             <a:schemeClr val="tx1"/>
           </a:solidFill>
@@ -3001,8 +3237,8 @@
       <a:defPPr>
         <a:defRPr lang="en-US"/>
       </a:defPPr>
-      <a:lvl1pPr algn="l" defTabSz="342900" eaLnBrk="1" hangingPunct="1" latinLnBrk="0" marL="0" rtl="0">
-        <a:defRPr kern="1200" sz="1350">
+      <a:lvl1pPr algn="l" defTabSz="914400" eaLnBrk="1" hangingPunct="1" latinLnBrk="0" marL="0" rtl="0">
+        <a:defRPr kern="1200" sz="1800">
           <a:solidFill>
             <a:schemeClr val="tx1"/>
           </a:solidFill>
@@ -3011,8 +3247,8 @@
           <a:cs typeface="+mn-cs"/>
         </a:defRPr>
       </a:lvl1pPr>
-      <a:lvl2pPr algn="l" defTabSz="342900" eaLnBrk="1" hangingPunct="1" latinLnBrk="0" marL="342900" rtl="0">
-        <a:defRPr kern="1200" sz="1350">
+      <a:lvl2pPr algn="l" defTabSz="914400" eaLnBrk="1" hangingPunct="1" latinLnBrk="0" marL="457200" rtl="0">
+        <a:defRPr kern="1200" sz="1800">
           <a:solidFill>
             <a:schemeClr val="tx1"/>
           </a:solidFill>
@@ -3021,8 +3257,8 @@
           <a:cs typeface="+mn-cs"/>
         </a:defRPr>
       </a:lvl2pPr>
-      <a:lvl3pPr algn="l" defTabSz="342900" eaLnBrk="1" hangingPunct="1" latinLnBrk="0" marL="685800" rtl="0">
-        <a:defRPr kern="1200" sz="1350">
+      <a:lvl3pPr algn="l" defTabSz="914400" eaLnBrk="1" hangingPunct="1" latinLnBrk="0" marL="914400" rtl="0">
+        <a:defRPr kern="1200" sz="1800">
           <a:solidFill>
             <a:schemeClr val="tx1"/>
           </a:solidFill>
@@ -3031,8 +3267,8 @@
           <a:cs typeface="+mn-cs"/>
         </a:defRPr>
       </a:lvl3pPr>
-      <a:lvl4pPr algn="l" defTabSz="342900" eaLnBrk="1" hangingPunct="1" latinLnBrk="0" marL="1028700" rtl="0">
-        <a:defRPr kern="1200" sz="1350">
+      <a:lvl4pPr algn="l" defTabSz="914400" eaLnBrk="1" hangingPunct="1" latinLnBrk="0" marL="1371600" rtl="0">
+        <a:defRPr kern="1200" sz="1800">
           <a:solidFill>
             <a:schemeClr val="tx1"/>
           </a:solidFill>
@@ -3041,8 +3277,8 @@
           <a:cs typeface="+mn-cs"/>
         </a:defRPr>
       </a:lvl4pPr>
-      <a:lvl5pPr algn="l" defTabSz="342900" eaLnBrk="1" hangingPunct="1" latinLnBrk="0" marL="1371600" rtl="0">
-        <a:defRPr kern="1200" sz="1350">
+      <a:lvl5pPr algn="l" defTabSz="914400" eaLnBrk="1" hangingPunct="1" latinLnBrk="0" marL="1828800" rtl="0">
+        <a:defRPr kern="1200" sz="1800">
           <a:solidFill>
             <a:schemeClr val="tx1"/>
           </a:solidFill>
@@ -3051,8 +3287,8 @@
           <a:cs typeface="+mn-cs"/>
         </a:defRPr>
       </a:lvl5pPr>
-      <a:lvl6pPr algn="l" defTabSz="342900" eaLnBrk="1" hangingPunct="1" latinLnBrk="0" marL="1714500" rtl="0">
-        <a:defRPr kern="1200" sz="1350">
+      <a:lvl6pPr algn="l" defTabSz="914400" eaLnBrk="1" hangingPunct="1" latinLnBrk="0" marL="2286000" rtl="0">
+        <a:defRPr kern="1200" sz="1800">
           <a:solidFill>
             <a:schemeClr val="tx1"/>
           </a:solidFill>
@@ -3061,8 +3297,8 @@
           <a:cs typeface="+mn-cs"/>
         </a:defRPr>
       </a:lvl6pPr>
-      <a:lvl7pPr algn="l" defTabSz="342900" eaLnBrk="1" hangingPunct="1" latinLnBrk="0" marL="2057400" rtl="0">
-        <a:defRPr kern="1200" sz="1350">
+      <a:lvl7pPr algn="l" defTabSz="914400" eaLnBrk="1" hangingPunct="1" latinLnBrk="0" marL="2743200" rtl="0">
+        <a:defRPr kern="1200" sz="1800">
           <a:solidFill>
             <a:schemeClr val="tx1"/>
           </a:solidFill>
@@ -3071,8 +3307,8 @@
           <a:cs typeface="+mn-cs"/>
         </a:defRPr>
       </a:lvl7pPr>
-      <a:lvl8pPr algn="l" defTabSz="342900" eaLnBrk="1" hangingPunct="1" latinLnBrk="0" marL="2400300" rtl="0">
-        <a:defRPr kern="1200" sz="1350">
+      <a:lvl8pPr algn="l" defTabSz="914400" eaLnBrk="1" hangingPunct="1" latinLnBrk="0" marL="3200400" rtl="0">
+        <a:defRPr kern="1200" sz="1800">
           <a:solidFill>
             <a:schemeClr val="tx1"/>
           </a:solidFill>
@@ -3081,8 +3317,8 @@
           <a:cs typeface="+mn-cs"/>
         </a:defRPr>
       </a:lvl8pPr>
-      <a:lvl9pPr algn="l" defTabSz="342900" eaLnBrk="1" hangingPunct="1" latinLnBrk="0" marL="2743200" rtl="0">
-        <a:defRPr kern="1200" sz="1350">
+      <a:lvl9pPr algn="l" defTabSz="914400" eaLnBrk="1" hangingPunct="1" latinLnBrk="0" marL="3657600" rtl="0">
+        <a:defRPr kern="1200" sz="1800">
           <a:solidFill>
             <a:schemeClr val="tx1"/>
           </a:solidFill>
@@ -3115,7 +3351,13 @@
       </p:grpSpPr>
       <p:sp>
         <p:nvSpPr>
-          <p:cNvPr id="2" name="Title 1"/>
+          <p:cNvPr id="2" name="Title 1">
+            <a:extLst>
+              <a:ext uri="{FF2B5EF4-FFF2-40B4-BE49-F238E27FC236}">
+                <a16:creationId xmlns:a16="http://schemas.microsoft.com/office/drawing/2014/main" id="{54A9766F-B35E-DD24-6EE8-5B4A00B11314}"/>
+              </a:ext>
+            </a:extLst>
+          </p:cNvPr>
           <p:cNvSpPr>
             <a:spLocks noGrp="1"/>
           </p:cNvSpPr>
@@ -3125,8 +3367,8 @@
         </p:nvSpPr>
         <p:spPr>
           <a:xfrm>
-            <a:off x="685800" y="1597819"/>
-            <a:ext cx="7772400" cy="1102519"/>
+            <a:off x="1524000" y="1122363"/>
+            <a:ext cx="9144000" cy="2387600"/>
           </a:xfrm>
         </p:spPr>
         <p:txBody>
@@ -3145,7 +3387,13 @@
       </p:sp>
       <p:sp>
         <p:nvSpPr>
-          <p:cNvPr id="3" name="Subtitle 2"/>
+          <p:cNvPr id="3" name="Subtitle 2">
+            <a:extLst>
+              <a:ext uri="{FF2B5EF4-FFF2-40B4-BE49-F238E27FC236}">
+                <a16:creationId xmlns:a16="http://schemas.microsoft.com/office/drawing/2014/main" id="{AC3D4351-CC8D-D79B-1ED3-78F1614FAB0F}"/>
+              </a:ext>
+            </a:extLst>
+          </p:cNvPr>
           <p:cNvSpPr>
             <a:spLocks noGrp="1"/>
           </p:cNvSpPr>
@@ -3155,8 +3403,8 @@
         </p:nvSpPr>
         <p:spPr>
           <a:xfrm>
-            <a:off x="1371600" y="2914650"/>
-            <a:ext cx="6400800" cy="1314450"/>
+            <a:off x="1524000" y="3602038"/>
+            <a:ext cx="9144000" cy="1655762"/>
           </a:xfrm>
         </p:spPr>
         <p:txBody>
@@ -3177,7 +3425,13 @@
       </p:sp>
       <p:sp>
         <p:nvSpPr>
-          <p:cNvPr id="4" name="Date Placeholder 3"/>
+          <p:cNvPr id="4" name="Date Placeholder 3">
+            <a:extLst>
+              <a:ext uri="{FF2B5EF4-FFF2-40B4-BE49-F238E27FC236}">
+                <a16:creationId xmlns:a16="http://schemas.microsoft.com/office/drawing/2014/main" id="{A9F1E45F-B0E7-448F-0809-45CCE5CB7755}"/>
+              </a:ext>
+            </a:extLst>
+          </p:cNvPr>
           <p:cNvSpPr>
             <a:spLocks noGrp="1"/>
           </p:cNvSpPr>
@@ -3224,7 +3478,13 @@
       </p:grpSpPr>
       <p:sp>
         <p:nvSpPr>
-          <p:cNvPr id="2" name="Title 1"/>
+          <p:cNvPr id="2" name="Title 1">
+            <a:extLst>
+              <a:ext uri="{FF2B5EF4-FFF2-40B4-BE49-F238E27FC236}">
+                <a16:creationId xmlns:a16="http://schemas.microsoft.com/office/drawing/2014/main" id="{80A0CCEB-5AA3-9405-44C4-629E4B8A8924}"/>
+              </a:ext>
+            </a:extLst>
+          </p:cNvPr>
           <p:cNvSpPr>
             <a:spLocks noGrp="1"/>
           </p:cNvSpPr>
@@ -3234,8 +3494,8 @@
         </p:nvSpPr>
         <p:spPr>
           <a:xfrm>
-            <a:off x="722313" y="3305176"/>
-            <a:ext cx="7772400" cy="1021556"/>
+            <a:off x="831850" y="1709738"/>
+            <a:ext cx="10515600" cy="2852737"/>
           </a:xfrm>
         </p:spPr>
         <p:txBody>
@@ -3276,7 +3536,13 @@
       </p:grpSpPr>
       <p:sp>
         <p:nvSpPr>
-          <p:cNvPr id="2" name="Title 1"/>
+          <p:cNvPr id="2" name="Title 1">
+            <a:extLst>
+              <a:ext uri="{FF2B5EF4-FFF2-40B4-BE49-F238E27FC236}">
+                <a16:creationId xmlns:a16="http://schemas.microsoft.com/office/drawing/2014/main" id="{7DE2BA23-27DE-9A84-D049-94BD2FDDFB12}"/>
+              </a:ext>
+            </a:extLst>
+          </p:cNvPr>
           <p:cNvSpPr>
             <a:spLocks noGrp="1"/>
           </p:cNvSpPr>
@@ -3301,7 +3567,13 @@
       </p:sp>
       <p:sp>
         <p:nvSpPr>
-          <p:cNvPr id="3" name="Content Placeholder 2"/>
+          <p:cNvPr id="3" name="Content Placeholder 2">
+            <a:extLst>
+              <a:ext uri="{FF2B5EF4-FFF2-40B4-BE49-F238E27FC236}">
+                <a16:creationId xmlns:a16="http://schemas.microsoft.com/office/drawing/2014/main" id="{45969992-D875-2929-E350-487E7B6CD246}"/>
+              </a:ext>
+            </a:extLst>
+          </p:cNvPr>
           <p:cNvSpPr>
             <a:spLocks noGrp="1"/>
           </p:cNvSpPr>
@@ -3394,7 +3666,13 @@
       </p:grpSpPr>
       <p:sp>
         <p:nvSpPr>
-          <p:cNvPr id="2" name="Title 1"/>
+          <p:cNvPr id="2" name="Title 1">
+            <a:extLst>
+              <a:ext uri="{FF2B5EF4-FFF2-40B4-BE49-F238E27FC236}">
+                <a16:creationId xmlns:a16="http://schemas.microsoft.com/office/drawing/2014/main" id="{7DE2BA23-27DE-9A84-D049-94BD2FDDFB12}"/>
+              </a:ext>
+            </a:extLst>
+          </p:cNvPr>
           <p:cNvSpPr>
             <a:spLocks noGrp="1"/>
           </p:cNvSpPr>
@@ -3419,7 +3697,13 @@
       </p:sp>
       <p:sp>
         <p:nvSpPr>
-          <p:cNvPr id="3" name="Content Placeholder 2"/>
+          <p:cNvPr id="3" name="Content Placeholder 2">
+            <a:extLst>
+              <a:ext uri="{FF2B5EF4-FFF2-40B4-BE49-F238E27FC236}">
+                <a16:creationId xmlns:a16="http://schemas.microsoft.com/office/drawing/2014/main" id="{45969992-D875-2929-E350-487E7B6CD246}"/>
+              </a:ext>
+            </a:extLst>
+          </p:cNvPr>
           <p:cNvSpPr>
             <a:spLocks noGrp="1"/>
           </p:cNvSpPr>
@@ -3482,7 +3766,13 @@
       </p:grpSpPr>
       <p:sp>
         <p:nvSpPr>
-          <p:cNvPr id="2" name="Title 1"/>
+          <p:cNvPr id="2" name="Title 1">
+            <a:extLst>
+              <a:ext uri="{FF2B5EF4-FFF2-40B4-BE49-F238E27FC236}">
+                <a16:creationId xmlns:a16="http://schemas.microsoft.com/office/drawing/2014/main" id="{7DE2BA23-27DE-9A84-D049-94BD2FDDFB12}"/>
+              </a:ext>
+            </a:extLst>
+          </p:cNvPr>
           <p:cNvSpPr>
             <a:spLocks noGrp="1"/>
           </p:cNvSpPr>
@@ -3507,7 +3797,13 @@
       </p:sp>
       <p:sp>
         <p:nvSpPr>
-          <p:cNvPr id="3" name="Content Placeholder 2"/>
+          <p:cNvPr id="3" name="Content Placeholder 2">
+            <a:extLst>
+              <a:ext uri="{FF2B5EF4-FFF2-40B4-BE49-F238E27FC236}">
+                <a16:creationId xmlns:a16="http://schemas.microsoft.com/office/drawing/2014/main" id="{45969992-D875-2929-E350-487E7B6CD246}"/>
+              </a:ext>
+            </a:extLst>
+          </p:cNvPr>
           <p:cNvSpPr>
             <a:spLocks noGrp="1"/>
           </p:cNvSpPr>
@@ -3566,7 +3862,13 @@
       </p:grpSpPr>
       <p:sp>
         <p:nvSpPr>
-          <p:cNvPr id="2" name="Title 1"/>
+          <p:cNvPr id="2" name="Title 1">
+            <a:extLst>
+              <a:ext uri="{FF2B5EF4-FFF2-40B4-BE49-F238E27FC236}">
+                <a16:creationId xmlns:a16="http://schemas.microsoft.com/office/drawing/2014/main" id="{7DE2BA23-27DE-9A84-D049-94BD2FDDFB12}"/>
+              </a:ext>
+            </a:extLst>
+          </p:cNvPr>
           <p:cNvSpPr>
             <a:spLocks noGrp="1"/>
           </p:cNvSpPr>
@@ -3591,7 +3893,13 @@
       </p:sp>
       <p:sp>
         <p:nvSpPr>
-          <p:cNvPr id="3" name="Content Placeholder 2"/>
+          <p:cNvPr id="3" name="Content Placeholder 2">
+            <a:extLst>
+              <a:ext uri="{FF2B5EF4-FFF2-40B4-BE49-F238E27FC236}">
+                <a16:creationId xmlns:a16="http://schemas.microsoft.com/office/drawing/2014/main" id="{45969992-D875-2929-E350-487E7B6CD246}"/>
+              </a:ext>
+            </a:extLst>
+          </p:cNvPr>
           <p:cNvSpPr>
             <a:spLocks noGrp="1"/>
           </p:cNvSpPr>
@@ -3670,7 +3978,13 @@
       </p:grpSpPr>
       <p:sp>
         <p:nvSpPr>
-          <p:cNvPr id="2" name="Title 1"/>
+          <p:cNvPr id="2" name="Title 1">
+            <a:extLst>
+              <a:ext uri="{FF2B5EF4-FFF2-40B4-BE49-F238E27FC236}">
+                <a16:creationId xmlns:a16="http://schemas.microsoft.com/office/drawing/2014/main" id="{7DE2BA23-27DE-9A84-D049-94BD2FDDFB12}"/>
+              </a:ext>
+            </a:extLst>
+          </p:cNvPr>
           <p:cNvSpPr>
             <a:spLocks noGrp="1"/>
           </p:cNvSpPr>
@@ -3695,7 +4009,13 @@
       </p:sp>
       <p:sp>
         <p:nvSpPr>
-          <p:cNvPr id="3" name="Content Placeholder 2"/>
+          <p:cNvPr id="3" name="Content Placeholder 2">
+            <a:extLst>
+              <a:ext uri="{FF2B5EF4-FFF2-40B4-BE49-F238E27FC236}">
+                <a16:creationId xmlns:a16="http://schemas.microsoft.com/office/drawing/2014/main" id="{45969992-D875-2929-E350-487E7B6CD246}"/>
+              </a:ext>
+            </a:extLst>
+          </p:cNvPr>
           <p:cNvSpPr>
             <a:spLocks noGrp="1"/>
           </p:cNvSpPr>
@@ -3753,7 +4073,13 @@
       </p:grpSpPr>
       <p:sp>
         <p:nvSpPr>
-          <p:cNvPr id="2" name="Title 1"/>
+          <p:cNvPr id="2" name="Title 1">
+            <a:extLst>
+              <a:ext uri="{FF2B5EF4-FFF2-40B4-BE49-F238E27FC236}">
+                <a16:creationId xmlns:a16="http://schemas.microsoft.com/office/drawing/2014/main" id="{7DE2BA23-27DE-9A84-D049-94BD2FDDFB12}"/>
+              </a:ext>
+            </a:extLst>
+          </p:cNvPr>
           <p:cNvSpPr>
             <a:spLocks noGrp="1"/>
           </p:cNvSpPr>
@@ -3778,7 +4104,13 @@
       </p:sp>
       <p:sp>
         <p:nvSpPr>
-          <p:cNvPr id="3" name="Content Placeholder 2"/>
+          <p:cNvPr id="3" name="Content Placeholder 2">
+            <a:extLst>
+              <a:ext uri="{FF2B5EF4-FFF2-40B4-BE49-F238E27FC236}">
+                <a16:creationId xmlns:a16="http://schemas.microsoft.com/office/drawing/2014/main" id="{45969992-D875-2929-E350-487E7B6CD246}"/>
+              </a:ext>
+            </a:extLst>
+          </p:cNvPr>
           <p:cNvSpPr>
             <a:spLocks noGrp="1"/>
           </p:cNvSpPr>
@@ -3837,7 +4169,13 @@
       </p:grpSpPr>
       <p:sp>
         <p:nvSpPr>
-          <p:cNvPr id="2" name="Title 1"/>
+          <p:cNvPr id="2" name="Title 1">
+            <a:extLst>
+              <a:ext uri="{FF2B5EF4-FFF2-40B4-BE49-F238E27FC236}">
+                <a16:creationId xmlns:a16="http://schemas.microsoft.com/office/drawing/2014/main" id="{7DE2BA23-27DE-9A84-D049-94BD2FDDFB12}"/>
+              </a:ext>
+            </a:extLst>
+          </p:cNvPr>
           <p:cNvSpPr>
             <a:spLocks noGrp="1"/>
           </p:cNvSpPr>
@@ -3862,7 +4200,13 @@
       </p:sp>
       <p:sp>
         <p:nvSpPr>
-          <p:cNvPr id="3" name="Content Placeholder 2"/>
+          <p:cNvPr id="3" name="Content Placeholder 2">
+            <a:extLst>
+              <a:ext uri="{FF2B5EF4-FFF2-40B4-BE49-F238E27FC236}">
+                <a16:creationId xmlns:a16="http://schemas.microsoft.com/office/drawing/2014/main" id="{45969992-D875-2929-E350-487E7B6CD246}"/>
+              </a:ext>
+            </a:extLst>
+          </p:cNvPr>
           <p:cNvSpPr>
             <a:spLocks noGrp="1"/>
           </p:cNvSpPr>
@@ -3947,7 +4291,13 @@
       </p:grpSpPr>
       <p:sp>
         <p:nvSpPr>
-          <p:cNvPr id="2" name="Title 1"/>
+          <p:cNvPr id="2" name="Title 1">
+            <a:extLst>
+              <a:ext uri="{FF2B5EF4-FFF2-40B4-BE49-F238E27FC236}">
+                <a16:creationId xmlns:a16="http://schemas.microsoft.com/office/drawing/2014/main" id="{80A0CCEB-5AA3-9405-44C4-629E4B8A8924}"/>
+              </a:ext>
+            </a:extLst>
+          </p:cNvPr>
           <p:cNvSpPr>
             <a:spLocks noGrp="1"/>
           </p:cNvSpPr>
@@ -3957,8 +4307,8 @@
         </p:nvSpPr>
         <p:spPr>
           <a:xfrm>
-            <a:off x="722313" y="3305176"/>
-            <a:ext cx="7772400" cy="1021556"/>
+            <a:off x="831850" y="1709738"/>
+            <a:ext cx="10515600" cy="2852737"/>
           </a:xfrm>
         </p:spPr>
         <p:txBody>
@@ -3999,7 +4349,13 @@
       </p:grpSpPr>
       <p:sp>
         <p:nvSpPr>
-          <p:cNvPr id="2" name="Title 1"/>
+          <p:cNvPr id="2" name="Title 1">
+            <a:extLst>
+              <a:ext uri="{FF2B5EF4-FFF2-40B4-BE49-F238E27FC236}">
+                <a16:creationId xmlns:a16="http://schemas.microsoft.com/office/drawing/2014/main" id="{7DE2BA23-27DE-9A84-D049-94BD2FDDFB12}"/>
+              </a:ext>
+            </a:extLst>
+          </p:cNvPr>
           <p:cNvSpPr>
             <a:spLocks noGrp="1"/>
           </p:cNvSpPr>
@@ -4024,7 +4380,13 @@
       </p:sp>
       <p:sp>
         <p:nvSpPr>
-          <p:cNvPr id="3" name="Content Placeholder 2"/>
+          <p:cNvPr id="3" name="Content Placeholder 2">
+            <a:extLst>
+              <a:ext uri="{FF2B5EF4-FFF2-40B4-BE49-F238E27FC236}">
+                <a16:creationId xmlns:a16="http://schemas.microsoft.com/office/drawing/2014/main" id="{45969992-D875-2929-E350-487E7B6CD246}"/>
+              </a:ext>
+            </a:extLst>
+          </p:cNvPr>
           <p:cNvSpPr>
             <a:spLocks noGrp="1"/>
           </p:cNvSpPr>
@@ -4089,7 +4451,13 @@
       </p:grpSpPr>
       <p:sp>
         <p:nvSpPr>
-          <p:cNvPr id="2" name="Title 1"/>
+          <p:cNvPr id="2" name="Title 1">
+            <a:extLst>
+              <a:ext uri="{FF2B5EF4-FFF2-40B4-BE49-F238E27FC236}">
+                <a16:creationId xmlns:a16="http://schemas.microsoft.com/office/drawing/2014/main" id="{80A0CCEB-5AA3-9405-44C4-629E4B8A8924}"/>
+              </a:ext>
+            </a:extLst>
+          </p:cNvPr>
           <p:cNvSpPr>
             <a:spLocks noGrp="1"/>
           </p:cNvSpPr>
@@ -4099,8 +4467,8 @@
         </p:nvSpPr>
         <p:spPr>
           <a:xfrm>
-            <a:off x="722313" y="3305176"/>
-            <a:ext cx="7772400" cy="1021556"/>
+            <a:off x="831850" y="1709738"/>
+            <a:ext cx="10515600" cy="2852737"/>
           </a:xfrm>
         </p:spPr>
         <p:txBody>
@@ -4141,7 +4509,13 @@
       </p:grpSpPr>
       <p:sp>
         <p:nvSpPr>
-          <p:cNvPr id="2" name="Title 1"/>
+          <p:cNvPr id="2" name="Title 1">
+            <a:extLst>
+              <a:ext uri="{FF2B5EF4-FFF2-40B4-BE49-F238E27FC236}">
+                <a16:creationId xmlns:a16="http://schemas.microsoft.com/office/drawing/2014/main" id="{7DE2BA23-27DE-9A84-D049-94BD2FDDFB12}"/>
+              </a:ext>
+            </a:extLst>
+          </p:cNvPr>
           <p:cNvSpPr>
             <a:spLocks noGrp="1"/>
           </p:cNvSpPr>
@@ -4166,7 +4540,13 @@
       </p:sp>
       <p:sp>
         <p:nvSpPr>
-          <p:cNvPr id="3" name="Content Placeholder 2"/>
+          <p:cNvPr id="3" name="Content Placeholder 2">
+            <a:extLst>
+              <a:ext uri="{FF2B5EF4-FFF2-40B4-BE49-F238E27FC236}">
+                <a16:creationId xmlns:a16="http://schemas.microsoft.com/office/drawing/2014/main" id="{45969992-D875-2929-E350-487E7B6CD246}"/>
+              </a:ext>
+            </a:extLst>
+          </p:cNvPr>
           <p:cNvSpPr>
             <a:spLocks noGrp="1"/>
           </p:cNvSpPr>
@@ -4245,7 +4625,13 @@
       </p:grpSpPr>
       <p:sp>
         <p:nvSpPr>
-          <p:cNvPr id="2" name="Title 1"/>
+          <p:cNvPr id="2" name="Title 1">
+            <a:extLst>
+              <a:ext uri="{FF2B5EF4-FFF2-40B4-BE49-F238E27FC236}">
+                <a16:creationId xmlns:a16="http://schemas.microsoft.com/office/drawing/2014/main" id="{7DE2BA23-27DE-9A84-D049-94BD2FDDFB12}"/>
+              </a:ext>
+            </a:extLst>
+          </p:cNvPr>
           <p:cNvSpPr>
             <a:spLocks noGrp="1"/>
           </p:cNvSpPr>
@@ -4270,7 +4656,13 @@
       </p:sp>
       <p:sp>
         <p:nvSpPr>
-          <p:cNvPr id="3" name="Content Placeholder 2"/>
+          <p:cNvPr id="3" name="Content Placeholder 2">
+            <a:extLst>
+              <a:ext uri="{FF2B5EF4-FFF2-40B4-BE49-F238E27FC236}">
+                <a16:creationId xmlns:a16="http://schemas.microsoft.com/office/drawing/2014/main" id="{45969992-D875-2929-E350-487E7B6CD246}"/>
+              </a:ext>
+            </a:extLst>
+          </p:cNvPr>
           <p:cNvSpPr>
             <a:spLocks noGrp="1"/>
           </p:cNvSpPr>
@@ -4342,7 +4734,13 @@
       </p:grpSpPr>
       <p:sp>
         <p:nvSpPr>
-          <p:cNvPr id="2" name="Title 1"/>
+          <p:cNvPr id="2" name="Title 1">
+            <a:extLst>
+              <a:ext uri="{FF2B5EF4-FFF2-40B4-BE49-F238E27FC236}">
+                <a16:creationId xmlns:a16="http://schemas.microsoft.com/office/drawing/2014/main" id="{7DE2BA23-27DE-9A84-D049-94BD2FDDFB12}"/>
+              </a:ext>
+            </a:extLst>
+          </p:cNvPr>
           <p:cNvSpPr>
             <a:spLocks noGrp="1"/>
           </p:cNvSpPr>
@@ -4367,7 +4765,13 @@
       </p:sp>
       <p:sp>
         <p:nvSpPr>
-          <p:cNvPr id="3" name="Content Placeholder 2"/>
+          <p:cNvPr id="3" name="Content Placeholder 2">
+            <a:extLst>
+              <a:ext uri="{FF2B5EF4-FFF2-40B4-BE49-F238E27FC236}">
+                <a16:creationId xmlns:a16="http://schemas.microsoft.com/office/drawing/2014/main" id="{45969992-D875-2929-E350-487E7B6CD246}"/>
+              </a:ext>
+            </a:extLst>
+          </p:cNvPr>
           <p:cNvSpPr>
             <a:spLocks noGrp="1"/>
           </p:cNvSpPr>
@@ -4467,7 +4871,13 @@
       </p:grpSpPr>
       <p:sp>
         <p:nvSpPr>
-          <p:cNvPr id="2" name="Title 1"/>
+          <p:cNvPr id="2" name="Title 1">
+            <a:extLst>
+              <a:ext uri="{FF2B5EF4-FFF2-40B4-BE49-F238E27FC236}">
+                <a16:creationId xmlns:a16="http://schemas.microsoft.com/office/drawing/2014/main" id="{7DE2BA23-27DE-9A84-D049-94BD2FDDFB12}"/>
+              </a:ext>
+            </a:extLst>
+          </p:cNvPr>
           <p:cNvSpPr>
             <a:spLocks noGrp="1"/>
           </p:cNvSpPr>
@@ -4492,7 +4902,13 @@
       </p:sp>
       <p:sp>
         <p:nvSpPr>
-          <p:cNvPr id="3" name="Content Placeholder 2"/>
+          <p:cNvPr id="3" name="Content Placeholder 2">
+            <a:extLst>
+              <a:ext uri="{FF2B5EF4-FFF2-40B4-BE49-F238E27FC236}">
+                <a16:creationId xmlns:a16="http://schemas.microsoft.com/office/drawing/2014/main" id="{45969992-D875-2929-E350-487E7B6CD246}"/>
+              </a:ext>
+            </a:extLst>
+          </p:cNvPr>
           <p:cNvSpPr>
             <a:spLocks noGrp="1"/>
           </p:cNvSpPr>
@@ -4558,7 +4974,13 @@
       </p:grpSpPr>
       <p:sp>
         <p:nvSpPr>
-          <p:cNvPr id="2" name="Title 1"/>
+          <p:cNvPr id="2" name="Title 1">
+            <a:extLst>
+              <a:ext uri="{FF2B5EF4-FFF2-40B4-BE49-F238E27FC236}">
+                <a16:creationId xmlns:a16="http://schemas.microsoft.com/office/drawing/2014/main" id="{7DE2BA23-27DE-9A84-D049-94BD2FDDFB12}"/>
+              </a:ext>
+            </a:extLst>
+          </p:cNvPr>
           <p:cNvSpPr>
             <a:spLocks noGrp="1"/>
           </p:cNvSpPr>
@@ -4583,7 +5005,13 @@
       </p:sp>
       <p:sp>
         <p:nvSpPr>
-          <p:cNvPr id="3" name="Content Placeholder 2"/>
+          <p:cNvPr id="3" name="Content Placeholder 2">
+            <a:extLst>
+              <a:ext uri="{FF2B5EF4-FFF2-40B4-BE49-F238E27FC236}">
+                <a16:creationId xmlns:a16="http://schemas.microsoft.com/office/drawing/2014/main" id="{45969992-D875-2929-E350-487E7B6CD246}"/>
+              </a:ext>
+            </a:extLst>
+          </p:cNvPr>
           <p:cNvSpPr>
             <a:spLocks noGrp="1"/>
           </p:cNvSpPr>
@@ -4665,7 +5093,13 @@
       </p:grpSpPr>
       <p:sp>
         <p:nvSpPr>
-          <p:cNvPr id="2" name="Title 1"/>
+          <p:cNvPr id="2" name="Title 1">
+            <a:extLst>
+              <a:ext uri="{FF2B5EF4-FFF2-40B4-BE49-F238E27FC236}">
+                <a16:creationId xmlns:a16="http://schemas.microsoft.com/office/drawing/2014/main" id="{7DE2BA23-27DE-9A84-D049-94BD2FDDFB12}"/>
+              </a:ext>
+            </a:extLst>
+          </p:cNvPr>
           <p:cNvSpPr>
             <a:spLocks noGrp="1"/>
           </p:cNvSpPr>
@@ -4690,7 +5124,13 @@
       </p:sp>
       <p:sp>
         <p:nvSpPr>
-          <p:cNvPr id="3" name="Content Placeholder 2"/>
+          <p:cNvPr id="3" name="Content Placeholder 2">
+            <a:extLst>
+              <a:ext uri="{FF2B5EF4-FFF2-40B4-BE49-F238E27FC236}">
+                <a16:creationId xmlns:a16="http://schemas.microsoft.com/office/drawing/2014/main" id="{45969992-D875-2929-E350-487E7B6CD246}"/>
+              </a:ext>
+            </a:extLst>
+          </p:cNvPr>
           <p:cNvSpPr>
             <a:spLocks noGrp="1"/>
           </p:cNvSpPr>
@@ -4749,7 +5189,13 @@
       </p:grpSpPr>
       <p:sp>
         <p:nvSpPr>
-          <p:cNvPr id="2" name="Title 1"/>
+          <p:cNvPr id="2" name="Title 1">
+            <a:extLst>
+              <a:ext uri="{FF2B5EF4-FFF2-40B4-BE49-F238E27FC236}">
+                <a16:creationId xmlns:a16="http://schemas.microsoft.com/office/drawing/2014/main" id="{7DE2BA23-27DE-9A84-D049-94BD2FDDFB12}"/>
+              </a:ext>
+            </a:extLst>
+          </p:cNvPr>
           <p:cNvSpPr>
             <a:spLocks noGrp="1"/>
           </p:cNvSpPr>
@@ -4774,7 +5220,13 @@
       </p:sp>
       <p:sp>
         <p:nvSpPr>
-          <p:cNvPr id="3" name="Content Placeholder 2"/>
+          <p:cNvPr id="3" name="Content Placeholder 2">
+            <a:extLst>
+              <a:ext uri="{FF2B5EF4-FFF2-40B4-BE49-F238E27FC236}">
+                <a16:creationId xmlns:a16="http://schemas.microsoft.com/office/drawing/2014/main" id="{45969992-D875-2929-E350-487E7B6CD246}"/>
+              </a:ext>
+            </a:extLst>
+          </p:cNvPr>
           <p:cNvSpPr>
             <a:spLocks noGrp="1"/>
           </p:cNvSpPr>
@@ -4821,7 +5273,13 @@
       </p:grpSpPr>
       <p:sp>
         <p:nvSpPr>
-          <p:cNvPr id="2" name="Title 1"/>
+          <p:cNvPr id="2" name="Title 1">
+            <a:extLst>
+              <a:ext uri="{FF2B5EF4-FFF2-40B4-BE49-F238E27FC236}">
+                <a16:creationId xmlns:a16="http://schemas.microsoft.com/office/drawing/2014/main" id="{7DE2BA23-27DE-9A84-D049-94BD2FDDFB12}"/>
+              </a:ext>
+            </a:extLst>
+          </p:cNvPr>
           <p:cNvSpPr>
             <a:spLocks noGrp="1"/>
           </p:cNvSpPr>
@@ -4860,8 +5318,8 @@
         </p:blipFill>
         <p:spPr bwMode="auto">
           <a:xfrm>
-            <a:off x="850900" y="1193800"/>
-            <a:ext cx="7442200" cy="2882900"/>
+            <a:off x="1143000" y="1816100"/>
+            <a:ext cx="9893300" cy="3835400"/>
           </a:xfrm>
           <a:prstGeom prst="rect">
             <a:avLst/>
@@ -4882,8 +5340,8 @@
         </p:nvSpPr>
         <p:spPr>
           <a:xfrm>
-            <a:off x="457200" y="4076700"/>
-            <a:ext cx="8229600" cy="508000"/>
+            <a:off x="838200" y="5651500"/>
+            <a:ext cx="10515600" cy="508000"/>
           </a:xfrm>
           <a:prstGeom prst="rect">
             <a:avLst/>
@@ -4928,7 +5386,13 @@
       </p:grpSpPr>
       <p:sp>
         <p:nvSpPr>
-          <p:cNvPr id="2" name="Title 1"/>
+          <p:cNvPr id="2" name="Title 1">
+            <a:extLst>
+              <a:ext uri="{FF2B5EF4-FFF2-40B4-BE49-F238E27FC236}">
+                <a16:creationId xmlns:a16="http://schemas.microsoft.com/office/drawing/2014/main" id="{7DE2BA23-27DE-9A84-D049-94BD2FDDFB12}"/>
+              </a:ext>
+            </a:extLst>
+          </p:cNvPr>
           <p:cNvSpPr>
             <a:spLocks noGrp="1"/>
           </p:cNvSpPr>
@@ -4967,8 +5431,8 @@
         </p:blipFill>
         <p:spPr bwMode="auto">
           <a:xfrm>
-            <a:off x="787400" y="1193800"/>
-            <a:ext cx="7556500" cy="2882900"/>
+            <a:off x="1066800" y="1816100"/>
+            <a:ext cx="10058400" cy="3835400"/>
           </a:xfrm>
           <a:prstGeom prst="rect">
             <a:avLst/>
@@ -4989,8 +5453,8 @@
         </p:nvSpPr>
         <p:spPr>
           <a:xfrm>
-            <a:off x="457200" y="4076700"/>
-            <a:ext cx="8229600" cy="508000"/>
+            <a:off x="838200" y="5651500"/>
+            <a:ext cx="10515600" cy="508000"/>
           </a:xfrm>
           <a:prstGeom prst="rect">
             <a:avLst/>
@@ -5035,7 +5499,13 @@
       </p:grpSpPr>
       <p:sp>
         <p:nvSpPr>
-          <p:cNvPr id="2" name="Title 1"/>
+          <p:cNvPr id="2" name="Title 1">
+            <a:extLst>
+              <a:ext uri="{FF2B5EF4-FFF2-40B4-BE49-F238E27FC236}">
+                <a16:creationId xmlns:a16="http://schemas.microsoft.com/office/drawing/2014/main" id="{7DE2BA23-27DE-9A84-D049-94BD2FDDFB12}"/>
+              </a:ext>
+            </a:extLst>
+          </p:cNvPr>
           <p:cNvSpPr>
             <a:spLocks noGrp="1"/>
           </p:cNvSpPr>
@@ -5060,7 +5530,13 @@
       </p:sp>
       <p:sp>
         <p:nvSpPr>
-          <p:cNvPr id="3" name="Content Placeholder 2"/>
+          <p:cNvPr id="3" name="Content Placeholder 2">
+            <a:extLst>
+              <a:ext uri="{FF2B5EF4-FFF2-40B4-BE49-F238E27FC236}">
+                <a16:creationId xmlns:a16="http://schemas.microsoft.com/office/drawing/2014/main" id="{45969992-D875-2929-E350-487E7B6CD246}"/>
+              </a:ext>
+            </a:extLst>
+          </p:cNvPr>
           <p:cNvSpPr>
             <a:spLocks noGrp="1"/>
           </p:cNvSpPr>
@@ -5119,7 +5595,13 @@
       </p:grpSpPr>
       <p:sp>
         <p:nvSpPr>
-          <p:cNvPr id="2" name="Title 1"/>
+          <p:cNvPr id="2" name="Title 1">
+            <a:extLst>
+              <a:ext uri="{FF2B5EF4-FFF2-40B4-BE49-F238E27FC236}">
+                <a16:creationId xmlns:a16="http://schemas.microsoft.com/office/drawing/2014/main" id="{80A0CCEB-5AA3-9405-44C4-629E4B8A8924}"/>
+              </a:ext>
+            </a:extLst>
+          </p:cNvPr>
           <p:cNvSpPr>
             <a:spLocks noGrp="1"/>
           </p:cNvSpPr>
@@ -5129,8 +5611,8 @@
         </p:nvSpPr>
         <p:spPr>
           <a:xfrm>
-            <a:off x="722313" y="3305176"/>
-            <a:ext cx="7772400" cy="1021556"/>
+            <a:off x="831850" y="1709738"/>
+            <a:ext cx="10515600" cy="2852737"/>
           </a:xfrm>
         </p:spPr>
         <p:txBody>
@@ -5171,7 +5653,13 @@
       </p:grpSpPr>
       <p:sp>
         <p:nvSpPr>
-          <p:cNvPr id="2" name="Title 1"/>
+          <p:cNvPr id="2" name="Title 1">
+            <a:extLst>
+              <a:ext uri="{FF2B5EF4-FFF2-40B4-BE49-F238E27FC236}">
+                <a16:creationId xmlns:a16="http://schemas.microsoft.com/office/drawing/2014/main" id="{7DE2BA23-27DE-9A84-D049-94BD2FDDFB12}"/>
+              </a:ext>
+            </a:extLst>
+          </p:cNvPr>
           <p:cNvSpPr>
             <a:spLocks noGrp="1"/>
           </p:cNvSpPr>
@@ -5196,7 +5684,13 @@
       </p:sp>
       <p:sp>
         <p:nvSpPr>
-          <p:cNvPr id="3" name="Content Placeholder 2"/>
+          <p:cNvPr id="3" name="Content Placeholder 2">
+            <a:extLst>
+              <a:ext uri="{FF2B5EF4-FFF2-40B4-BE49-F238E27FC236}">
+                <a16:creationId xmlns:a16="http://schemas.microsoft.com/office/drawing/2014/main" id="{45969992-D875-2929-E350-487E7B6CD246}"/>
+              </a:ext>
+            </a:extLst>
+          </p:cNvPr>
           <p:cNvSpPr>
             <a:spLocks noGrp="1"/>
           </p:cNvSpPr>
@@ -5235,44 +5729,44 @@
         <a:sysClr val="window" lastClr="FFFFFF"/>
       </a:lt1>
       <a:dk2>
-        <a:srgbClr val="1F497D"/>
+        <a:srgbClr val="44546A"/>
       </a:dk2>
       <a:lt2>
-        <a:srgbClr val="EEECE1"/>
+        <a:srgbClr val="E7E6E6"/>
       </a:lt2>
       <a:accent1>
-        <a:srgbClr val="4F81BD"/>
+        <a:srgbClr val="4472C4"/>
       </a:accent1>
       <a:accent2>
-        <a:srgbClr val="C0504D"/>
+        <a:srgbClr val="ED7D31"/>
       </a:accent2>
       <a:accent3>
-        <a:srgbClr val="9BBB59"/>
+        <a:srgbClr val="A5A5A5"/>
       </a:accent3>
       <a:accent4>
-        <a:srgbClr val="8064A2"/>
+        <a:srgbClr val="FFC000"/>
       </a:accent4>
       <a:accent5>
-        <a:srgbClr val="4BACC6"/>
+        <a:srgbClr val="5B9BD5"/>
       </a:accent5>
       <a:accent6>
-        <a:srgbClr val="F79646"/>
+        <a:srgbClr val="70AD47"/>
       </a:accent6>
       <a:hlink>
-        <a:srgbClr val="0000FF"/>
+        <a:srgbClr val="0563C1"/>
       </a:hlink>
       <a:folHlink>
-        <a:srgbClr val="800080"/>
+        <a:srgbClr val="954F72"/>
       </a:folHlink>
     </a:clrScheme>
     <a:fontScheme name="Office">
       <a:majorFont>
-        <a:latin typeface="Calibri"/>
+        <a:latin typeface="Calibri Light" panose="020F0302020204030204"/>
         <a:ea typeface=""/>
         <a:cs typeface=""/>
-        <a:font script="Jpan" typeface="ＭＳ Ｐゴシック"/>
+        <a:font script="Jpan" typeface="游ゴシック Light"/>
         <a:font script="Hang" typeface="맑은 고딕"/>
-        <a:font script="Hans" typeface="宋体"/>
+        <a:font script="Hans" typeface="等线 Light"/>
         <a:font script="Hant" typeface="新細明體"/>
         <a:font script="Arab" typeface="Times New Roman"/>
         <a:font script="Hebr" typeface="Times New Roman"/>
@@ -5300,14 +5794,31 @@
         <a:font script="Viet" typeface="Times New Roman"/>
         <a:font script="Uigh" typeface="Microsoft Uighur"/>
         <a:font script="Geor" typeface="Sylfaen"/>
+        <a:font script="Armn" typeface="Arial"/>
+        <a:font script="Bugi" typeface="Leelawadee UI"/>
+        <a:font script="Bopo" typeface="Microsoft JhengHei"/>
+        <a:font script="Java" typeface="Javanese Text"/>
+        <a:font script="Lisu" typeface="Segoe UI"/>
+        <a:font script="Mymr" typeface="Myanmar Text"/>
+        <a:font script="Nkoo" typeface="Ebrima"/>
+        <a:font script="Olck" typeface="Nirmala UI"/>
+        <a:font script="Osma" typeface="Ebrima"/>
+        <a:font script="Phag" typeface="Phagspa"/>
+        <a:font script="Syrn" typeface="Estrangelo Edessa"/>
+        <a:font script="Syrj" typeface="Estrangelo Edessa"/>
+        <a:font script="Syre" typeface="Estrangelo Edessa"/>
+        <a:font script="Sora" typeface="Nirmala UI"/>
+        <a:font script="Tale" typeface="Microsoft Tai Le"/>
+        <a:font script="Talu" typeface="Microsoft New Tai Lue"/>
+        <a:font script="Tfng" typeface="Ebrima"/>
       </a:majorFont>
       <a:minorFont>
-        <a:latin typeface="Calibri"/>
+        <a:latin typeface="Calibri" panose="020F0502020204030204"/>
         <a:ea typeface=""/>
         <a:cs typeface=""/>
-        <a:font script="Jpan" typeface="ＭＳ Ｐゴシック"/>
+        <a:font script="Jpan" typeface="游ゴシック"/>
         <a:font script="Hang" typeface="맑은 고딕"/>
-        <a:font script="Hans" typeface="宋体"/>
+        <a:font script="Hans" typeface="等线"/>
         <a:font script="Hant" typeface="新細明體"/>
         <a:font script="Arab" typeface="Arial"/>
         <a:font script="Hebr" typeface="Arial"/>
@@ -5335,6 +5846,23 @@
         <a:font script="Viet" typeface="Arial"/>
         <a:font script="Uigh" typeface="Microsoft Uighur"/>
         <a:font script="Geor" typeface="Sylfaen"/>
+        <a:font script="Armn" typeface="Arial"/>
+        <a:font script="Bugi" typeface="Leelawadee UI"/>
+        <a:font script="Bopo" typeface="Microsoft JhengHei"/>
+        <a:font script="Java" typeface="Javanese Text"/>
+        <a:font script="Lisu" typeface="Segoe UI"/>
+        <a:font script="Mymr" typeface="Myanmar Text"/>
+        <a:font script="Nkoo" typeface="Ebrima"/>
+        <a:font script="Olck" typeface="Nirmala UI"/>
+        <a:font script="Osma" typeface="Ebrima"/>
+        <a:font script="Phag" typeface="Phagspa"/>
+        <a:font script="Syrn" typeface="Estrangelo Edessa"/>
+        <a:font script="Syrj" typeface="Estrangelo Edessa"/>
+        <a:font script="Syre" typeface="Estrangelo Edessa"/>
+        <a:font script="Sora" typeface="Nirmala UI"/>
+        <a:font script="Tale" typeface="Microsoft Tai Le"/>
+        <a:font script="Talu" typeface="Microsoft New Tai Lue"/>
+        <a:font script="Tfng" typeface="Ebrima"/>
       </a:minorFont>
     </a:fontScheme>
     <a:fmtScheme name="Office">
@@ -5346,201 +5874,142 @@
           <a:gsLst>
             <a:gs pos="0">
               <a:schemeClr val="phClr">
-                <a:tint val="50000"/>
-                <a:satMod val="300000"/>
+                <a:lumMod val="110000"/>
+                <a:satMod val="105000"/>
+                <a:tint val="67000"/>
               </a:schemeClr>
             </a:gs>
-            <a:gs pos="35000">
+            <a:gs pos="50000">
               <a:schemeClr val="phClr">
-                <a:tint val="37000"/>
-                <a:satMod val="300000"/>
+                <a:lumMod val="105000"/>
+                <a:satMod val="103000"/>
+                <a:tint val="73000"/>
               </a:schemeClr>
             </a:gs>
             <a:gs pos="100000">
               <a:schemeClr val="phClr">
-                <a:tint val="15000"/>
-                <a:satMod val="350000"/>
+                <a:lumMod val="105000"/>
+                <a:satMod val="109000"/>
+                <a:tint val="81000"/>
               </a:schemeClr>
             </a:gs>
           </a:gsLst>
-          <a:lin ang="16200000" scaled="1"/>
+          <a:lin ang="5400000" scaled="0"/>
         </a:gradFill>
         <a:gradFill rotWithShape="1">
           <a:gsLst>
             <a:gs pos="0">
               <a:schemeClr val="phClr">
-                <a:tint val="100000"/>
+                <a:satMod val="103000"/>
+                <a:lumMod val="102000"/>
+                <a:tint val="94000"/>
+              </a:schemeClr>
+            </a:gs>
+            <a:gs pos="50000">
+              <a:schemeClr val="phClr">
+                <a:satMod val="110000"/>
+                <a:lumMod val="100000"/>
                 <a:shade val="100000"/>
-                <a:satMod val="130000"/>
               </a:schemeClr>
             </a:gs>
             <a:gs pos="100000">
               <a:schemeClr val="phClr">
-                <a:tint val="50000"/>
-                <a:shade val="100000"/>
-                <a:satMod val="350000"/>
+                <a:lumMod val="99000"/>
+                <a:satMod val="120000"/>
+                <a:shade val="78000"/>
               </a:schemeClr>
             </a:gs>
           </a:gsLst>
-          <a:lin ang="16200000" scaled="0"/>
+          <a:lin ang="5400000" scaled="0"/>
         </a:gradFill>
       </a:fillStyleLst>
       <a:lnStyleLst>
-        <a:ln w="9525" cap="flat" cmpd="sng" algn="ctr">
-          <a:solidFill>
-            <a:schemeClr val="phClr">
-              <a:shade val="95000"/>
-              <a:satMod val="105000"/>
-            </a:schemeClr>
-          </a:solidFill>
-          <a:prstDash val="solid"/>
-        </a:ln>
-        <a:ln w="25400" cap="flat" cmpd="sng" algn="ctr">
+        <a:ln w="6350" cap="flat" cmpd="sng" algn="ctr">
           <a:solidFill>
             <a:schemeClr val="phClr"/>
           </a:solidFill>
           <a:prstDash val="solid"/>
+          <a:miter lim="800000"/>
         </a:ln>
-        <a:ln w="38100" cap="flat" cmpd="sng" algn="ctr">
+        <a:ln w="12700" cap="flat" cmpd="sng" algn="ctr">
           <a:solidFill>
             <a:schemeClr val="phClr"/>
           </a:solidFill>
           <a:prstDash val="solid"/>
+          <a:miter lim="800000"/>
+        </a:ln>
+        <a:ln w="19050" cap="flat" cmpd="sng" algn="ctr">
+          <a:solidFill>
+            <a:schemeClr val="phClr"/>
+          </a:solidFill>
+          <a:prstDash val="solid"/>
+          <a:miter lim="800000"/>
         </a:ln>
       </a:lnStyleLst>
       <a:effectStyleLst>
         <a:effectStyle>
+          <a:effectLst/>
+        </a:effectStyle>
+        <a:effectStyle>
+          <a:effectLst/>
+        </a:effectStyle>
+        <a:effectStyle>
           <a:effectLst>
-            <a:outerShdw blurRad="40000" dist="20000" dir="5400000" rotWithShape="0">
+            <a:outerShdw blurRad="57150" dist="19050" dir="5400000" algn="ctr" rotWithShape="0">
               <a:srgbClr val="000000">
-                <a:alpha val="38000"/>
+                <a:alpha val="63000"/>
               </a:srgbClr>
             </a:outerShdw>
           </a:effectLst>
-        </a:effectStyle>
-        <a:effectStyle>
-          <a:effectLst>
-            <a:outerShdw blurRad="40000" dist="23000" dir="5400000" rotWithShape="0">
-              <a:srgbClr val="000000">
-                <a:alpha val="35000"/>
-              </a:srgbClr>
-            </a:outerShdw>
-          </a:effectLst>
-        </a:effectStyle>
-        <a:effectStyle>
-          <a:effectLst>
-            <a:outerShdw blurRad="40000" dist="23000" dir="5400000" rotWithShape="0">
-              <a:srgbClr val="000000">
-                <a:alpha val="35000"/>
-              </a:srgbClr>
-            </a:outerShdw>
-          </a:effectLst>
-          <a:scene3d>
-            <a:camera prst="orthographicFront">
-              <a:rot lat="0" lon="0" rev="0"/>
-            </a:camera>
-            <a:lightRig rig="threePt" dir="t">
-              <a:rot lat="0" lon="0" rev="1200000"/>
-            </a:lightRig>
-          </a:scene3d>
-          <a:sp3d>
-            <a:bevelT w="63500" h="25400"/>
-          </a:sp3d>
         </a:effectStyle>
       </a:effectStyleLst>
       <a:bgFillStyleLst>
         <a:solidFill>
           <a:schemeClr val="phClr"/>
         </a:solidFill>
+        <a:solidFill>
+          <a:schemeClr val="phClr">
+            <a:tint val="95000"/>
+            <a:satMod val="170000"/>
+          </a:schemeClr>
+        </a:solidFill>
         <a:gradFill rotWithShape="1">
           <a:gsLst>
             <a:gs pos="0">
               <a:schemeClr val="phClr">
-                <a:tint val="40000"/>
-                <a:satMod val="350000"/>
+                <a:tint val="93000"/>
+                <a:satMod val="150000"/>
+                <a:shade val="98000"/>
+                <a:lumMod val="102000"/>
               </a:schemeClr>
             </a:gs>
-            <a:gs pos="40000">
+            <a:gs pos="50000">
               <a:schemeClr val="phClr">
-                <a:tint val="45000"/>
-                <a:shade val="99000"/>
-                <a:satMod val="350000"/>
+                <a:tint val="98000"/>
+                <a:satMod val="130000"/>
+                <a:shade val="90000"/>
+                <a:lumMod val="103000"/>
               </a:schemeClr>
             </a:gs>
             <a:gs pos="100000">
               <a:schemeClr val="phClr">
-                <a:shade val="20000"/>
-                <a:satMod val="255000"/>
+                <a:shade val="63000"/>
+                <a:satMod val="120000"/>
               </a:schemeClr>
             </a:gs>
           </a:gsLst>
-          <a:path path="circle">
-            <a:fillToRect l="50000" t="-80000" r="50000" b="180000"/>
-          </a:path>
-        </a:gradFill>
-        <a:gradFill rotWithShape="1">
-          <a:gsLst>
-            <a:gs pos="0">
-              <a:schemeClr val="phClr">
-                <a:tint val="80000"/>
-                <a:satMod val="300000"/>
-              </a:schemeClr>
-            </a:gs>
-            <a:gs pos="100000">
-              <a:schemeClr val="phClr">
-                <a:shade val="30000"/>
-                <a:satMod val="200000"/>
-              </a:schemeClr>
-            </a:gs>
-          </a:gsLst>
-          <a:path path="circle">
-            <a:fillToRect l="50000" t="50000" r="50000" b="50000"/>
-          </a:path>
+          <a:lin ang="5400000" scaled="0"/>
         </a:gradFill>
       </a:bgFillStyleLst>
     </a:fmtScheme>
   </a:themeElements>
-  <a:objectDefaults>
-    <a:spDef>
-      <a:spPr/>
-      <a:bodyPr/>
-      <a:lstStyle/>
-      <a:style>
-        <a:lnRef idx="1">
-          <a:schemeClr val="accent1"/>
-        </a:lnRef>
-        <a:fillRef idx="3">
-          <a:schemeClr val="accent1"/>
-        </a:fillRef>
-        <a:effectRef idx="2">
-          <a:schemeClr val="accent1"/>
-        </a:effectRef>
-        <a:fontRef idx="minor">
-          <a:schemeClr val="lt1"/>
-        </a:fontRef>
-      </a:style>
-    </a:spDef>
-    <a:lnDef>
-      <a:spPr/>
-      <a:bodyPr/>
-      <a:lstStyle/>
-      <a:style>
-        <a:lnRef idx="2">
-          <a:schemeClr val="accent1"/>
-        </a:lnRef>
-        <a:fillRef idx="0">
-          <a:schemeClr val="accent1"/>
-        </a:fillRef>
-        <a:effectRef idx="1">
-          <a:schemeClr val="accent1"/>
-        </a:effectRef>
-        <a:fontRef idx="minor">
-          <a:schemeClr val="tx1"/>
-        </a:fontRef>
-      </a:style>
-    </a:lnDef>
-  </a:objectDefaults>
+  <a:objectDefaults/>
   <a:extraClrSchemeLst/>
+  <a:extLst>
+    <a:ext uri="{05A4C25C-085E-4340-85A3-A5531E510DB2}">
+      <thm15:themeFamily xmlns:thm15="http://schemas.microsoft.com/office/thememl/2012/main" name="Office Theme" id="{62F939B6-93AF-4DB8-9C6B-D6C7DFDC589F}" vid="{4A3C46E8-61CC-4603-A589-7422A47A8E4A}"/>
+    </a:ext>
+  </a:extLst>
 </a:theme>
 </file>
 

</xml_diff>

<commit_message>
vault backup: 2024-04-22 16:01:04
</commit_message>
<xml_diff>
--- a/git-pres/git-pres.pptx
+++ b/git-pres/git-pres.pptx
@@ -30,13 +30,13 @@
     <p:sldId id="278" r:id="rId24"/>
     <p:sldId id="279" r:id="rId25"/>
   </p:sldIdLst>
-  <p:sldSz cx="12192000" cy="6858000"/>
+  <p:sldSz cx="9144000" cy="5143500" type="screen16x9"/>
   <p:notesSz cx="6858000" cy="9144000"/>
   <p:defaultTextStyle>
     <a:defPPr>
       <a:defRPr lang="en-US"/>
     </a:defPPr>
-    <a:lvl1pPr algn="l" defTabSz="914400" eaLnBrk="1" hangingPunct="1" latinLnBrk="0" marL="0" rtl="0">
+    <a:lvl1pPr algn="l" defTabSz="457200" eaLnBrk="1" hangingPunct="1" latinLnBrk="0" marL="0" rtl="0">
       <a:defRPr kern="1200" sz="1800">
         <a:solidFill>
           <a:schemeClr val="tx1"/>
@@ -46,7 +46,7 @@
         <a:cs typeface="+mn-cs"/>
       </a:defRPr>
     </a:lvl1pPr>
-    <a:lvl2pPr algn="l" defTabSz="914400" eaLnBrk="1" hangingPunct="1" latinLnBrk="0" marL="457200" rtl="0">
+    <a:lvl2pPr algn="l" defTabSz="457200" eaLnBrk="1" hangingPunct="1" latinLnBrk="0" marL="457200" rtl="0">
       <a:defRPr kern="1200" sz="1800">
         <a:solidFill>
           <a:schemeClr val="tx1"/>
@@ -56,7 +56,7 @@
         <a:cs typeface="+mn-cs"/>
       </a:defRPr>
     </a:lvl2pPr>
-    <a:lvl3pPr algn="l" defTabSz="914400" eaLnBrk="1" hangingPunct="1" latinLnBrk="0" marL="914400" rtl="0">
+    <a:lvl3pPr algn="l" defTabSz="457200" eaLnBrk="1" hangingPunct="1" latinLnBrk="0" marL="914400" rtl="0">
       <a:defRPr kern="1200" sz="1800">
         <a:solidFill>
           <a:schemeClr val="tx1"/>
@@ -66,7 +66,7 @@
         <a:cs typeface="+mn-cs"/>
       </a:defRPr>
     </a:lvl3pPr>
-    <a:lvl4pPr algn="l" defTabSz="914400" eaLnBrk="1" hangingPunct="1" latinLnBrk="0" marL="1371600" rtl="0">
+    <a:lvl4pPr algn="l" defTabSz="457200" eaLnBrk="1" hangingPunct="1" latinLnBrk="0" marL="1371600" rtl="0">
       <a:defRPr kern="1200" sz="1800">
         <a:solidFill>
           <a:schemeClr val="tx1"/>
@@ -76,7 +76,7 @@
         <a:cs typeface="+mn-cs"/>
       </a:defRPr>
     </a:lvl4pPr>
-    <a:lvl5pPr algn="l" defTabSz="914400" eaLnBrk="1" hangingPunct="1" latinLnBrk="0" marL="1828800" rtl="0">
+    <a:lvl5pPr algn="l" defTabSz="457200" eaLnBrk="1" hangingPunct="1" latinLnBrk="0" marL="1828800" rtl="0">
       <a:defRPr kern="1200" sz="1800">
         <a:solidFill>
           <a:schemeClr val="tx1"/>
@@ -86,7 +86,7 @@
         <a:cs typeface="+mn-cs"/>
       </a:defRPr>
     </a:lvl5pPr>
-    <a:lvl6pPr algn="l" defTabSz="914400" eaLnBrk="1" hangingPunct="1" latinLnBrk="0" marL="2286000" rtl="0">
+    <a:lvl6pPr algn="l" defTabSz="457200" eaLnBrk="1" hangingPunct="1" latinLnBrk="0" marL="2286000" rtl="0">
       <a:defRPr kern="1200" sz="1800">
         <a:solidFill>
           <a:schemeClr val="tx1"/>
@@ -96,7 +96,7 @@
         <a:cs typeface="+mn-cs"/>
       </a:defRPr>
     </a:lvl6pPr>
-    <a:lvl7pPr algn="l" defTabSz="914400" eaLnBrk="1" hangingPunct="1" latinLnBrk="0" marL="2743200" rtl="0">
+    <a:lvl7pPr algn="l" defTabSz="457200" eaLnBrk="1" hangingPunct="1" latinLnBrk="0" marL="2743200" rtl="0">
       <a:defRPr kern="1200" sz="1800">
         <a:solidFill>
           <a:schemeClr val="tx1"/>
@@ -106,7 +106,7 @@
         <a:cs typeface="+mn-cs"/>
       </a:defRPr>
     </a:lvl7pPr>
-    <a:lvl8pPr algn="l" defTabSz="914400" eaLnBrk="1" hangingPunct="1" latinLnBrk="0" marL="3200400" rtl="0">
+    <a:lvl8pPr algn="l" defTabSz="457200" eaLnBrk="1" hangingPunct="1" latinLnBrk="0" marL="3200400" rtl="0">
       <a:defRPr kern="1200" sz="1800">
         <a:solidFill>
           <a:schemeClr val="tx1"/>
@@ -116,7 +116,7 @@
         <a:cs typeface="+mn-cs"/>
       </a:defRPr>
     </a:lvl8pPr>
-    <a:lvl9pPr algn="l" defTabSz="914400" eaLnBrk="1" hangingPunct="1" latinLnBrk="0" marL="3657600" rtl="0">
+    <a:lvl9pPr algn="l" defTabSz="457200" eaLnBrk="1" hangingPunct="1" latinLnBrk="0" marL="3657600" rtl="0">
       <a:defRPr kern="1200" sz="1800">
         <a:solidFill>
           <a:schemeClr val="tx1"/>
@@ -129,7 +129,18 @@
   </p:defaultTextStyle>
   <p:extLst>
     <p:ext uri="{EFAFB233-063F-42B5-8137-9DF3F51BA10A}">
-      <p15:sldGuideLst xmlns:p15="http://schemas.microsoft.com/office/powerpoint/2012/main"/>
+      <p15:sldGuideLst xmlns:p15="http://schemas.microsoft.com/office/powerpoint/2012/main">
+        <p15:guide id="1" orient="horz" pos="1620" userDrawn="1">
+          <p15:clr>
+            <a:srgbClr val="A4A3A4"/>
+          </p15:clr>
+        </p15:guide>
+        <p15:guide id="2" pos="2880" userDrawn="1">
+          <p15:clr>
+            <a:srgbClr val="A4A3A4"/>
+          </p15:clr>
+        </p15:guide>
+      </p15:sldGuideLst>
     </p:ext>
   </p:extLst>
 </p:presentation>
@@ -154,13 +165,7 @@
       </p:grpSpPr>
       <p:sp>
         <p:nvSpPr>
-          <p:cNvPr id="2" name="Title 1">
-            <a:extLst>
-              <a:ext uri="{FF2B5EF4-FFF2-40B4-BE49-F238E27FC236}">
-                <a16:creationId xmlns:a16="http://schemas.microsoft.com/office/drawing/2014/main" id="{54A9766F-B35E-DD24-6EE8-5B4A00B11314}"/>
-              </a:ext>
-            </a:extLst>
-          </p:cNvPr>
+          <p:cNvPr id="2" name="Title 1"/>
           <p:cNvSpPr>
             <a:spLocks noGrp="1"/>
           </p:cNvSpPr>
@@ -170,17 +175,13 @@
         </p:nvSpPr>
         <p:spPr>
           <a:xfrm>
-            <a:off x="1524000" y="1122363"/>
-            <a:ext cx="9144000" cy="2387600"/>
+            <a:off x="685800" y="1597819"/>
+            <a:ext cx="7772400" cy="1102519"/>
           </a:xfrm>
         </p:spPr>
         <p:txBody>
-          <a:bodyPr anchor="b"/>
-          <a:lstStyle>
-            <a:lvl1pPr algn="ctr">
-              <a:defRPr sz="6000"/>
-            </a:lvl1pPr>
-          </a:lstStyle>
+          <a:bodyPr/>
+          <a:lstStyle/>
           <a:p>
             <a:r>
               <a:rPr lang="en-US"/>
@@ -191,13 +192,7 @@
       </p:sp>
       <p:sp>
         <p:nvSpPr>
-          <p:cNvPr id="3" name="Subtitle 2">
-            <a:extLst>
-              <a:ext uri="{FF2B5EF4-FFF2-40B4-BE49-F238E27FC236}">
-                <a16:creationId xmlns:a16="http://schemas.microsoft.com/office/drawing/2014/main" id="{AC3D4351-CC8D-D79B-1ED3-78F1614FAB0F}"/>
-              </a:ext>
-            </a:extLst>
-          </p:cNvPr>
+          <p:cNvPr id="3" name="Subtitle 2"/>
           <p:cNvSpPr>
             <a:spLocks noGrp="1"/>
           </p:cNvSpPr>
@@ -207,8 +202,8 @@
         </p:nvSpPr>
         <p:spPr>
           <a:xfrm>
-            <a:off x="1524000" y="3602038"/>
-            <a:ext cx="9144000" cy="1655762"/>
+            <a:off x="1371600" y="2914650"/>
+            <a:ext cx="6400800" cy="1314450"/>
           </a:xfrm>
         </p:spPr>
         <p:txBody>
@@ -216,39 +211,93 @@
           <a:lstStyle>
             <a:lvl1pPr marL="0" indent="0" algn="ctr">
               <a:buNone/>
-              <a:defRPr sz="2400"/>
+              <a:defRPr>
+                <a:solidFill>
+                  <a:schemeClr val="tx1">
+                    <a:tint val="75000"/>
+                  </a:schemeClr>
+                </a:solidFill>
+              </a:defRPr>
             </a:lvl1pPr>
-            <a:lvl2pPr marL="457200" indent="0" algn="ctr">
-              <a:buNone/>
-              <a:defRPr sz="2000"/>
+            <a:lvl2pPr marL="342900" indent="0" algn="ctr">
+              <a:buNone/>
+              <a:defRPr>
+                <a:solidFill>
+                  <a:schemeClr val="tx1">
+                    <a:tint val="75000"/>
+                  </a:schemeClr>
+                </a:solidFill>
+              </a:defRPr>
             </a:lvl2pPr>
-            <a:lvl3pPr marL="914400" indent="0" algn="ctr">
-              <a:buNone/>
-              <a:defRPr sz="1800"/>
+            <a:lvl3pPr marL="685800" indent="0" algn="ctr">
+              <a:buNone/>
+              <a:defRPr>
+                <a:solidFill>
+                  <a:schemeClr val="tx1">
+                    <a:tint val="75000"/>
+                  </a:schemeClr>
+                </a:solidFill>
+              </a:defRPr>
             </a:lvl3pPr>
-            <a:lvl4pPr marL="1371600" indent="0" algn="ctr">
-              <a:buNone/>
-              <a:defRPr sz="1600"/>
+            <a:lvl4pPr marL="1028700" indent="0" algn="ctr">
+              <a:buNone/>
+              <a:defRPr>
+                <a:solidFill>
+                  <a:schemeClr val="tx1">
+                    <a:tint val="75000"/>
+                  </a:schemeClr>
+                </a:solidFill>
+              </a:defRPr>
             </a:lvl4pPr>
-            <a:lvl5pPr marL="1828800" indent="0" algn="ctr">
-              <a:buNone/>
-              <a:defRPr sz="1600"/>
+            <a:lvl5pPr marL="1371600" indent="0" algn="ctr">
+              <a:buNone/>
+              <a:defRPr>
+                <a:solidFill>
+                  <a:schemeClr val="tx1">
+                    <a:tint val="75000"/>
+                  </a:schemeClr>
+                </a:solidFill>
+              </a:defRPr>
             </a:lvl5pPr>
-            <a:lvl6pPr marL="2286000" indent="0" algn="ctr">
-              <a:buNone/>
-              <a:defRPr sz="1600"/>
+            <a:lvl6pPr marL="1714500" indent="0" algn="ctr">
+              <a:buNone/>
+              <a:defRPr>
+                <a:solidFill>
+                  <a:schemeClr val="tx1">
+                    <a:tint val="75000"/>
+                  </a:schemeClr>
+                </a:solidFill>
+              </a:defRPr>
             </a:lvl6pPr>
-            <a:lvl7pPr marL="2743200" indent="0" algn="ctr">
-              <a:buNone/>
-              <a:defRPr sz="1600"/>
+            <a:lvl7pPr marL="2057400" indent="0" algn="ctr">
+              <a:buNone/>
+              <a:defRPr>
+                <a:solidFill>
+                  <a:schemeClr val="tx1">
+                    <a:tint val="75000"/>
+                  </a:schemeClr>
+                </a:solidFill>
+              </a:defRPr>
             </a:lvl7pPr>
-            <a:lvl8pPr marL="3200400" indent="0" algn="ctr">
-              <a:buNone/>
-              <a:defRPr sz="1600"/>
+            <a:lvl8pPr marL="2400300" indent="0" algn="ctr">
+              <a:buNone/>
+              <a:defRPr>
+                <a:solidFill>
+                  <a:schemeClr val="tx1">
+                    <a:tint val="75000"/>
+                  </a:schemeClr>
+                </a:solidFill>
+              </a:defRPr>
             </a:lvl8pPr>
-            <a:lvl9pPr marL="3657600" indent="0" algn="ctr">
-              <a:buNone/>
-              <a:defRPr sz="1600"/>
+            <a:lvl9pPr marL="2743200" indent="0" algn="ctr">
+              <a:buNone/>
+              <a:defRPr>
+                <a:solidFill>
+                  <a:schemeClr val="tx1">
+                    <a:tint val="75000"/>
+                  </a:schemeClr>
+                </a:solidFill>
+              </a:defRPr>
             </a:lvl9pPr>
           </a:lstStyle>
           <a:p>
@@ -261,13 +310,7 @@
       </p:sp>
       <p:sp>
         <p:nvSpPr>
-          <p:cNvPr id="4" name="Date Placeholder 3">
-            <a:extLst>
-              <a:ext uri="{FF2B5EF4-FFF2-40B4-BE49-F238E27FC236}">
-                <a16:creationId xmlns:a16="http://schemas.microsoft.com/office/drawing/2014/main" id="{A9F1E45F-B0E7-448F-0809-45CCE5CB7755}"/>
-              </a:ext>
-            </a:extLst>
-          </p:cNvPr>
+          <p:cNvPr id="4" name="Date Placeholder 3"/>
           <p:cNvSpPr>
             <a:spLocks noGrp="1"/>
           </p:cNvSpPr>
@@ -280,7 +323,7 @@
           <a:bodyPr/>
           <a:lstStyle/>
           <a:p>
-            <a:fld id="{F4FC6662-9247-444B-ADF5-BDC4693D4AA0}" type="datetimeFigureOut">
+            <a:fld id="{241EB5C9-1307-BA42-ABA2-0BC069CD8E7F}" type="datetimeFigureOut">
               <a:rPr lang="en-US" smtClean="0"/>
               <a:t>4/22/2024</a:t>
             </a:fld>
@@ -290,13 +333,7 @@
       </p:sp>
       <p:sp>
         <p:nvSpPr>
-          <p:cNvPr id="5" name="Footer Placeholder 4">
-            <a:extLst>
-              <a:ext uri="{FF2B5EF4-FFF2-40B4-BE49-F238E27FC236}">
-                <a16:creationId xmlns:a16="http://schemas.microsoft.com/office/drawing/2014/main" id="{FD06D032-6196-080A-B076-B960FEF3525D}"/>
-              </a:ext>
-            </a:extLst>
-          </p:cNvPr>
+          <p:cNvPr id="5" name="Footer Placeholder 4"/>
           <p:cNvSpPr>
             <a:spLocks noGrp="1"/>
           </p:cNvSpPr>
@@ -315,13 +352,7 @@
       </p:sp>
       <p:sp>
         <p:nvSpPr>
-          <p:cNvPr id="6" name="Slide Number Placeholder 5">
-            <a:extLst>
-              <a:ext uri="{FF2B5EF4-FFF2-40B4-BE49-F238E27FC236}">
-                <a16:creationId xmlns:a16="http://schemas.microsoft.com/office/drawing/2014/main" id="{A7C740A2-9E64-046B-B7E8-BABA247FB0F2}"/>
-              </a:ext>
-            </a:extLst>
-          </p:cNvPr>
+          <p:cNvPr id="6" name="Slide Number Placeholder 5"/>
           <p:cNvSpPr>
             <a:spLocks noGrp="1"/>
           </p:cNvSpPr>
@@ -334,7 +365,7 @@
           <a:bodyPr/>
           <a:lstStyle/>
           <a:p>
-            <a:fld id="{87F339C6-D84C-874E-B4F5-90CEABF287B1}" type="slidenum">
+            <a:fld id="{C5EF2332-01BF-834F-8236-50238282D533}" type="slidenum">
               <a:rPr lang="en-US" smtClean="0"/>
               <a:t>‹#›</a:t>
             </a:fld>
@@ -345,7 +376,7 @@
     </p:spTree>
     <p:extLst>
       <p:ext uri="{BB962C8B-B14F-4D97-AF65-F5344CB8AC3E}">
-        <p14:creationId xmlns:p14="http://schemas.microsoft.com/office/powerpoint/2010/main" val="1043440884"/>
+        <p14:creationId xmlns:p14="http://schemas.microsoft.com/office/powerpoint/2010/main" val="1444357513"/>
       </p:ext>
     </p:extLst>
   </p:cSld>
@@ -374,13 +405,7 @@
       </p:grpSpPr>
       <p:sp>
         <p:nvSpPr>
-          <p:cNvPr id="2" name="Title 1">
-            <a:extLst>
-              <a:ext uri="{FF2B5EF4-FFF2-40B4-BE49-F238E27FC236}">
-                <a16:creationId xmlns:a16="http://schemas.microsoft.com/office/drawing/2014/main" id="{A216D389-C037-D6DC-B081-E31D04EC4AF4}"/>
-              </a:ext>
-            </a:extLst>
-          </p:cNvPr>
+          <p:cNvPr id="2" name="Title 1"/>
           <p:cNvSpPr>
             <a:spLocks noGrp="1"/>
           </p:cNvSpPr>
@@ -402,13 +427,7 @@
       </p:sp>
       <p:sp>
         <p:nvSpPr>
-          <p:cNvPr id="3" name="Vertical Text Placeholder 2">
-            <a:extLst>
-              <a:ext uri="{FF2B5EF4-FFF2-40B4-BE49-F238E27FC236}">
-                <a16:creationId xmlns:a16="http://schemas.microsoft.com/office/drawing/2014/main" id="{D0EF7C4B-0F5E-8FB3-D72F-4C0CCEA33AC0}"/>
-              </a:ext>
-            </a:extLst>
-          </p:cNvPr>
+          <p:cNvPr id="3" name="Vertical Text Placeholder 2"/>
           <p:cNvSpPr>
             <a:spLocks noGrp="1"/>
           </p:cNvSpPr>
@@ -459,13 +478,7 @@
       </p:sp>
       <p:sp>
         <p:nvSpPr>
-          <p:cNvPr id="4" name="Date Placeholder 3">
-            <a:extLst>
-              <a:ext uri="{FF2B5EF4-FFF2-40B4-BE49-F238E27FC236}">
-                <a16:creationId xmlns:a16="http://schemas.microsoft.com/office/drawing/2014/main" id="{72196289-A474-C6AA-A2D2-659ECF1E8F77}"/>
-              </a:ext>
-            </a:extLst>
-          </p:cNvPr>
+          <p:cNvPr id="4" name="Date Placeholder 3"/>
           <p:cNvSpPr>
             <a:spLocks noGrp="1"/>
           </p:cNvSpPr>
@@ -478,7 +491,7 @@
           <a:bodyPr/>
           <a:lstStyle/>
           <a:p>
-            <a:fld id="{F4FC6662-9247-444B-ADF5-BDC4693D4AA0}" type="datetimeFigureOut">
+            <a:fld id="{241EB5C9-1307-BA42-ABA2-0BC069CD8E7F}" type="datetimeFigureOut">
               <a:rPr lang="en-US" smtClean="0"/>
               <a:t>4/22/2024</a:t>
             </a:fld>
@@ -488,13 +501,7 @@
       </p:sp>
       <p:sp>
         <p:nvSpPr>
-          <p:cNvPr id="5" name="Footer Placeholder 4">
-            <a:extLst>
-              <a:ext uri="{FF2B5EF4-FFF2-40B4-BE49-F238E27FC236}">
-                <a16:creationId xmlns:a16="http://schemas.microsoft.com/office/drawing/2014/main" id="{1BF1933E-A33D-640D-1199-D89CBD3A519A}"/>
-              </a:ext>
-            </a:extLst>
-          </p:cNvPr>
+          <p:cNvPr id="5" name="Footer Placeholder 4"/>
           <p:cNvSpPr>
             <a:spLocks noGrp="1"/>
           </p:cNvSpPr>
@@ -513,13 +520,7 @@
       </p:sp>
       <p:sp>
         <p:nvSpPr>
-          <p:cNvPr id="6" name="Slide Number Placeholder 5">
-            <a:extLst>
-              <a:ext uri="{FF2B5EF4-FFF2-40B4-BE49-F238E27FC236}">
-                <a16:creationId xmlns:a16="http://schemas.microsoft.com/office/drawing/2014/main" id="{D13F676B-DB4D-8AEB-263B-718F28D1EF29}"/>
-              </a:ext>
-            </a:extLst>
-          </p:cNvPr>
+          <p:cNvPr id="6" name="Slide Number Placeholder 5"/>
           <p:cNvSpPr>
             <a:spLocks noGrp="1"/>
           </p:cNvSpPr>
@@ -532,7 +533,7 @@
           <a:bodyPr/>
           <a:lstStyle/>
           <a:p>
-            <a:fld id="{87F339C6-D84C-874E-B4F5-90CEABF287B1}" type="slidenum">
+            <a:fld id="{C5EF2332-01BF-834F-8236-50238282D533}" type="slidenum">
               <a:rPr lang="en-US" smtClean="0"/>
               <a:t>‹#›</a:t>
             </a:fld>
@@ -543,7 +544,7 @@
     </p:spTree>
     <p:extLst>
       <p:ext uri="{BB962C8B-B14F-4D97-AF65-F5344CB8AC3E}">
-        <p14:creationId xmlns:p14="http://schemas.microsoft.com/office/powerpoint/2010/main" val="2455954565"/>
+        <p14:creationId xmlns:p14="http://schemas.microsoft.com/office/powerpoint/2010/main" val="313914798"/>
       </p:ext>
     </p:extLst>
   </p:cSld>
@@ -572,13 +573,7 @@
       </p:grpSpPr>
       <p:sp>
         <p:nvSpPr>
-          <p:cNvPr id="2" name="Vertical Title 1">
-            <a:extLst>
-              <a:ext uri="{FF2B5EF4-FFF2-40B4-BE49-F238E27FC236}">
-                <a16:creationId xmlns:a16="http://schemas.microsoft.com/office/drawing/2014/main" id="{EEB82250-5E99-9A80-02BB-A3F3F6FCA67F}"/>
-              </a:ext>
-            </a:extLst>
-          </p:cNvPr>
+          <p:cNvPr id="2" name="Vertical Title 1"/>
           <p:cNvSpPr>
             <a:spLocks noGrp="1"/>
           </p:cNvSpPr>
@@ -588,8 +583,8 @@
         </p:nvSpPr>
         <p:spPr>
           <a:xfrm>
-            <a:off x="8724900" y="365125"/>
-            <a:ext cx="2628900" cy="5811838"/>
+            <a:off x="6629400" y="205979"/>
+            <a:ext cx="2057400" cy="4388644"/>
           </a:xfrm>
         </p:spPr>
         <p:txBody>
@@ -605,13 +600,7 @@
       </p:sp>
       <p:sp>
         <p:nvSpPr>
-          <p:cNvPr id="3" name="Vertical Text Placeholder 2">
-            <a:extLst>
-              <a:ext uri="{FF2B5EF4-FFF2-40B4-BE49-F238E27FC236}">
-                <a16:creationId xmlns:a16="http://schemas.microsoft.com/office/drawing/2014/main" id="{2231EEE6-F09B-2CB2-C28C-24EE799A89F1}"/>
-              </a:ext>
-            </a:extLst>
-          </p:cNvPr>
+          <p:cNvPr id="3" name="Vertical Text Placeholder 2"/>
           <p:cNvSpPr>
             <a:spLocks noGrp="1"/>
           </p:cNvSpPr>
@@ -621,8 +610,8 @@
         </p:nvSpPr>
         <p:spPr>
           <a:xfrm>
-            <a:off x="838200" y="365125"/>
-            <a:ext cx="7734300" cy="5811838"/>
+            <a:off x="457200" y="205979"/>
+            <a:ext cx="6019800" cy="4388644"/>
           </a:xfrm>
         </p:spPr>
         <p:txBody>
@@ -667,13 +656,7 @@
       </p:sp>
       <p:sp>
         <p:nvSpPr>
-          <p:cNvPr id="4" name="Date Placeholder 3">
-            <a:extLst>
-              <a:ext uri="{FF2B5EF4-FFF2-40B4-BE49-F238E27FC236}">
-                <a16:creationId xmlns:a16="http://schemas.microsoft.com/office/drawing/2014/main" id="{69C252A5-C314-62D2-A3F7-2445D77D43A8}"/>
-              </a:ext>
-            </a:extLst>
-          </p:cNvPr>
+          <p:cNvPr id="4" name="Date Placeholder 3"/>
           <p:cNvSpPr>
             <a:spLocks noGrp="1"/>
           </p:cNvSpPr>
@@ -686,7 +669,7 @@
           <a:bodyPr/>
           <a:lstStyle/>
           <a:p>
-            <a:fld id="{F4FC6662-9247-444B-ADF5-BDC4693D4AA0}" type="datetimeFigureOut">
+            <a:fld id="{241EB5C9-1307-BA42-ABA2-0BC069CD8E7F}" type="datetimeFigureOut">
               <a:rPr lang="en-US" smtClean="0"/>
               <a:t>4/22/2024</a:t>
             </a:fld>
@@ -696,13 +679,7 @@
       </p:sp>
       <p:sp>
         <p:nvSpPr>
-          <p:cNvPr id="5" name="Footer Placeholder 4">
-            <a:extLst>
-              <a:ext uri="{FF2B5EF4-FFF2-40B4-BE49-F238E27FC236}">
-                <a16:creationId xmlns:a16="http://schemas.microsoft.com/office/drawing/2014/main" id="{B06E5EC8-EB23-554A-D184-D959FE6021E0}"/>
-              </a:ext>
-            </a:extLst>
-          </p:cNvPr>
+          <p:cNvPr id="5" name="Footer Placeholder 4"/>
           <p:cNvSpPr>
             <a:spLocks noGrp="1"/>
           </p:cNvSpPr>
@@ -721,13 +698,7 @@
       </p:sp>
       <p:sp>
         <p:nvSpPr>
-          <p:cNvPr id="6" name="Slide Number Placeholder 5">
-            <a:extLst>
-              <a:ext uri="{FF2B5EF4-FFF2-40B4-BE49-F238E27FC236}">
-                <a16:creationId xmlns:a16="http://schemas.microsoft.com/office/drawing/2014/main" id="{64C840B0-F02A-4DD0-F9C2-113C5E3726A8}"/>
-              </a:ext>
-            </a:extLst>
-          </p:cNvPr>
+          <p:cNvPr id="6" name="Slide Number Placeholder 5"/>
           <p:cNvSpPr>
             <a:spLocks noGrp="1"/>
           </p:cNvSpPr>
@@ -740,7 +711,7 @@
           <a:bodyPr/>
           <a:lstStyle/>
           <a:p>
-            <a:fld id="{87F339C6-D84C-874E-B4F5-90CEABF287B1}" type="slidenum">
+            <a:fld id="{C5EF2332-01BF-834F-8236-50238282D533}" type="slidenum">
               <a:rPr lang="en-US" smtClean="0"/>
               <a:t>‹#›</a:t>
             </a:fld>
@@ -751,7 +722,7 @@
     </p:spTree>
     <p:extLst>
       <p:ext uri="{BB962C8B-B14F-4D97-AF65-F5344CB8AC3E}">
-        <p14:creationId xmlns:p14="http://schemas.microsoft.com/office/powerpoint/2010/main" val="1678142098"/>
+        <p14:creationId xmlns:p14="http://schemas.microsoft.com/office/powerpoint/2010/main" val="2581529045"/>
       </p:ext>
     </p:extLst>
   </p:cSld>
@@ -780,13 +751,7 @@
       </p:grpSpPr>
       <p:sp>
         <p:nvSpPr>
-          <p:cNvPr id="2" name="Title 1">
-            <a:extLst>
-              <a:ext uri="{FF2B5EF4-FFF2-40B4-BE49-F238E27FC236}">
-                <a16:creationId xmlns:a16="http://schemas.microsoft.com/office/drawing/2014/main" id="{7DE2BA23-27DE-9A84-D049-94BD2FDDFB12}"/>
-              </a:ext>
-            </a:extLst>
-          </p:cNvPr>
+          <p:cNvPr id="2" name="Title 1"/>
           <p:cNvSpPr>
             <a:spLocks noGrp="1"/>
           </p:cNvSpPr>
@@ -808,13 +773,7 @@
       </p:sp>
       <p:sp>
         <p:nvSpPr>
-          <p:cNvPr id="3" name="Content Placeholder 2">
-            <a:extLst>
-              <a:ext uri="{FF2B5EF4-FFF2-40B4-BE49-F238E27FC236}">
-                <a16:creationId xmlns:a16="http://schemas.microsoft.com/office/drawing/2014/main" id="{45969992-D875-2929-E350-487E7B6CD246}"/>
-              </a:ext>
-            </a:extLst>
-          </p:cNvPr>
+          <p:cNvPr id="3" name="Content Placeholder 2"/>
           <p:cNvSpPr>
             <a:spLocks noGrp="1"/>
           </p:cNvSpPr>
@@ -865,13 +824,7 @@
       </p:sp>
       <p:sp>
         <p:nvSpPr>
-          <p:cNvPr id="4" name="Date Placeholder 3">
-            <a:extLst>
-              <a:ext uri="{FF2B5EF4-FFF2-40B4-BE49-F238E27FC236}">
-                <a16:creationId xmlns:a16="http://schemas.microsoft.com/office/drawing/2014/main" id="{2BD965FD-C9C5-74DA-9B28-2F462EC4226E}"/>
-              </a:ext>
-            </a:extLst>
-          </p:cNvPr>
+          <p:cNvPr id="4" name="Date Placeholder 3"/>
           <p:cNvSpPr>
             <a:spLocks noGrp="1"/>
           </p:cNvSpPr>
@@ -884,7 +837,7 @@
           <a:bodyPr/>
           <a:lstStyle/>
           <a:p>
-            <a:fld id="{F4FC6662-9247-444B-ADF5-BDC4693D4AA0}" type="datetimeFigureOut">
+            <a:fld id="{241EB5C9-1307-BA42-ABA2-0BC069CD8E7F}" type="datetimeFigureOut">
               <a:rPr lang="en-US" smtClean="0"/>
               <a:t>4/22/2024</a:t>
             </a:fld>
@@ -894,13 +847,7 @@
       </p:sp>
       <p:sp>
         <p:nvSpPr>
-          <p:cNvPr id="5" name="Footer Placeholder 4">
-            <a:extLst>
-              <a:ext uri="{FF2B5EF4-FFF2-40B4-BE49-F238E27FC236}">
-                <a16:creationId xmlns:a16="http://schemas.microsoft.com/office/drawing/2014/main" id="{745233D1-6005-3C35-CA01-A07E8C38A7A7}"/>
-              </a:ext>
-            </a:extLst>
-          </p:cNvPr>
+          <p:cNvPr id="5" name="Footer Placeholder 4"/>
           <p:cNvSpPr>
             <a:spLocks noGrp="1"/>
           </p:cNvSpPr>
@@ -919,13 +866,7 @@
       </p:sp>
       <p:sp>
         <p:nvSpPr>
-          <p:cNvPr id="6" name="Slide Number Placeholder 5">
-            <a:extLst>
-              <a:ext uri="{FF2B5EF4-FFF2-40B4-BE49-F238E27FC236}">
-                <a16:creationId xmlns:a16="http://schemas.microsoft.com/office/drawing/2014/main" id="{0B58ECFC-50BB-F567-C263-35BDC7177A4A}"/>
-              </a:ext>
-            </a:extLst>
-          </p:cNvPr>
+          <p:cNvPr id="6" name="Slide Number Placeholder 5"/>
           <p:cNvSpPr>
             <a:spLocks noGrp="1"/>
           </p:cNvSpPr>
@@ -938,7 +879,7 @@
           <a:bodyPr/>
           <a:lstStyle/>
           <a:p>
-            <a:fld id="{87F339C6-D84C-874E-B4F5-90CEABF287B1}" type="slidenum">
+            <a:fld id="{C5EF2332-01BF-834F-8236-50238282D533}" type="slidenum">
               <a:rPr lang="en-US" smtClean="0"/>
               <a:t>‹#›</a:t>
             </a:fld>
@@ -949,7 +890,7 @@
     </p:spTree>
     <p:extLst>
       <p:ext uri="{BB962C8B-B14F-4D97-AF65-F5344CB8AC3E}">
-        <p14:creationId xmlns:p14="http://schemas.microsoft.com/office/powerpoint/2010/main" val="3286831115"/>
+        <p14:creationId xmlns:p14="http://schemas.microsoft.com/office/powerpoint/2010/main" val="338346009"/>
       </p:ext>
     </p:extLst>
   </p:cSld>
@@ -978,13 +919,7 @@
       </p:grpSpPr>
       <p:sp>
         <p:nvSpPr>
-          <p:cNvPr id="2" name="Title 1">
-            <a:extLst>
-              <a:ext uri="{FF2B5EF4-FFF2-40B4-BE49-F238E27FC236}">
-                <a16:creationId xmlns:a16="http://schemas.microsoft.com/office/drawing/2014/main" id="{80A0CCEB-5AA3-9405-44C4-629E4B8A8924}"/>
-              </a:ext>
-            </a:extLst>
-          </p:cNvPr>
+          <p:cNvPr id="2" name="Title 1"/>
           <p:cNvSpPr>
             <a:spLocks noGrp="1"/>
           </p:cNvSpPr>
@@ -994,53 +929,47 @@
         </p:nvSpPr>
         <p:spPr>
           <a:xfrm>
-            <a:off x="831850" y="1709738"/>
-            <a:ext cx="10515600" cy="2852737"/>
+            <a:off x="722313" y="3305176"/>
+            <a:ext cx="7772400" cy="1021556"/>
           </a:xfrm>
         </p:spPr>
         <p:txBody>
+          <a:bodyPr anchor="t"/>
+          <a:lstStyle>
+            <a:lvl1pPr algn="l">
+              <a:defRPr sz="3000" b="1" cap="all"/>
+            </a:lvl1pPr>
+          </a:lstStyle>
+          <a:p>
+            <a:r>
+              <a:rPr lang="en-US"/>
+              <a:t>Click to edit Master title style</a:t>
+            </a:r>
+          </a:p>
+        </p:txBody>
+      </p:sp>
+      <p:sp>
+        <p:nvSpPr>
+          <p:cNvPr id="3" name="Text Placeholder 2"/>
+          <p:cNvSpPr>
+            <a:spLocks noGrp="1"/>
+          </p:cNvSpPr>
+          <p:nvPr>
+            <p:ph type="body" idx="1"/>
+          </p:nvPr>
+        </p:nvSpPr>
+        <p:spPr>
+          <a:xfrm>
+            <a:off x="722313" y="2180035"/>
+            <a:ext cx="7772400" cy="1125140"/>
+          </a:xfrm>
+        </p:spPr>
+        <p:txBody>
           <a:bodyPr anchor="b"/>
           <a:lstStyle>
-            <a:lvl1pPr>
-              <a:defRPr sz="6000"/>
-            </a:lvl1pPr>
-          </a:lstStyle>
-          <a:p>
-            <a:r>
-              <a:rPr lang="en-US"/>
-              <a:t>Click to edit Master title style</a:t>
-            </a:r>
-          </a:p>
-        </p:txBody>
-      </p:sp>
-      <p:sp>
-        <p:nvSpPr>
-          <p:cNvPr id="3" name="Text Placeholder 2">
-            <a:extLst>
-              <a:ext uri="{FF2B5EF4-FFF2-40B4-BE49-F238E27FC236}">
-                <a16:creationId xmlns:a16="http://schemas.microsoft.com/office/drawing/2014/main" id="{8EA4C9DC-7405-7951-3C82-E2F1FF78D8F5}"/>
-              </a:ext>
-            </a:extLst>
-          </p:cNvPr>
-          <p:cNvSpPr>
-            <a:spLocks noGrp="1"/>
-          </p:cNvSpPr>
-          <p:nvPr>
-            <p:ph type="body" idx="1"/>
-          </p:nvPr>
-        </p:nvSpPr>
-        <p:spPr>
-          <a:xfrm>
-            <a:off x="831850" y="4589463"/>
-            <a:ext cx="10515600" cy="1500187"/>
-          </a:xfrm>
-        </p:spPr>
-        <p:txBody>
-          <a:bodyPr/>
-          <a:lstStyle>
             <a:lvl1pPr marL="0" indent="0">
               <a:buNone/>
-              <a:defRPr sz="2400">
+              <a:defRPr sz="1500">
                 <a:solidFill>
                   <a:schemeClr val="tx1">
                     <a:tint val="75000"/>
@@ -1048,9 +977,9 @@
                 </a:solidFill>
               </a:defRPr>
             </a:lvl1pPr>
-            <a:lvl2pPr marL="457200" indent="0">
-              <a:buNone/>
-              <a:defRPr sz="2000">
+            <a:lvl2pPr marL="342900" indent="0">
+              <a:buNone/>
+              <a:defRPr sz="1350">
                 <a:solidFill>
                   <a:schemeClr val="tx1">
                     <a:tint val="75000"/>
@@ -1058,9 +987,9 @@
                 </a:solidFill>
               </a:defRPr>
             </a:lvl2pPr>
-            <a:lvl3pPr marL="914400" indent="0">
-              <a:buNone/>
-              <a:defRPr sz="1800">
+            <a:lvl3pPr marL="685800" indent="0">
+              <a:buNone/>
+              <a:defRPr sz="1200">
                 <a:solidFill>
                   <a:schemeClr val="tx1">
                     <a:tint val="75000"/>
@@ -1068,9 +997,9 @@
                 </a:solidFill>
               </a:defRPr>
             </a:lvl3pPr>
-            <a:lvl4pPr marL="1371600" indent="0">
-              <a:buNone/>
-              <a:defRPr sz="1600">
+            <a:lvl4pPr marL="1028700" indent="0">
+              <a:buNone/>
+              <a:defRPr sz="1050">
                 <a:solidFill>
                   <a:schemeClr val="tx1">
                     <a:tint val="75000"/>
@@ -1078,9 +1007,9 @@
                 </a:solidFill>
               </a:defRPr>
             </a:lvl4pPr>
-            <a:lvl5pPr marL="1828800" indent="0">
-              <a:buNone/>
-              <a:defRPr sz="1600">
+            <a:lvl5pPr marL="1371600" indent="0">
+              <a:buNone/>
+              <a:defRPr sz="1050">
                 <a:solidFill>
                   <a:schemeClr val="tx1">
                     <a:tint val="75000"/>
@@ -1088,9 +1017,9 @@
                 </a:solidFill>
               </a:defRPr>
             </a:lvl5pPr>
-            <a:lvl6pPr marL="2286000" indent="0">
-              <a:buNone/>
-              <a:defRPr sz="1600">
+            <a:lvl6pPr marL="1714500" indent="0">
+              <a:buNone/>
+              <a:defRPr sz="1050">
                 <a:solidFill>
                   <a:schemeClr val="tx1">
                     <a:tint val="75000"/>
@@ -1098,9 +1027,9 @@
                 </a:solidFill>
               </a:defRPr>
             </a:lvl6pPr>
-            <a:lvl7pPr marL="2743200" indent="0">
-              <a:buNone/>
-              <a:defRPr sz="1600">
+            <a:lvl7pPr marL="2057400" indent="0">
+              <a:buNone/>
+              <a:defRPr sz="1050">
                 <a:solidFill>
                   <a:schemeClr val="tx1">
                     <a:tint val="75000"/>
@@ -1108,9 +1037,9 @@
                 </a:solidFill>
               </a:defRPr>
             </a:lvl7pPr>
-            <a:lvl8pPr marL="3200400" indent="0">
-              <a:buNone/>
-              <a:defRPr sz="1600">
+            <a:lvl8pPr marL="2400300" indent="0">
+              <a:buNone/>
+              <a:defRPr sz="1050">
                 <a:solidFill>
                   <a:schemeClr val="tx1">
                     <a:tint val="75000"/>
@@ -1118,9 +1047,9 @@
                 </a:solidFill>
               </a:defRPr>
             </a:lvl8pPr>
-            <a:lvl9pPr marL="3657600" indent="0">
-              <a:buNone/>
-              <a:defRPr sz="1600">
+            <a:lvl9pPr marL="2743200" indent="0">
+              <a:buNone/>
+              <a:defRPr sz="1050">
                 <a:solidFill>
                   <a:schemeClr val="tx1">
                     <a:tint val="75000"/>
@@ -1140,13 +1069,7 @@
       </p:sp>
       <p:sp>
         <p:nvSpPr>
-          <p:cNvPr id="4" name="Date Placeholder 3">
-            <a:extLst>
-              <a:ext uri="{FF2B5EF4-FFF2-40B4-BE49-F238E27FC236}">
-                <a16:creationId xmlns:a16="http://schemas.microsoft.com/office/drawing/2014/main" id="{85DCD653-DED2-C1AC-88FC-6B90ACA28670}"/>
-              </a:ext>
-            </a:extLst>
-          </p:cNvPr>
+          <p:cNvPr id="4" name="Date Placeholder 3"/>
           <p:cNvSpPr>
             <a:spLocks noGrp="1"/>
           </p:cNvSpPr>
@@ -1159,7 +1082,7 @@
           <a:bodyPr/>
           <a:lstStyle/>
           <a:p>
-            <a:fld id="{F4FC6662-9247-444B-ADF5-BDC4693D4AA0}" type="datetimeFigureOut">
+            <a:fld id="{241EB5C9-1307-BA42-ABA2-0BC069CD8E7F}" type="datetimeFigureOut">
               <a:rPr lang="en-US" smtClean="0"/>
               <a:t>4/22/2024</a:t>
             </a:fld>
@@ -1169,13 +1092,7 @@
       </p:sp>
       <p:sp>
         <p:nvSpPr>
-          <p:cNvPr id="5" name="Footer Placeholder 4">
-            <a:extLst>
-              <a:ext uri="{FF2B5EF4-FFF2-40B4-BE49-F238E27FC236}">
-                <a16:creationId xmlns:a16="http://schemas.microsoft.com/office/drawing/2014/main" id="{765C20DB-8DC8-E810-057C-230B9C35659A}"/>
-              </a:ext>
-            </a:extLst>
-          </p:cNvPr>
+          <p:cNvPr id="5" name="Footer Placeholder 4"/>
           <p:cNvSpPr>
             <a:spLocks noGrp="1"/>
           </p:cNvSpPr>
@@ -1194,13 +1111,7 @@
       </p:sp>
       <p:sp>
         <p:nvSpPr>
-          <p:cNvPr id="6" name="Slide Number Placeholder 5">
-            <a:extLst>
-              <a:ext uri="{FF2B5EF4-FFF2-40B4-BE49-F238E27FC236}">
-                <a16:creationId xmlns:a16="http://schemas.microsoft.com/office/drawing/2014/main" id="{A800D20A-2C27-1EC9-6E78-269B7E9B1534}"/>
-              </a:ext>
-            </a:extLst>
-          </p:cNvPr>
+          <p:cNvPr id="6" name="Slide Number Placeholder 5"/>
           <p:cNvSpPr>
             <a:spLocks noGrp="1"/>
           </p:cNvSpPr>
@@ -1213,7 +1124,7 @@
           <a:bodyPr/>
           <a:lstStyle/>
           <a:p>
-            <a:fld id="{87F339C6-D84C-874E-B4F5-90CEABF287B1}" type="slidenum">
+            <a:fld id="{C5EF2332-01BF-834F-8236-50238282D533}" type="slidenum">
               <a:rPr lang="en-US" smtClean="0"/>
               <a:t>‹#›</a:t>
             </a:fld>
@@ -1224,7 +1135,7 @@
     </p:spTree>
     <p:extLst>
       <p:ext uri="{BB962C8B-B14F-4D97-AF65-F5344CB8AC3E}">
-        <p14:creationId xmlns:p14="http://schemas.microsoft.com/office/powerpoint/2010/main" val="4127086873"/>
+        <p14:creationId xmlns:p14="http://schemas.microsoft.com/office/powerpoint/2010/main" val="1073069076"/>
       </p:ext>
     </p:extLst>
   </p:cSld>
@@ -1253,13 +1164,7 @@
       </p:grpSpPr>
       <p:sp>
         <p:nvSpPr>
-          <p:cNvPr id="2" name="Title 1">
-            <a:extLst>
-              <a:ext uri="{FF2B5EF4-FFF2-40B4-BE49-F238E27FC236}">
-                <a16:creationId xmlns:a16="http://schemas.microsoft.com/office/drawing/2014/main" id="{8716FE55-FB22-E504-1900-26C94E0182F6}"/>
-              </a:ext>
-            </a:extLst>
-          </p:cNvPr>
+          <p:cNvPr id="2" name="Title 1"/>
           <p:cNvSpPr>
             <a:spLocks noGrp="1"/>
           </p:cNvSpPr>
@@ -1281,13 +1186,7 @@
       </p:sp>
       <p:sp>
         <p:nvSpPr>
-          <p:cNvPr id="3" name="Content Placeholder 2">
-            <a:extLst>
-              <a:ext uri="{FF2B5EF4-FFF2-40B4-BE49-F238E27FC236}">
-                <a16:creationId xmlns:a16="http://schemas.microsoft.com/office/drawing/2014/main" id="{53CAB199-7042-D3E0-A6DC-33D6CFE2E164}"/>
-              </a:ext>
-            </a:extLst>
-          </p:cNvPr>
+          <p:cNvPr id="3" name="Content Placeholder 2"/>
           <p:cNvSpPr>
             <a:spLocks noGrp="1"/>
           </p:cNvSpPr>
@@ -1297,13 +1196,41 @@
         </p:nvSpPr>
         <p:spPr>
           <a:xfrm>
-            <a:off x="838200" y="1825625"/>
-            <a:ext cx="5181600" cy="4351338"/>
+            <a:off x="457200" y="1200151"/>
+            <a:ext cx="4038600" cy="3394472"/>
           </a:xfrm>
         </p:spPr>
         <p:txBody>
           <a:bodyPr/>
-          <a:lstStyle/>
+          <a:lstStyle>
+            <a:lvl1pPr>
+              <a:defRPr sz="2100"/>
+            </a:lvl1pPr>
+            <a:lvl2pPr>
+              <a:defRPr sz="1800"/>
+            </a:lvl2pPr>
+            <a:lvl3pPr>
+              <a:defRPr sz="1500"/>
+            </a:lvl3pPr>
+            <a:lvl4pPr>
+              <a:defRPr sz="1350"/>
+            </a:lvl4pPr>
+            <a:lvl5pPr>
+              <a:defRPr sz="1350"/>
+            </a:lvl5pPr>
+            <a:lvl6pPr>
+              <a:defRPr sz="1350"/>
+            </a:lvl6pPr>
+            <a:lvl7pPr>
+              <a:defRPr sz="1350"/>
+            </a:lvl7pPr>
+            <a:lvl8pPr>
+              <a:defRPr sz="1350"/>
+            </a:lvl8pPr>
+            <a:lvl9pPr>
+              <a:defRPr sz="1350"/>
+            </a:lvl9pPr>
+          </a:lstStyle>
           <a:p>
             <a:pPr lvl="0"/>
             <a:r>
@@ -1343,13 +1270,7 @@
       </p:sp>
       <p:sp>
         <p:nvSpPr>
-          <p:cNvPr id="4" name="Content Placeholder 3">
-            <a:extLst>
-              <a:ext uri="{FF2B5EF4-FFF2-40B4-BE49-F238E27FC236}">
-                <a16:creationId xmlns:a16="http://schemas.microsoft.com/office/drawing/2014/main" id="{D28ACE5D-C2A1-90AF-81C4-D06D05ACE358}"/>
-              </a:ext>
-            </a:extLst>
-          </p:cNvPr>
+          <p:cNvPr id="4" name="Content Placeholder 3"/>
           <p:cNvSpPr>
             <a:spLocks noGrp="1"/>
           </p:cNvSpPr>
@@ -1359,13 +1280,41 @@
         </p:nvSpPr>
         <p:spPr>
           <a:xfrm>
-            <a:off x="6172200" y="1825625"/>
-            <a:ext cx="5181600" cy="4351338"/>
+            <a:off x="4648200" y="1200151"/>
+            <a:ext cx="4038600" cy="3394472"/>
           </a:xfrm>
         </p:spPr>
         <p:txBody>
           <a:bodyPr/>
-          <a:lstStyle/>
+          <a:lstStyle>
+            <a:lvl1pPr>
+              <a:defRPr sz="2100"/>
+            </a:lvl1pPr>
+            <a:lvl2pPr>
+              <a:defRPr sz="1800"/>
+            </a:lvl2pPr>
+            <a:lvl3pPr>
+              <a:defRPr sz="1500"/>
+            </a:lvl3pPr>
+            <a:lvl4pPr>
+              <a:defRPr sz="1350"/>
+            </a:lvl4pPr>
+            <a:lvl5pPr>
+              <a:defRPr sz="1350"/>
+            </a:lvl5pPr>
+            <a:lvl6pPr>
+              <a:defRPr sz="1350"/>
+            </a:lvl6pPr>
+            <a:lvl7pPr>
+              <a:defRPr sz="1350"/>
+            </a:lvl7pPr>
+            <a:lvl8pPr>
+              <a:defRPr sz="1350"/>
+            </a:lvl8pPr>
+            <a:lvl9pPr>
+              <a:defRPr sz="1350"/>
+            </a:lvl9pPr>
+          </a:lstStyle>
           <a:p>
             <a:pPr lvl="0"/>
             <a:r>
@@ -1405,13 +1354,7 @@
       </p:sp>
       <p:sp>
         <p:nvSpPr>
-          <p:cNvPr id="5" name="Date Placeholder 4">
-            <a:extLst>
-              <a:ext uri="{FF2B5EF4-FFF2-40B4-BE49-F238E27FC236}">
-                <a16:creationId xmlns:a16="http://schemas.microsoft.com/office/drawing/2014/main" id="{2EDB2742-6B2A-9098-1832-8595E8FF959D}"/>
-              </a:ext>
-            </a:extLst>
-          </p:cNvPr>
+          <p:cNvPr id="5" name="Date Placeholder 4"/>
           <p:cNvSpPr>
             <a:spLocks noGrp="1"/>
           </p:cNvSpPr>
@@ -1424,7 +1367,7 @@
           <a:bodyPr/>
           <a:lstStyle/>
           <a:p>
-            <a:fld id="{F4FC6662-9247-444B-ADF5-BDC4693D4AA0}" type="datetimeFigureOut">
+            <a:fld id="{241EB5C9-1307-BA42-ABA2-0BC069CD8E7F}" type="datetimeFigureOut">
               <a:rPr lang="en-US" smtClean="0"/>
               <a:t>4/22/2024</a:t>
             </a:fld>
@@ -1434,13 +1377,7 @@
       </p:sp>
       <p:sp>
         <p:nvSpPr>
-          <p:cNvPr id="6" name="Footer Placeholder 5">
-            <a:extLst>
-              <a:ext uri="{FF2B5EF4-FFF2-40B4-BE49-F238E27FC236}">
-                <a16:creationId xmlns:a16="http://schemas.microsoft.com/office/drawing/2014/main" id="{5247BBA0-661E-719C-562B-F887D6FA033F}"/>
-              </a:ext>
-            </a:extLst>
-          </p:cNvPr>
+          <p:cNvPr id="6" name="Footer Placeholder 5"/>
           <p:cNvSpPr>
             <a:spLocks noGrp="1"/>
           </p:cNvSpPr>
@@ -1459,13 +1396,7 @@
       </p:sp>
       <p:sp>
         <p:nvSpPr>
-          <p:cNvPr id="7" name="Slide Number Placeholder 6">
-            <a:extLst>
-              <a:ext uri="{FF2B5EF4-FFF2-40B4-BE49-F238E27FC236}">
-                <a16:creationId xmlns:a16="http://schemas.microsoft.com/office/drawing/2014/main" id="{CC8F8A08-7932-5245-59E3-ACF804BBBD34}"/>
-              </a:ext>
-            </a:extLst>
-          </p:cNvPr>
+          <p:cNvPr id="7" name="Slide Number Placeholder 6"/>
           <p:cNvSpPr>
             <a:spLocks noGrp="1"/>
           </p:cNvSpPr>
@@ -1478,7 +1409,7 @@
           <a:bodyPr/>
           <a:lstStyle/>
           <a:p>
-            <a:fld id="{87F339C6-D84C-874E-B4F5-90CEABF287B1}" type="slidenum">
+            <a:fld id="{C5EF2332-01BF-834F-8236-50238282D533}" type="slidenum">
               <a:rPr lang="en-US" smtClean="0"/>
               <a:t>‹#›</a:t>
             </a:fld>
@@ -1489,7 +1420,7 @@
     </p:spTree>
     <p:extLst>
       <p:ext uri="{BB962C8B-B14F-4D97-AF65-F5344CB8AC3E}">
-        <p14:creationId xmlns:p14="http://schemas.microsoft.com/office/powerpoint/2010/main" val="3301033312"/>
+        <p14:creationId xmlns:p14="http://schemas.microsoft.com/office/powerpoint/2010/main" val="2619886245"/>
       </p:ext>
     </p:extLst>
   </p:cSld>
@@ -1518,57 +1449,44 @@
       </p:grpSpPr>
       <p:sp>
         <p:nvSpPr>
-          <p:cNvPr id="2" name="Title 1">
-            <a:extLst>
-              <a:ext uri="{FF2B5EF4-FFF2-40B4-BE49-F238E27FC236}">
-                <a16:creationId xmlns:a16="http://schemas.microsoft.com/office/drawing/2014/main" id="{3E291763-00A6-A381-61DD-4B9F4C08E656}"/>
-              </a:ext>
-            </a:extLst>
-          </p:cNvPr>
+          <p:cNvPr id="2" name="Title 1"/>
           <p:cNvSpPr>
             <a:spLocks noGrp="1"/>
           </p:cNvSpPr>
           <p:nvPr>
             <p:ph type="title"/>
+          </p:nvPr>
+        </p:nvSpPr>
+        <p:spPr/>
+        <p:txBody>
+          <a:bodyPr/>
+          <a:lstStyle>
+            <a:lvl1pPr>
+              <a:defRPr/>
+            </a:lvl1pPr>
+          </a:lstStyle>
+          <a:p>
+            <a:r>
+              <a:rPr lang="en-US"/>
+              <a:t>Click to edit Master title style</a:t>
+            </a:r>
+          </a:p>
+        </p:txBody>
+      </p:sp>
+      <p:sp>
+        <p:nvSpPr>
+          <p:cNvPr id="3" name="Text Placeholder 2"/>
+          <p:cNvSpPr>
+            <a:spLocks noGrp="1"/>
+          </p:cNvSpPr>
+          <p:nvPr>
+            <p:ph type="body" idx="1"/>
           </p:nvPr>
         </p:nvSpPr>
         <p:spPr>
           <a:xfrm>
-            <a:off x="839788" y="365125"/>
-            <a:ext cx="10515600" cy="1325563"/>
-          </a:xfrm>
-        </p:spPr>
-        <p:txBody>
-          <a:bodyPr/>
-          <a:lstStyle/>
-          <a:p>
-            <a:r>
-              <a:rPr lang="en-US"/>
-              <a:t>Click to edit Master title style</a:t>
-            </a:r>
-          </a:p>
-        </p:txBody>
-      </p:sp>
-      <p:sp>
-        <p:nvSpPr>
-          <p:cNvPr id="3" name="Text Placeholder 2">
-            <a:extLst>
-              <a:ext uri="{FF2B5EF4-FFF2-40B4-BE49-F238E27FC236}">
-                <a16:creationId xmlns:a16="http://schemas.microsoft.com/office/drawing/2014/main" id="{12340FA3-C56F-5008-9582-97C3F40EDA31}"/>
-              </a:ext>
-            </a:extLst>
-          </p:cNvPr>
-          <p:cNvSpPr>
-            <a:spLocks noGrp="1"/>
-          </p:cNvSpPr>
-          <p:nvPr>
-            <p:ph type="body" idx="1"/>
-          </p:nvPr>
-        </p:nvSpPr>
-        <p:spPr>
-          <a:xfrm>
-            <a:off x="839788" y="1681163"/>
-            <a:ext cx="5157787" cy="823912"/>
+            <a:off x="457200" y="1151335"/>
+            <a:ext cx="4040188" cy="479822"/>
           </a:xfrm>
         </p:spPr>
         <p:txBody>
@@ -1576,39 +1494,39 @@
           <a:lstStyle>
             <a:lvl1pPr marL="0" indent="0">
               <a:buNone/>
-              <a:defRPr sz="2400" b="1"/>
+              <a:defRPr sz="1800" b="1"/>
             </a:lvl1pPr>
-            <a:lvl2pPr marL="457200" indent="0">
-              <a:buNone/>
-              <a:defRPr sz="2000" b="1"/>
+            <a:lvl2pPr marL="342900" indent="0">
+              <a:buNone/>
+              <a:defRPr sz="1500" b="1"/>
             </a:lvl2pPr>
-            <a:lvl3pPr marL="914400" indent="0">
-              <a:buNone/>
-              <a:defRPr sz="1800" b="1"/>
+            <a:lvl3pPr marL="685800" indent="0">
+              <a:buNone/>
+              <a:defRPr sz="1350" b="1"/>
             </a:lvl3pPr>
-            <a:lvl4pPr marL="1371600" indent="0">
-              <a:buNone/>
-              <a:defRPr sz="1600" b="1"/>
+            <a:lvl4pPr marL="1028700" indent="0">
+              <a:buNone/>
+              <a:defRPr sz="1200" b="1"/>
             </a:lvl4pPr>
-            <a:lvl5pPr marL="1828800" indent="0">
-              <a:buNone/>
-              <a:defRPr sz="1600" b="1"/>
+            <a:lvl5pPr marL="1371600" indent="0">
+              <a:buNone/>
+              <a:defRPr sz="1200" b="1"/>
             </a:lvl5pPr>
-            <a:lvl6pPr marL="2286000" indent="0">
-              <a:buNone/>
-              <a:defRPr sz="1600" b="1"/>
+            <a:lvl6pPr marL="1714500" indent="0">
+              <a:buNone/>
+              <a:defRPr sz="1200" b="1"/>
             </a:lvl6pPr>
-            <a:lvl7pPr marL="2743200" indent="0">
-              <a:buNone/>
-              <a:defRPr sz="1600" b="1"/>
+            <a:lvl7pPr marL="2057400" indent="0">
+              <a:buNone/>
+              <a:defRPr sz="1200" b="1"/>
             </a:lvl7pPr>
-            <a:lvl8pPr marL="3200400" indent="0">
-              <a:buNone/>
-              <a:defRPr sz="1600" b="1"/>
+            <a:lvl8pPr marL="2400300" indent="0">
+              <a:buNone/>
+              <a:defRPr sz="1200" b="1"/>
             </a:lvl8pPr>
-            <a:lvl9pPr marL="3657600" indent="0">
-              <a:buNone/>
-              <a:defRPr sz="1600" b="1"/>
+            <a:lvl9pPr marL="2743200" indent="0">
+              <a:buNone/>
+              <a:defRPr sz="1200" b="1"/>
             </a:lvl9pPr>
           </a:lstStyle>
           <a:p>
@@ -1622,13 +1540,7 @@
       </p:sp>
       <p:sp>
         <p:nvSpPr>
-          <p:cNvPr id="4" name="Content Placeholder 3">
-            <a:extLst>
-              <a:ext uri="{FF2B5EF4-FFF2-40B4-BE49-F238E27FC236}">
-                <a16:creationId xmlns:a16="http://schemas.microsoft.com/office/drawing/2014/main" id="{1886872A-71A6-010C-793A-218A13E3CCFC}"/>
-              </a:ext>
-            </a:extLst>
-          </p:cNvPr>
+          <p:cNvPr id="4" name="Content Placeholder 3"/>
           <p:cNvSpPr>
             <a:spLocks noGrp="1"/>
           </p:cNvSpPr>
@@ -1638,13 +1550,41 @@
         </p:nvSpPr>
         <p:spPr>
           <a:xfrm>
-            <a:off x="839788" y="2505075"/>
-            <a:ext cx="5157787" cy="3684588"/>
+            <a:off x="457200" y="1631156"/>
+            <a:ext cx="4040188" cy="2963466"/>
           </a:xfrm>
         </p:spPr>
         <p:txBody>
           <a:bodyPr/>
-          <a:lstStyle/>
+          <a:lstStyle>
+            <a:lvl1pPr>
+              <a:defRPr sz="1800"/>
+            </a:lvl1pPr>
+            <a:lvl2pPr>
+              <a:defRPr sz="1500"/>
+            </a:lvl2pPr>
+            <a:lvl3pPr>
+              <a:defRPr sz="1350"/>
+            </a:lvl3pPr>
+            <a:lvl4pPr>
+              <a:defRPr sz="1200"/>
+            </a:lvl4pPr>
+            <a:lvl5pPr>
+              <a:defRPr sz="1200"/>
+            </a:lvl5pPr>
+            <a:lvl6pPr>
+              <a:defRPr sz="1200"/>
+            </a:lvl6pPr>
+            <a:lvl7pPr>
+              <a:defRPr sz="1200"/>
+            </a:lvl7pPr>
+            <a:lvl8pPr>
+              <a:defRPr sz="1200"/>
+            </a:lvl8pPr>
+            <a:lvl9pPr>
+              <a:defRPr sz="1200"/>
+            </a:lvl9pPr>
+          </a:lstStyle>
           <a:p>
             <a:pPr lvl="0"/>
             <a:r>
@@ -1684,13 +1624,7 @@
       </p:sp>
       <p:sp>
         <p:nvSpPr>
-          <p:cNvPr id="5" name="Text Placeholder 4">
-            <a:extLst>
-              <a:ext uri="{FF2B5EF4-FFF2-40B4-BE49-F238E27FC236}">
-                <a16:creationId xmlns:a16="http://schemas.microsoft.com/office/drawing/2014/main" id="{3E723369-4221-2AAF-0FCA-13614AC9C2F1}"/>
-              </a:ext>
-            </a:extLst>
-          </p:cNvPr>
+          <p:cNvPr id="5" name="Text Placeholder 4"/>
           <p:cNvSpPr>
             <a:spLocks noGrp="1"/>
           </p:cNvSpPr>
@@ -1700,8 +1634,8 @@
         </p:nvSpPr>
         <p:spPr>
           <a:xfrm>
-            <a:off x="6172200" y="1681163"/>
-            <a:ext cx="5183188" cy="823912"/>
+            <a:off x="4645026" y="1151335"/>
+            <a:ext cx="4041775" cy="479822"/>
           </a:xfrm>
         </p:spPr>
         <p:txBody>
@@ -1709,39 +1643,39 @@
           <a:lstStyle>
             <a:lvl1pPr marL="0" indent="0">
               <a:buNone/>
-              <a:defRPr sz="2400" b="1"/>
+              <a:defRPr sz="1800" b="1"/>
             </a:lvl1pPr>
-            <a:lvl2pPr marL="457200" indent="0">
-              <a:buNone/>
-              <a:defRPr sz="2000" b="1"/>
+            <a:lvl2pPr marL="342900" indent="0">
+              <a:buNone/>
+              <a:defRPr sz="1500" b="1"/>
             </a:lvl2pPr>
-            <a:lvl3pPr marL="914400" indent="0">
-              <a:buNone/>
-              <a:defRPr sz="1800" b="1"/>
+            <a:lvl3pPr marL="685800" indent="0">
+              <a:buNone/>
+              <a:defRPr sz="1350" b="1"/>
             </a:lvl3pPr>
-            <a:lvl4pPr marL="1371600" indent="0">
-              <a:buNone/>
-              <a:defRPr sz="1600" b="1"/>
+            <a:lvl4pPr marL="1028700" indent="0">
+              <a:buNone/>
+              <a:defRPr sz="1200" b="1"/>
             </a:lvl4pPr>
-            <a:lvl5pPr marL="1828800" indent="0">
-              <a:buNone/>
-              <a:defRPr sz="1600" b="1"/>
+            <a:lvl5pPr marL="1371600" indent="0">
+              <a:buNone/>
+              <a:defRPr sz="1200" b="1"/>
             </a:lvl5pPr>
-            <a:lvl6pPr marL="2286000" indent="0">
-              <a:buNone/>
-              <a:defRPr sz="1600" b="1"/>
+            <a:lvl6pPr marL="1714500" indent="0">
+              <a:buNone/>
+              <a:defRPr sz="1200" b="1"/>
             </a:lvl6pPr>
-            <a:lvl7pPr marL="2743200" indent="0">
-              <a:buNone/>
-              <a:defRPr sz="1600" b="1"/>
+            <a:lvl7pPr marL="2057400" indent="0">
+              <a:buNone/>
+              <a:defRPr sz="1200" b="1"/>
             </a:lvl7pPr>
-            <a:lvl8pPr marL="3200400" indent="0">
-              <a:buNone/>
-              <a:defRPr sz="1600" b="1"/>
+            <a:lvl8pPr marL="2400300" indent="0">
+              <a:buNone/>
+              <a:defRPr sz="1200" b="1"/>
             </a:lvl8pPr>
-            <a:lvl9pPr marL="3657600" indent="0">
-              <a:buNone/>
-              <a:defRPr sz="1600" b="1"/>
+            <a:lvl9pPr marL="2743200" indent="0">
+              <a:buNone/>
+              <a:defRPr sz="1200" b="1"/>
             </a:lvl9pPr>
           </a:lstStyle>
           <a:p>
@@ -1755,13 +1689,7 @@
       </p:sp>
       <p:sp>
         <p:nvSpPr>
-          <p:cNvPr id="6" name="Content Placeholder 5">
-            <a:extLst>
-              <a:ext uri="{FF2B5EF4-FFF2-40B4-BE49-F238E27FC236}">
-                <a16:creationId xmlns:a16="http://schemas.microsoft.com/office/drawing/2014/main" id="{1A7AE0DD-9BF5-5FA5-6AA2-66837F36644B}"/>
-              </a:ext>
-            </a:extLst>
-          </p:cNvPr>
+          <p:cNvPr id="6" name="Content Placeholder 5"/>
           <p:cNvSpPr>
             <a:spLocks noGrp="1"/>
           </p:cNvSpPr>
@@ -1771,13 +1699,41 @@
         </p:nvSpPr>
         <p:spPr>
           <a:xfrm>
-            <a:off x="6172200" y="2505075"/>
-            <a:ext cx="5183188" cy="3684588"/>
+            <a:off x="4645026" y="1631156"/>
+            <a:ext cx="4041775" cy="2963466"/>
           </a:xfrm>
         </p:spPr>
         <p:txBody>
           <a:bodyPr/>
-          <a:lstStyle/>
+          <a:lstStyle>
+            <a:lvl1pPr>
+              <a:defRPr sz="1800"/>
+            </a:lvl1pPr>
+            <a:lvl2pPr>
+              <a:defRPr sz="1500"/>
+            </a:lvl2pPr>
+            <a:lvl3pPr>
+              <a:defRPr sz="1350"/>
+            </a:lvl3pPr>
+            <a:lvl4pPr>
+              <a:defRPr sz="1200"/>
+            </a:lvl4pPr>
+            <a:lvl5pPr>
+              <a:defRPr sz="1200"/>
+            </a:lvl5pPr>
+            <a:lvl6pPr>
+              <a:defRPr sz="1200"/>
+            </a:lvl6pPr>
+            <a:lvl7pPr>
+              <a:defRPr sz="1200"/>
+            </a:lvl7pPr>
+            <a:lvl8pPr>
+              <a:defRPr sz="1200"/>
+            </a:lvl8pPr>
+            <a:lvl9pPr>
+              <a:defRPr sz="1200"/>
+            </a:lvl9pPr>
+          </a:lstStyle>
           <a:p>
             <a:pPr lvl="0"/>
             <a:r>
@@ -1817,13 +1773,7 @@
       </p:sp>
       <p:sp>
         <p:nvSpPr>
-          <p:cNvPr id="7" name="Date Placeholder 6">
-            <a:extLst>
-              <a:ext uri="{FF2B5EF4-FFF2-40B4-BE49-F238E27FC236}">
-                <a16:creationId xmlns:a16="http://schemas.microsoft.com/office/drawing/2014/main" id="{76C23D32-DAE6-D23D-BDF6-B284655CEEA0}"/>
-              </a:ext>
-            </a:extLst>
-          </p:cNvPr>
+          <p:cNvPr id="7" name="Date Placeholder 6"/>
           <p:cNvSpPr>
             <a:spLocks noGrp="1"/>
           </p:cNvSpPr>
@@ -1836,7 +1786,7 @@
           <a:bodyPr/>
           <a:lstStyle/>
           <a:p>
-            <a:fld id="{F4FC6662-9247-444B-ADF5-BDC4693D4AA0}" type="datetimeFigureOut">
+            <a:fld id="{241EB5C9-1307-BA42-ABA2-0BC069CD8E7F}" type="datetimeFigureOut">
               <a:rPr lang="en-US" smtClean="0"/>
               <a:t>4/22/2024</a:t>
             </a:fld>
@@ -1846,13 +1796,7 @@
       </p:sp>
       <p:sp>
         <p:nvSpPr>
-          <p:cNvPr id="8" name="Footer Placeholder 7">
-            <a:extLst>
-              <a:ext uri="{FF2B5EF4-FFF2-40B4-BE49-F238E27FC236}">
-                <a16:creationId xmlns:a16="http://schemas.microsoft.com/office/drawing/2014/main" id="{B6489EE6-F480-1950-279B-277AA1520461}"/>
-              </a:ext>
-            </a:extLst>
-          </p:cNvPr>
+          <p:cNvPr id="8" name="Footer Placeholder 7"/>
           <p:cNvSpPr>
             <a:spLocks noGrp="1"/>
           </p:cNvSpPr>
@@ -1871,13 +1815,7 @@
       </p:sp>
       <p:sp>
         <p:nvSpPr>
-          <p:cNvPr id="9" name="Slide Number Placeholder 8">
-            <a:extLst>
-              <a:ext uri="{FF2B5EF4-FFF2-40B4-BE49-F238E27FC236}">
-                <a16:creationId xmlns:a16="http://schemas.microsoft.com/office/drawing/2014/main" id="{5A2C7707-3BB2-A740-1293-01A650448BD6}"/>
-              </a:ext>
-            </a:extLst>
-          </p:cNvPr>
+          <p:cNvPr id="9" name="Slide Number Placeholder 8"/>
           <p:cNvSpPr>
             <a:spLocks noGrp="1"/>
           </p:cNvSpPr>
@@ -1890,7 +1828,7 @@
           <a:bodyPr/>
           <a:lstStyle/>
           <a:p>
-            <a:fld id="{87F339C6-D84C-874E-B4F5-90CEABF287B1}" type="slidenum">
+            <a:fld id="{C5EF2332-01BF-834F-8236-50238282D533}" type="slidenum">
               <a:rPr lang="en-US" smtClean="0"/>
               <a:t>‹#›</a:t>
             </a:fld>
@@ -1901,7 +1839,7 @@
     </p:spTree>
     <p:extLst>
       <p:ext uri="{BB962C8B-B14F-4D97-AF65-F5344CB8AC3E}">
-        <p14:creationId xmlns:p14="http://schemas.microsoft.com/office/powerpoint/2010/main" val="792354096"/>
+        <p14:creationId xmlns:p14="http://schemas.microsoft.com/office/powerpoint/2010/main" val="2535793967"/>
       </p:ext>
     </p:extLst>
   </p:cSld>
@@ -1930,13 +1868,7 @@
       </p:grpSpPr>
       <p:sp>
         <p:nvSpPr>
-          <p:cNvPr id="2" name="Title 1">
-            <a:extLst>
-              <a:ext uri="{FF2B5EF4-FFF2-40B4-BE49-F238E27FC236}">
-                <a16:creationId xmlns:a16="http://schemas.microsoft.com/office/drawing/2014/main" id="{300C31D0-7786-6F0C-7F42-47ED4C0A603A}"/>
-              </a:ext>
-            </a:extLst>
-          </p:cNvPr>
+          <p:cNvPr id="2" name="Title 1"/>
           <p:cNvSpPr>
             <a:spLocks noGrp="1"/>
           </p:cNvSpPr>
@@ -1958,13 +1890,7 @@
       </p:sp>
       <p:sp>
         <p:nvSpPr>
-          <p:cNvPr id="3" name="Date Placeholder 2">
-            <a:extLst>
-              <a:ext uri="{FF2B5EF4-FFF2-40B4-BE49-F238E27FC236}">
-                <a16:creationId xmlns:a16="http://schemas.microsoft.com/office/drawing/2014/main" id="{3B02AB3A-D1A1-1F6B-3CAE-D7E6B2A3495E}"/>
-              </a:ext>
-            </a:extLst>
-          </p:cNvPr>
+          <p:cNvPr id="3" name="Date Placeholder 2"/>
           <p:cNvSpPr>
             <a:spLocks noGrp="1"/>
           </p:cNvSpPr>
@@ -1977,7 +1903,7 @@
           <a:bodyPr/>
           <a:lstStyle/>
           <a:p>
-            <a:fld id="{F4FC6662-9247-444B-ADF5-BDC4693D4AA0}" type="datetimeFigureOut">
+            <a:fld id="{241EB5C9-1307-BA42-ABA2-0BC069CD8E7F}" type="datetimeFigureOut">
               <a:rPr lang="en-US" smtClean="0"/>
               <a:t>4/22/2024</a:t>
             </a:fld>
@@ -1987,13 +1913,7 @@
       </p:sp>
       <p:sp>
         <p:nvSpPr>
-          <p:cNvPr id="4" name="Footer Placeholder 3">
-            <a:extLst>
-              <a:ext uri="{FF2B5EF4-FFF2-40B4-BE49-F238E27FC236}">
-                <a16:creationId xmlns:a16="http://schemas.microsoft.com/office/drawing/2014/main" id="{6DAA5F2E-60B3-F38B-EEE5-ED1796D2541E}"/>
-              </a:ext>
-            </a:extLst>
-          </p:cNvPr>
+          <p:cNvPr id="4" name="Footer Placeholder 3"/>
           <p:cNvSpPr>
             <a:spLocks noGrp="1"/>
           </p:cNvSpPr>
@@ -2012,13 +1932,7 @@
       </p:sp>
       <p:sp>
         <p:nvSpPr>
-          <p:cNvPr id="5" name="Slide Number Placeholder 4">
-            <a:extLst>
-              <a:ext uri="{FF2B5EF4-FFF2-40B4-BE49-F238E27FC236}">
-                <a16:creationId xmlns:a16="http://schemas.microsoft.com/office/drawing/2014/main" id="{B6F257F6-4788-FE02-F585-9A27B59A14B0}"/>
-              </a:ext>
-            </a:extLst>
-          </p:cNvPr>
+          <p:cNvPr id="5" name="Slide Number Placeholder 4"/>
           <p:cNvSpPr>
             <a:spLocks noGrp="1"/>
           </p:cNvSpPr>
@@ -2031,7 +1945,7 @@
           <a:bodyPr/>
           <a:lstStyle/>
           <a:p>
-            <a:fld id="{87F339C6-D84C-874E-B4F5-90CEABF287B1}" type="slidenum">
+            <a:fld id="{C5EF2332-01BF-834F-8236-50238282D533}" type="slidenum">
               <a:rPr lang="en-US" smtClean="0"/>
               <a:t>‹#›</a:t>
             </a:fld>
@@ -2042,7 +1956,7 @@
     </p:spTree>
     <p:extLst>
       <p:ext uri="{BB962C8B-B14F-4D97-AF65-F5344CB8AC3E}">
-        <p14:creationId xmlns:p14="http://schemas.microsoft.com/office/powerpoint/2010/main" val="3919555321"/>
+        <p14:creationId xmlns:p14="http://schemas.microsoft.com/office/powerpoint/2010/main" val="3472721253"/>
       </p:ext>
     </p:extLst>
   </p:cSld>
@@ -2071,13 +1985,7 @@
       </p:grpSpPr>
       <p:sp>
         <p:nvSpPr>
-          <p:cNvPr id="2" name="Date Placeholder 1">
-            <a:extLst>
-              <a:ext uri="{FF2B5EF4-FFF2-40B4-BE49-F238E27FC236}">
-                <a16:creationId xmlns:a16="http://schemas.microsoft.com/office/drawing/2014/main" id="{C33DC568-0943-D43D-2918-A69B608F6D75}"/>
-              </a:ext>
-            </a:extLst>
-          </p:cNvPr>
+          <p:cNvPr id="2" name="Date Placeholder 1"/>
           <p:cNvSpPr>
             <a:spLocks noGrp="1"/>
           </p:cNvSpPr>
@@ -2090,7 +1998,7 @@
           <a:bodyPr/>
           <a:lstStyle/>
           <a:p>
-            <a:fld id="{F4FC6662-9247-444B-ADF5-BDC4693D4AA0}" type="datetimeFigureOut">
+            <a:fld id="{241EB5C9-1307-BA42-ABA2-0BC069CD8E7F}" type="datetimeFigureOut">
               <a:rPr lang="en-US" smtClean="0"/>
               <a:t>4/22/2024</a:t>
             </a:fld>
@@ -2100,13 +2008,7 @@
       </p:sp>
       <p:sp>
         <p:nvSpPr>
-          <p:cNvPr id="3" name="Footer Placeholder 2">
-            <a:extLst>
-              <a:ext uri="{FF2B5EF4-FFF2-40B4-BE49-F238E27FC236}">
-                <a16:creationId xmlns:a16="http://schemas.microsoft.com/office/drawing/2014/main" id="{B764EC3A-9234-31A2-0C48-87DCD76D7581}"/>
-              </a:ext>
-            </a:extLst>
-          </p:cNvPr>
+          <p:cNvPr id="3" name="Footer Placeholder 2"/>
           <p:cNvSpPr>
             <a:spLocks noGrp="1"/>
           </p:cNvSpPr>
@@ -2125,13 +2027,7 @@
       </p:sp>
       <p:sp>
         <p:nvSpPr>
-          <p:cNvPr id="4" name="Slide Number Placeholder 3">
-            <a:extLst>
-              <a:ext uri="{FF2B5EF4-FFF2-40B4-BE49-F238E27FC236}">
-                <a16:creationId xmlns:a16="http://schemas.microsoft.com/office/drawing/2014/main" id="{F392FC79-7B91-0A51-F343-0E78F81F62F3}"/>
-              </a:ext>
-            </a:extLst>
-          </p:cNvPr>
+          <p:cNvPr id="4" name="Slide Number Placeholder 3"/>
           <p:cNvSpPr>
             <a:spLocks noGrp="1"/>
           </p:cNvSpPr>
@@ -2144,7 +2040,7 @@
           <a:bodyPr/>
           <a:lstStyle/>
           <a:p>
-            <a:fld id="{87F339C6-D84C-874E-B4F5-90CEABF287B1}" type="slidenum">
+            <a:fld id="{C5EF2332-01BF-834F-8236-50238282D533}" type="slidenum">
               <a:rPr lang="en-US" smtClean="0"/>
               <a:t>‹#›</a:t>
             </a:fld>
@@ -2155,7 +2051,7 @@
     </p:spTree>
     <p:extLst>
       <p:ext uri="{BB962C8B-B14F-4D97-AF65-F5344CB8AC3E}">
-        <p14:creationId xmlns:p14="http://schemas.microsoft.com/office/powerpoint/2010/main" val="2686450705"/>
+        <p14:creationId xmlns:p14="http://schemas.microsoft.com/office/powerpoint/2010/main" val="2130901097"/>
       </p:ext>
     </p:extLst>
   </p:cSld>
@@ -2184,13 +2080,7 @@
       </p:grpSpPr>
       <p:sp>
         <p:nvSpPr>
-          <p:cNvPr id="2" name="Title 1">
-            <a:extLst>
-              <a:ext uri="{FF2B5EF4-FFF2-40B4-BE49-F238E27FC236}">
-                <a16:creationId xmlns:a16="http://schemas.microsoft.com/office/drawing/2014/main" id="{A8C3F926-61C2-35D0-1CBA-030D3685CD1C}"/>
-              </a:ext>
-            </a:extLst>
-          </p:cNvPr>
+          <p:cNvPr id="2" name="Title 1"/>
           <p:cNvSpPr>
             <a:spLocks noGrp="1"/>
           </p:cNvSpPr>
@@ -2200,15 +2090,15 @@
         </p:nvSpPr>
         <p:spPr>
           <a:xfrm>
-            <a:off x="839788" y="457200"/>
-            <a:ext cx="3932237" cy="1600200"/>
+            <a:off x="457201" y="204787"/>
+            <a:ext cx="3008313" cy="871538"/>
           </a:xfrm>
         </p:spPr>
         <p:txBody>
           <a:bodyPr anchor="b"/>
           <a:lstStyle>
-            <a:lvl1pPr>
-              <a:defRPr sz="3200"/>
+            <a:lvl1pPr algn="l">
+              <a:defRPr sz="1500" b="1"/>
             </a:lvl1pPr>
           </a:lstStyle>
           <a:p>
@@ -2221,13 +2111,7 @@
       </p:sp>
       <p:sp>
         <p:nvSpPr>
-          <p:cNvPr id="3" name="Content Placeholder 2">
-            <a:extLst>
-              <a:ext uri="{FF2B5EF4-FFF2-40B4-BE49-F238E27FC236}">
-                <a16:creationId xmlns:a16="http://schemas.microsoft.com/office/drawing/2014/main" id="{BED84061-6D24-1225-348B-B5F99466DF44}"/>
-              </a:ext>
-            </a:extLst>
-          </p:cNvPr>
+          <p:cNvPr id="3" name="Content Placeholder 2"/>
           <p:cNvSpPr>
             <a:spLocks noGrp="1"/>
           </p:cNvSpPr>
@@ -2237,39 +2121,39 @@
         </p:nvSpPr>
         <p:spPr>
           <a:xfrm>
-            <a:off x="5183188" y="987425"/>
-            <a:ext cx="6172200" cy="4873625"/>
+            <a:off x="3575050" y="204788"/>
+            <a:ext cx="5111750" cy="4389835"/>
           </a:xfrm>
         </p:spPr>
         <p:txBody>
           <a:bodyPr/>
           <a:lstStyle>
             <a:lvl1pPr>
-              <a:defRPr sz="3200"/>
+              <a:defRPr sz="2400"/>
             </a:lvl1pPr>
             <a:lvl2pPr>
-              <a:defRPr sz="2800"/>
+              <a:defRPr sz="2100"/>
             </a:lvl2pPr>
             <a:lvl3pPr>
-              <a:defRPr sz="2400"/>
+              <a:defRPr sz="1800"/>
             </a:lvl3pPr>
             <a:lvl4pPr>
-              <a:defRPr sz="2000"/>
+              <a:defRPr sz="1500"/>
             </a:lvl4pPr>
             <a:lvl5pPr>
-              <a:defRPr sz="2000"/>
+              <a:defRPr sz="1500"/>
             </a:lvl5pPr>
             <a:lvl6pPr>
-              <a:defRPr sz="2000"/>
+              <a:defRPr sz="1500"/>
             </a:lvl6pPr>
             <a:lvl7pPr>
-              <a:defRPr sz="2000"/>
+              <a:defRPr sz="1500"/>
             </a:lvl7pPr>
             <a:lvl8pPr>
-              <a:defRPr sz="2000"/>
+              <a:defRPr sz="1500"/>
             </a:lvl8pPr>
             <a:lvl9pPr>
-              <a:defRPr sz="2000"/>
+              <a:defRPr sz="1500"/>
             </a:lvl9pPr>
           </a:lstStyle>
           <a:p>
@@ -2311,13 +2195,7 @@
       </p:sp>
       <p:sp>
         <p:nvSpPr>
-          <p:cNvPr id="4" name="Text Placeholder 3">
-            <a:extLst>
-              <a:ext uri="{FF2B5EF4-FFF2-40B4-BE49-F238E27FC236}">
-                <a16:creationId xmlns:a16="http://schemas.microsoft.com/office/drawing/2014/main" id="{45A4F87E-EBFC-7789-E24D-E57D41992466}"/>
-              </a:ext>
-            </a:extLst>
-          </p:cNvPr>
+          <p:cNvPr id="4" name="Text Placeholder 3"/>
           <p:cNvSpPr>
             <a:spLocks noGrp="1"/>
           </p:cNvSpPr>
@@ -2327,8 +2205,8 @@
         </p:nvSpPr>
         <p:spPr>
           <a:xfrm>
-            <a:off x="839788" y="2057400"/>
-            <a:ext cx="3932237" cy="3811588"/>
+            <a:off x="457201" y="1076326"/>
+            <a:ext cx="3008313" cy="3518297"/>
           </a:xfrm>
         </p:spPr>
         <p:txBody>
@@ -2336,39 +2214,39 @@
           <a:lstStyle>
             <a:lvl1pPr marL="0" indent="0">
               <a:buNone/>
-              <a:defRPr sz="1600"/>
+              <a:defRPr sz="1050"/>
             </a:lvl1pPr>
-            <a:lvl2pPr marL="457200" indent="0">
-              <a:buNone/>
-              <a:defRPr sz="1400"/>
+            <a:lvl2pPr marL="342900" indent="0">
+              <a:buNone/>
+              <a:defRPr sz="900"/>
             </a:lvl2pPr>
-            <a:lvl3pPr marL="914400" indent="0">
-              <a:buNone/>
-              <a:defRPr sz="1200"/>
+            <a:lvl3pPr marL="685800" indent="0">
+              <a:buNone/>
+              <a:defRPr sz="750"/>
             </a:lvl3pPr>
-            <a:lvl4pPr marL="1371600" indent="0">
-              <a:buNone/>
-              <a:defRPr sz="1000"/>
+            <a:lvl4pPr marL="1028700" indent="0">
+              <a:buNone/>
+              <a:defRPr sz="675"/>
             </a:lvl4pPr>
-            <a:lvl5pPr marL="1828800" indent="0">
-              <a:buNone/>
-              <a:defRPr sz="1000"/>
+            <a:lvl5pPr marL="1371600" indent="0">
+              <a:buNone/>
+              <a:defRPr sz="675"/>
             </a:lvl5pPr>
-            <a:lvl6pPr marL="2286000" indent="0">
-              <a:buNone/>
-              <a:defRPr sz="1000"/>
+            <a:lvl6pPr marL="1714500" indent="0">
+              <a:buNone/>
+              <a:defRPr sz="675"/>
             </a:lvl6pPr>
-            <a:lvl7pPr marL="2743200" indent="0">
-              <a:buNone/>
-              <a:defRPr sz="1000"/>
+            <a:lvl7pPr marL="2057400" indent="0">
+              <a:buNone/>
+              <a:defRPr sz="675"/>
             </a:lvl7pPr>
-            <a:lvl8pPr marL="3200400" indent="0">
-              <a:buNone/>
-              <a:defRPr sz="1000"/>
+            <a:lvl8pPr marL="2400300" indent="0">
+              <a:buNone/>
+              <a:defRPr sz="675"/>
             </a:lvl8pPr>
-            <a:lvl9pPr marL="3657600" indent="0">
-              <a:buNone/>
-              <a:defRPr sz="1000"/>
+            <a:lvl9pPr marL="2743200" indent="0">
+              <a:buNone/>
+              <a:defRPr sz="675"/>
             </a:lvl9pPr>
           </a:lstStyle>
           <a:p>
@@ -2382,13 +2260,7 @@
       </p:sp>
       <p:sp>
         <p:nvSpPr>
-          <p:cNvPr id="5" name="Date Placeholder 4">
-            <a:extLst>
-              <a:ext uri="{FF2B5EF4-FFF2-40B4-BE49-F238E27FC236}">
-                <a16:creationId xmlns:a16="http://schemas.microsoft.com/office/drawing/2014/main" id="{D738EDB3-4BCD-9A9A-939B-3147C0101F07}"/>
-              </a:ext>
-            </a:extLst>
-          </p:cNvPr>
+          <p:cNvPr id="5" name="Date Placeholder 4"/>
           <p:cNvSpPr>
             <a:spLocks noGrp="1"/>
           </p:cNvSpPr>
@@ -2401,7 +2273,7 @@
           <a:bodyPr/>
           <a:lstStyle/>
           <a:p>
-            <a:fld id="{F4FC6662-9247-444B-ADF5-BDC4693D4AA0}" type="datetimeFigureOut">
+            <a:fld id="{241EB5C9-1307-BA42-ABA2-0BC069CD8E7F}" type="datetimeFigureOut">
               <a:rPr lang="en-US" smtClean="0"/>
               <a:t>4/22/2024</a:t>
             </a:fld>
@@ -2411,13 +2283,7 @@
       </p:sp>
       <p:sp>
         <p:nvSpPr>
-          <p:cNvPr id="6" name="Footer Placeholder 5">
-            <a:extLst>
-              <a:ext uri="{FF2B5EF4-FFF2-40B4-BE49-F238E27FC236}">
-                <a16:creationId xmlns:a16="http://schemas.microsoft.com/office/drawing/2014/main" id="{DE3DE6FC-F60E-4B35-AE89-8DDBD9C204DA}"/>
-              </a:ext>
-            </a:extLst>
-          </p:cNvPr>
+          <p:cNvPr id="6" name="Footer Placeholder 5"/>
           <p:cNvSpPr>
             <a:spLocks noGrp="1"/>
           </p:cNvSpPr>
@@ -2436,13 +2302,7 @@
       </p:sp>
       <p:sp>
         <p:nvSpPr>
-          <p:cNvPr id="7" name="Slide Number Placeholder 6">
-            <a:extLst>
-              <a:ext uri="{FF2B5EF4-FFF2-40B4-BE49-F238E27FC236}">
-                <a16:creationId xmlns:a16="http://schemas.microsoft.com/office/drawing/2014/main" id="{006B2CDF-913D-2977-3B1C-48BCB5F7A137}"/>
-              </a:ext>
-            </a:extLst>
-          </p:cNvPr>
+          <p:cNvPr id="7" name="Slide Number Placeholder 6"/>
           <p:cNvSpPr>
             <a:spLocks noGrp="1"/>
           </p:cNvSpPr>
@@ -2455,7 +2315,7 @@
           <a:bodyPr/>
           <a:lstStyle/>
           <a:p>
-            <a:fld id="{87F339C6-D84C-874E-B4F5-90CEABF287B1}" type="slidenum">
+            <a:fld id="{C5EF2332-01BF-834F-8236-50238282D533}" type="slidenum">
               <a:rPr lang="en-US" smtClean="0"/>
               <a:t>‹#›</a:t>
             </a:fld>
@@ -2466,7 +2326,7 @@
     </p:spTree>
     <p:extLst>
       <p:ext uri="{BB962C8B-B14F-4D97-AF65-F5344CB8AC3E}">
-        <p14:creationId xmlns:p14="http://schemas.microsoft.com/office/powerpoint/2010/main" val="2831761515"/>
+        <p14:creationId xmlns:p14="http://schemas.microsoft.com/office/powerpoint/2010/main" val="3540895647"/>
       </p:ext>
     </p:extLst>
   </p:cSld>
@@ -2495,13 +2355,7 @@
       </p:grpSpPr>
       <p:sp>
         <p:nvSpPr>
-          <p:cNvPr id="2" name="Title 1">
-            <a:extLst>
-              <a:ext uri="{FF2B5EF4-FFF2-40B4-BE49-F238E27FC236}">
-                <a16:creationId xmlns:a16="http://schemas.microsoft.com/office/drawing/2014/main" id="{72100C90-B2CA-1AE7-C0B0-5199AD6A3719}"/>
-              </a:ext>
-            </a:extLst>
-          </p:cNvPr>
+          <p:cNvPr id="2" name="Title 1"/>
           <p:cNvSpPr>
             <a:spLocks noGrp="1"/>
           </p:cNvSpPr>
@@ -2511,15 +2365,15 @@
         </p:nvSpPr>
         <p:spPr>
           <a:xfrm>
-            <a:off x="839788" y="457200"/>
-            <a:ext cx="3932237" cy="1600200"/>
+            <a:off x="1792288" y="3600450"/>
+            <a:ext cx="5486400" cy="425054"/>
           </a:xfrm>
         </p:spPr>
         <p:txBody>
           <a:bodyPr anchor="b"/>
           <a:lstStyle>
-            <a:lvl1pPr>
-              <a:defRPr sz="3200"/>
+            <a:lvl1pPr algn="l">
+              <a:defRPr sz="1500" b="1"/>
             </a:lvl1pPr>
           </a:lstStyle>
           <a:p>
@@ -2532,13 +2386,7 @@
       </p:sp>
       <p:sp>
         <p:nvSpPr>
-          <p:cNvPr id="3" name="Picture Placeholder 2">
-            <a:extLst>
-              <a:ext uri="{FF2B5EF4-FFF2-40B4-BE49-F238E27FC236}">
-                <a16:creationId xmlns:a16="http://schemas.microsoft.com/office/drawing/2014/main" id="{112CC5BF-527A-6E0C-A9C8-2D52DC6B3507}"/>
-              </a:ext>
-            </a:extLst>
-          </p:cNvPr>
+          <p:cNvPr id="3" name="Picture Placeholder 2"/>
           <p:cNvSpPr>
             <a:spLocks noGrp="1"/>
           </p:cNvSpPr>
@@ -2548,8 +2396,8 @@
         </p:nvSpPr>
         <p:spPr>
           <a:xfrm>
-            <a:off x="5183188" y="987425"/>
-            <a:ext cx="6172200" cy="4873625"/>
+            <a:off x="1792288" y="459581"/>
+            <a:ext cx="5486400" cy="3086100"/>
           </a:xfrm>
         </p:spPr>
         <p:txBody>
@@ -2557,39 +2405,39 @@
           <a:lstStyle>
             <a:lvl1pPr marL="0" indent="0">
               <a:buNone/>
-              <a:defRPr sz="3200"/>
+              <a:defRPr sz="2400"/>
             </a:lvl1pPr>
-            <a:lvl2pPr marL="457200" indent="0">
-              <a:buNone/>
-              <a:defRPr sz="2800"/>
+            <a:lvl2pPr marL="342900" indent="0">
+              <a:buNone/>
+              <a:defRPr sz="2100"/>
             </a:lvl2pPr>
-            <a:lvl3pPr marL="914400" indent="0">
-              <a:buNone/>
-              <a:defRPr sz="2400"/>
+            <a:lvl3pPr marL="685800" indent="0">
+              <a:buNone/>
+              <a:defRPr sz="1800"/>
             </a:lvl3pPr>
-            <a:lvl4pPr marL="1371600" indent="0">
-              <a:buNone/>
-              <a:defRPr sz="2000"/>
+            <a:lvl4pPr marL="1028700" indent="0">
+              <a:buNone/>
+              <a:defRPr sz="1500"/>
             </a:lvl4pPr>
-            <a:lvl5pPr marL="1828800" indent="0">
-              <a:buNone/>
-              <a:defRPr sz="2000"/>
+            <a:lvl5pPr marL="1371600" indent="0">
+              <a:buNone/>
+              <a:defRPr sz="1500"/>
             </a:lvl5pPr>
-            <a:lvl6pPr marL="2286000" indent="0">
-              <a:buNone/>
-              <a:defRPr sz="2000"/>
+            <a:lvl6pPr marL="1714500" indent="0">
+              <a:buNone/>
+              <a:defRPr sz="1500"/>
             </a:lvl6pPr>
-            <a:lvl7pPr marL="2743200" indent="0">
-              <a:buNone/>
-              <a:defRPr sz="2000"/>
+            <a:lvl7pPr marL="2057400" indent="0">
+              <a:buNone/>
+              <a:defRPr sz="1500"/>
             </a:lvl7pPr>
-            <a:lvl8pPr marL="3200400" indent="0">
-              <a:buNone/>
-              <a:defRPr sz="2000"/>
+            <a:lvl8pPr marL="2400300" indent="0">
+              <a:buNone/>
+              <a:defRPr sz="1500"/>
             </a:lvl8pPr>
-            <a:lvl9pPr marL="3657600" indent="0">
-              <a:buNone/>
-              <a:defRPr sz="2000"/>
+            <a:lvl9pPr marL="2743200" indent="0">
+              <a:buNone/>
+              <a:defRPr sz="1500"/>
             </a:lvl9pPr>
           </a:lstStyle>
           <a:p>
@@ -2599,13 +2447,7 @@
       </p:sp>
       <p:sp>
         <p:nvSpPr>
-          <p:cNvPr id="4" name="Text Placeholder 3">
-            <a:extLst>
-              <a:ext uri="{FF2B5EF4-FFF2-40B4-BE49-F238E27FC236}">
-                <a16:creationId xmlns:a16="http://schemas.microsoft.com/office/drawing/2014/main" id="{24473AB1-C88A-6906-60DC-F791A92A7061}"/>
-              </a:ext>
-            </a:extLst>
-          </p:cNvPr>
+          <p:cNvPr id="4" name="Text Placeholder 3"/>
           <p:cNvSpPr>
             <a:spLocks noGrp="1"/>
           </p:cNvSpPr>
@@ -2615,8 +2457,8 @@
         </p:nvSpPr>
         <p:spPr>
           <a:xfrm>
-            <a:off x="839788" y="2057400"/>
-            <a:ext cx="3932237" cy="3811588"/>
+            <a:off x="1792288" y="4025503"/>
+            <a:ext cx="5486400" cy="603647"/>
           </a:xfrm>
         </p:spPr>
         <p:txBody>
@@ -2624,39 +2466,39 @@
           <a:lstStyle>
             <a:lvl1pPr marL="0" indent="0">
               <a:buNone/>
-              <a:defRPr sz="1600"/>
+              <a:defRPr sz="1050"/>
             </a:lvl1pPr>
-            <a:lvl2pPr marL="457200" indent="0">
-              <a:buNone/>
-              <a:defRPr sz="1400"/>
+            <a:lvl2pPr marL="342900" indent="0">
+              <a:buNone/>
+              <a:defRPr sz="900"/>
             </a:lvl2pPr>
-            <a:lvl3pPr marL="914400" indent="0">
-              <a:buNone/>
-              <a:defRPr sz="1200"/>
+            <a:lvl3pPr marL="685800" indent="0">
+              <a:buNone/>
+              <a:defRPr sz="750"/>
             </a:lvl3pPr>
-            <a:lvl4pPr marL="1371600" indent="0">
-              <a:buNone/>
-              <a:defRPr sz="1000"/>
+            <a:lvl4pPr marL="1028700" indent="0">
+              <a:buNone/>
+              <a:defRPr sz="675"/>
             </a:lvl4pPr>
-            <a:lvl5pPr marL="1828800" indent="0">
-              <a:buNone/>
-              <a:defRPr sz="1000"/>
+            <a:lvl5pPr marL="1371600" indent="0">
+              <a:buNone/>
+              <a:defRPr sz="675"/>
             </a:lvl5pPr>
-            <a:lvl6pPr marL="2286000" indent="0">
-              <a:buNone/>
-              <a:defRPr sz="1000"/>
+            <a:lvl6pPr marL="1714500" indent="0">
+              <a:buNone/>
+              <a:defRPr sz="675"/>
             </a:lvl6pPr>
-            <a:lvl7pPr marL="2743200" indent="0">
-              <a:buNone/>
-              <a:defRPr sz="1000"/>
+            <a:lvl7pPr marL="2057400" indent="0">
+              <a:buNone/>
+              <a:defRPr sz="675"/>
             </a:lvl7pPr>
-            <a:lvl8pPr marL="3200400" indent="0">
-              <a:buNone/>
-              <a:defRPr sz="1000"/>
+            <a:lvl8pPr marL="2400300" indent="0">
+              <a:buNone/>
+              <a:defRPr sz="675"/>
             </a:lvl8pPr>
-            <a:lvl9pPr marL="3657600" indent="0">
-              <a:buNone/>
-              <a:defRPr sz="1000"/>
+            <a:lvl9pPr marL="2743200" indent="0">
+              <a:buNone/>
+              <a:defRPr sz="675"/>
             </a:lvl9pPr>
           </a:lstStyle>
           <a:p>
@@ -2670,13 +2512,7 @@
       </p:sp>
       <p:sp>
         <p:nvSpPr>
-          <p:cNvPr id="5" name="Date Placeholder 4">
-            <a:extLst>
-              <a:ext uri="{FF2B5EF4-FFF2-40B4-BE49-F238E27FC236}">
-                <a16:creationId xmlns:a16="http://schemas.microsoft.com/office/drawing/2014/main" id="{EEB80915-19FE-78A1-B685-7621868979D2}"/>
-              </a:ext>
-            </a:extLst>
-          </p:cNvPr>
+          <p:cNvPr id="5" name="Date Placeholder 4"/>
           <p:cNvSpPr>
             <a:spLocks noGrp="1"/>
           </p:cNvSpPr>
@@ -2689,7 +2525,7 @@
           <a:bodyPr/>
           <a:lstStyle/>
           <a:p>
-            <a:fld id="{F4FC6662-9247-444B-ADF5-BDC4693D4AA0}" type="datetimeFigureOut">
+            <a:fld id="{241EB5C9-1307-BA42-ABA2-0BC069CD8E7F}" type="datetimeFigureOut">
               <a:rPr lang="en-US" smtClean="0"/>
               <a:t>4/22/2024</a:t>
             </a:fld>
@@ -2699,13 +2535,7 @@
       </p:sp>
       <p:sp>
         <p:nvSpPr>
-          <p:cNvPr id="6" name="Footer Placeholder 5">
-            <a:extLst>
-              <a:ext uri="{FF2B5EF4-FFF2-40B4-BE49-F238E27FC236}">
-                <a16:creationId xmlns:a16="http://schemas.microsoft.com/office/drawing/2014/main" id="{C135E525-F130-38B4-8E66-3A5CAA9073BB}"/>
-              </a:ext>
-            </a:extLst>
-          </p:cNvPr>
+          <p:cNvPr id="6" name="Footer Placeholder 5"/>
           <p:cNvSpPr>
             <a:spLocks noGrp="1"/>
           </p:cNvSpPr>
@@ -2724,13 +2554,7 @@
       </p:sp>
       <p:sp>
         <p:nvSpPr>
-          <p:cNvPr id="7" name="Slide Number Placeholder 6">
-            <a:extLst>
-              <a:ext uri="{FF2B5EF4-FFF2-40B4-BE49-F238E27FC236}">
-                <a16:creationId xmlns:a16="http://schemas.microsoft.com/office/drawing/2014/main" id="{44F86E31-83A5-21C6-82AA-AD51DD97A641}"/>
-              </a:ext>
-            </a:extLst>
-          </p:cNvPr>
+          <p:cNvPr id="7" name="Slide Number Placeholder 6"/>
           <p:cNvSpPr>
             <a:spLocks noGrp="1"/>
           </p:cNvSpPr>
@@ -2743,7 +2567,7 @@
           <a:bodyPr/>
           <a:lstStyle/>
           <a:p>
-            <a:fld id="{87F339C6-D84C-874E-B4F5-90CEABF287B1}" type="slidenum">
+            <a:fld id="{C5EF2332-01BF-834F-8236-50238282D533}" type="slidenum">
               <a:rPr lang="en-US" smtClean="0"/>
               <a:t>‹#›</a:t>
             </a:fld>
@@ -2754,7 +2578,7 @@
     </p:spTree>
     <p:extLst>
       <p:ext uri="{BB962C8B-B14F-4D97-AF65-F5344CB8AC3E}">
-        <p14:creationId xmlns:p14="http://schemas.microsoft.com/office/powerpoint/2010/main" val="3400384612"/>
+        <p14:creationId xmlns:p14="http://schemas.microsoft.com/office/powerpoint/2010/main" val="3566899855"/>
       </p:ext>
     </p:extLst>
   </p:cSld>
@@ -2788,13 +2612,7 @@
       </p:grpSpPr>
       <p:sp>
         <p:nvSpPr>
-          <p:cNvPr id="2" name="Title Placeholder 1">
-            <a:extLst>
-              <a:ext uri="{FF2B5EF4-FFF2-40B4-BE49-F238E27FC236}">
-                <a16:creationId xmlns:a16="http://schemas.microsoft.com/office/drawing/2014/main" id="{D81C52F8-D26C-D62D-94D8-2AC26AF3319E}"/>
-              </a:ext>
-            </a:extLst>
-          </p:cNvPr>
+          <p:cNvPr id="2" name="Title Placeholder 1"/>
           <p:cNvSpPr>
             <a:spLocks noGrp="1"/>
           </p:cNvSpPr>
@@ -2804,8 +2622,8 @@
         </p:nvSpPr>
         <p:spPr>
           <a:xfrm>
-            <a:off x="838200" y="365125"/>
-            <a:ext cx="10515600" cy="1325563"/>
+            <a:off x="457200" y="205979"/>
+            <a:ext cx="8229600" cy="857250"/>
           </a:xfrm>
           <a:prstGeom prst="rect">
             <a:avLst/>
@@ -2826,13 +2644,7 @@
       </p:sp>
       <p:sp>
         <p:nvSpPr>
-          <p:cNvPr id="3" name="Text Placeholder 2">
-            <a:extLst>
-              <a:ext uri="{FF2B5EF4-FFF2-40B4-BE49-F238E27FC236}">
-                <a16:creationId xmlns:a16="http://schemas.microsoft.com/office/drawing/2014/main" id="{84016077-72CB-6E5A-A0D9-B19B93515B69}"/>
-              </a:ext>
-            </a:extLst>
-          </p:cNvPr>
+          <p:cNvPr id="3" name="Text Placeholder 2"/>
           <p:cNvSpPr>
             <a:spLocks noGrp="1"/>
           </p:cNvSpPr>
@@ -2842,8 +2654,8 @@
         </p:nvSpPr>
         <p:spPr>
           <a:xfrm>
-            <a:off x="838200" y="1825625"/>
-            <a:ext cx="10515600" cy="4351338"/>
+            <a:off x="457200" y="1200151"/>
+            <a:ext cx="8229600" cy="3394472"/>
           </a:xfrm>
           <a:prstGeom prst="rect">
             <a:avLst/>
@@ -2893,13 +2705,7 @@
       </p:sp>
       <p:sp>
         <p:nvSpPr>
-          <p:cNvPr id="4" name="Date Placeholder 3">
-            <a:extLst>
-              <a:ext uri="{FF2B5EF4-FFF2-40B4-BE49-F238E27FC236}">
-                <a16:creationId xmlns:a16="http://schemas.microsoft.com/office/drawing/2014/main" id="{117CB0BA-99FD-9F19-69DA-8B3ACDE3FAF6}"/>
-              </a:ext>
-            </a:extLst>
-          </p:cNvPr>
+          <p:cNvPr id="4" name="Date Placeholder 3"/>
           <p:cNvSpPr>
             <a:spLocks noGrp="1"/>
           </p:cNvSpPr>
@@ -2909,8 +2715,8 @@
         </p:nvSpPr>
         <p:spPr>
           <a:xfrm>
-            <a:off x="838200" y="6356350"/>
-            <a:ext cx="2743200" cy="365125"/>
+            <a:off x="457200" y="4767263"/>
+            <a:ext cx="2133600" cy="273844"/>
           </a:xfrm>
           <a:prstGeom prst="rect">
             <a:avLst/>
@@ -2920,7 +2726,7 @@
           <a:bodyPr anchor="ctr" bIns="45720" lIns="91440" rIns="91440" rtlCol="0" tIns="45720" vert="horz"/>
           <a:lstStyle>
             <a:lvl1pPr algn="l">
-              <a:defRPr sz="1200">
+              <a:defRPr sz="900">
                 <a:solidFill>
                   <a:schemeClr val="tx1">
                     <a:tint val="75000"/>
@@ -2930,7 +2736,7 @@
             </a:lvl1pPr>
           </a:lstStyle>
           <a:p>
-            <a:fld id="{F4FC6662-9247-444B-ADF5-BDC4693D4AA0}" type="datetimeFigureOut">
+            <a:fld id="{241EB5C9-1307-BA42-ABA2-0BC069CD8E7F}" type="datetimeFigureOut">
               <a:rPr lang="en-US" smtClean="0"/>
               <a:t>4/22/2024</a:t>
             </a:fld>
@@ -2940,13 +2746,7 @@
       </p:sp>
       <p:sp>
         <p:nvSpPr>
-          <p:cNvPr id="5" name="Footer Placeholder 4">
-            <a:extLst>
-              <a:ext uri="{FF2B5EF4-FFF2-40B4-BE49-F238E27FC236}">
-                <a16:creationId xmlns:a16="http://schemas.microsoft.com/office/drawing/2014/main" id="{9E4A2EF7-25AB-F4B4-4099-5F6FE0DC4FB7}"/>
-              </a:ext>
-            </a:extLst>
-          </p:cNvPr>
+          <p:cNvPr id="5" name="Footer Placeholder 4"/>
           <p:cNvSpPr>
             <a:spLocks noGrp="1"/>
           </p:cNvSpPr>
@@ -2956,8 +2756,8 @@
         </p:nvSpPr>
         <p:spPr>
           <a:xfrm>
-            <a:off x="4038600" y="6356350"/>
-            <a:ext cx="4114800" cy="365125"/>
+            <a:off x="3124200" y="4767263"/>
+            <a:ext cx="2895600" cy="273844"/>
           </a:xfrm>
           <a:prstGeom prst="rect">
             <a:avLst/>
@@ -2967,7 +2767,7 @@
           <a:bodyPr anchor="ctr" bIns="45720" lIns="91440" rIns="91440" rtlCol="0" tIns="45720" vert="horz"/>
           <a:lstStyle>
             <a:lvl1pPr algn="ctr">
-              <a:defRPr sz="1200">
+              <a:defRPr sz="900">
                 <a:solidFill>
                   <a:schemeClr val="tx1">
                     <a:tint val="75000"/>
@@ -2983,13 +2783,7 @@
       </p:sp>
       <p:sp>
         <p:nvSpPr>
-          <p:cNvPr id="6" name="Slide Number Placeholder 5">
-            <a:extLst>
-              <a:ext uri="{FF2B5EF4-FFF2-40B4-BE49-F238E27FC236}">
-                <a16:creationId xmlns:a16="http://schemas.microsoft.com/office/drawing/2014/main" id="{181E347C-318D-9F61-859A-48B942C2E264}"/>
-              </a:ext>
-            </a:extLst>
-          </p:cNvPr>
+          <p:cNvPr id="6" name="Slide Number Placeholder 5"/>
           <p:cNvSpPr>
             <a:spLocks noGrp="1"/>
           </p:cNvSpPr>
@@ -2999,8 +2793,8 @@
         </p:nvSpPr>
         <p:spPr>
           <a:xfrm>
-            <a:off x="8610600" y="6356350"/>
-            <a:ext cx="2743200" cy="365125"/>
+            <a:off x="6553200" y="4767263"/>
+            <a:ext cx="2133600" cy="273844"/>
           </a:xfrm>
           <a:prstGeom prst="rect">
             <a:avLst/>
@@ -3010,7 +2804,7 @@
           <a:bodyPr anchor="ctr" bIns="45720" lIns="91440" rIns="91440" rtlCol="0" tIns="45720" vert="horz"/>
           <a:lstStyle>
             <a:lvl1pPr algn="r">
-              <a:defRPr sz="1200">
+              <a:defRPr sz="900">
                 <a:solidFill>
                   <a:schemeClr val="tx1">
                     <a:tint val="75000"/>
@@ -3020,7 +2814,7 @@
             </a:lvl1pPr>
           </a:lstStyle>
           <a:p>
-            <a:fld id="{87F339C6-D84C-874E-B4F5-90CEABF287B1}" type="slidenum">
+            <a:fld id="{C5EF2332-01BF-834F-8236-50238282D533}" type="slidenum">
               <a:rPr lang="en-US" smtClean="0"/>
               <a:t>‹#›</a:t>
             </a:fld>
@@ -3031,7 +2825,7 @@
     </p:spTree>
     <p:extLst>
       <p:ext uri="{BB962C8B-B14F-4D97-AF65-F5344CB8AC3E}">
-        <p14:creationId xmlns:p14="http://schemas.microsoft.com/office/powerpoint/2010/main" val="2275929044"/>
+        <p14:creationId xmlns:p14="http://schemas.microsoft.com/office/powerpoint/2010/main" val="3676200875"/>
       </p:ext>
     </p:extLst>
   </p:cSld>
@@ -3051,15 +2845,12 @@
   </p:sldLayoutIdLst>
   <p:txStyles>
     <p:titleStyle>
-      <a:lvl1pPr algn="l" defTabSz="914400" eaLnBrk="1" hangingPunct="1" latinLnBrk="0" rtl="0">
-        <a:lnSpc>
-          <a:spcPct val="90000"/>
-        </a:lnSpc>
+      <a:lvl1pPr algn="ctr" defTabSz="342900" eaLnBrk="1" hangingPunct="1" latinLnBrk="0" rtl="0">
         <a:spcBef>
           <a:spcPct val="0"/>
         </a:spcBef>
         <a:buNone/>
-        <a:defRPr kern="1200" sz="4400">
+        <a:defRPr kern="1200" sz="3300">
           <a:solidFill>
             <a:schemeClr val="tx1"/>
           </a:solidFill>
@@ -3070,32 +2861,11 @@
       </a:lvl1pPr>
     </p:titleStyle>
     <p:bodyStyle>
-      <a:lvl1pPr algn="l" defTabSz="914400" eaLnBrk="1" hangingPunct="1" indent="-228600" latinLnBrk="0" marL="228600" rtl="0">
-        <a:lnSpc>
-          <a:spcPct val="90000"/>
-        </a:lnSpc>
+      <a:lvl1pPr algn="l" defTabSz="342900" eaLnBrk="1" hangingPunct="1" indent="-342900" latinLnBrk="0" marL="342900" rtl="0">
         <a:spcBef>
-          <a:spcPts val="1000"/>
+          <a:spcPct val="20000"/>
         </a:spcBef>
-        <a:buFont charset="0" panose="020B0604020202020204" pitchFamily="34" typeface="Arial"/>
-        <a:buChar char="•"/>
-        <a:defRPr kern="1200" sz="2800">
-          <a:solidFill>
-            <a:schemeClr val="tx1"/>
-          </a:solidFill>
-          <a:latin typeface="+mn-lt"/>
-          <a:ea typeface="+mn-ea"/>
-          <a:cs typeface="+mn-cs"/>
-        </a:defRPr>
-      </a:lvl1pPr>
-      <a:lvl2pPr algn="l" defTabSz="914400" eaLnBrk="1" hangingPunct="1" indent="-228600" latinLnBrk="0" marL="685800" rtl="0">
-        <a:lnSpc>
-          <a:spcPct val="90000"/>
-        </a:lnSpc>
-        <a:spcBef>
-          <a:spcPts val="500"/>
-        </a:spcBef>
-        <a:buFont charset="0" panose="020B0604020202020204" pitchFamily="34" typeface="Arial"/>
+        <a:buFont typeface="Arial"/>
         <a:buChar char="•"/>
         <a:defRPr kern="1200" sz="2400">
           <a:solidFill>
@@ -3105,17 +2875,14 @@
           <a:ea typeface="+mn-ea"/>
           <a:cs typeface="+mn-cs"/>
         </a:defRPr>
-      </a:lvl2pPr>
-      <a:lvl3pPr algn="l" defTabSz="914400" eaLnBrk="1" hangingPunct="1" indent="-228600" latinLnBrk="0" marL="1143000" rtl="0">
-        <a:lnSpc>
-          <a:spcPct val="90000"/>
-        </a:lnSpc>
+      </a:lvl1pPr>
+      <a:lvl2pPr algn="l" defTabSz="342900" eaLnBrk="1" hangingPunct="1" indent="-342900" latinLnBrk="0" marL="685800" rtl="0">
         <a:spcBef>
-          <a:spcPts val="500"/>
+          <a:spcPct val="20000"/>
         </a:spcBef>
-        <a:buFont charset="0" panose="020B0604020202020204" pitchFamily="34" typeface="Arial"/>
-        <a:buChar char="•"/>
-        <a:defRPr kern="1200" sz="2000">
+        <a:buFont typeface="Arial"/>
+        <a:buChar char="–"/>
+        <a:defRPr kern="1200" sz="2100">
           <a:solidFill>
             <a:schemeClr val="tx1"/>
           </a:solidFill>
@@ -3123,15 +2890,12 @@
           <a:ea typeface="+mn-ea"/>
           <a:cs typeface="+mn-cs"/>
         </a:defRPr>
-      </a:lvl3pPr>
-      <a:lvl4pPr algn="l" defTabSz="914400" eaLnBrk="1" hangingPunct="1" indent="-228600" latinLnBrk="0" marL="1600200" rtl="0">
-        <a:lnSpc>
-          <a:spcPct val="90000"/>
-        </a:lnSpc>
+      </a:lvl2pPr>
+      <a:lvl3pPr algn="l" defTabSz="342900" eaLnBrk="1" hangingPunct="1" indent="-342900" latinLnBrk="0" marL="1028700" rtl="0">
         <a:spcBef>
-          <a:spcPts val="500"/>
+          <a:spcPct val="20000"/>
         </a:spcBef>
-        <a:buFont charset="0" panose="020B0604020202020204" pitchFamily="34" typeface="Arial"/>
+        <a:buFont typeface="Arial"/>
         <a:buChar char="•"/>
         <a:defRPr kern="1200" sz="1800">
           <a:solidFill>
@@ -3141,17 +2905,29 @@
           <a:ea typeface="+mn-ea"/>
           <a:cs typeface="+mn-cs"/>
         </a:defRPr>
+      </a:lvl3pPr>
+      <a:lvl4pPr algn="l" defTabSz="342900" eaLnBrk="1" hangingPunct="1" indent="-342900" latinLnBrk="0" marL="1371600" rtl="0">
+        <a:spcBef>
+          <a:spcPct val="20000"/>
+        </a:spcBef>
+        <a:buFont typeface="Arial"/>
+        <a:buChar char="–"/>
+        <a:defRPr kern="1200" sz="1500">
+          <a:solidFill>
+            <a:schemeClr val="tx1"/>
+          </a:solidFill>
+          <a:latin typeface="+mn-lt"/>
+          <a:ea typeface="+mn-ea"/>
+          <a:cs typeface="+mn-cs"/>
+        </a:defRPr>
       </a:lvl4pPr>
-      <a:lvl5pPr algn="l" defTabSz="914400" eaLnBrk="1" hangingPunct="1" indent="-228600" latinLnBrk="0" marL="2057400" rtl="0">
-        <a:lnSpc>
-          <a:spcPct val="90000"/>
-        </a:lnSpc>
+      <a:lvl5pPr algn="l" defTabSz="342900" eaLnBrk="1" hangingPunct="1" indent="-342900" latinLnBrk="0" marL="1714500" rtl="0">
         <a:spcBef>
-          <a:spcPts val="500"/>
+          <a:spcPct val="20000"/>
         </a:spcBef>
-        <a:buFont charset="0" panose="020B0604020202020204" pitchFamily="34" typeface="Arial"/>
-        <a:buChar char="•"/>
-        <a:defRPr kern="1200" sz="1800">
+        <a:buFont typeface="Arial"/>
+        <a:buChar char="»"/>
+        <a:defRPr kern="1200" sz="1500">
           <a:solidFill>
             <a:schemeClr val="tx1"/>
           </a:solidFill>
@@ -3160,16 +2936,13 @@
           <a:cs typeface="+mn-cs"/>
         </a:defRPr>
       </a:lvl5pPr>
-      <a:lvl6pPr algn="l" defTabSz="914400" eaLnBrk="1" hangingPunct="1" indent="-228600" latinLnBrk="0" marL="2514600" rtl="0">
-        <a:lnSpc>
-          <a:spcPct val="90000"/>
-        </a:lnSpc>
+      <a:lvl6pPr algn="l" defTabSz="342900" eaLnBrk="1" hangingPunct="1" indent="-342900" latinLnBrk="0" marL="2057400" rtl="0">
         <a:spcBef>
-          <a:spcPts val="500"/>
+          <a:spcPct val="20000"/>
         </a:spcBef>
-        <a:buFont charset="0" panose="020B0604020202020204" pitchFamily="34" typeface="Arial"/>
+        <a:buFont typeface="Arial"/>
         <a:buChar char="•"/>
-        <a:defRPr kern="1200" sz="1800">
+        <a:defRPr kern="1200" sz="1500">
           <a:solidFill>
             <a:schemeClr val="tx1"/>
           </a:solidFill>
@@ -3178,16 +2951,13 @@
           <a:cs typeface="+mn-cs"/>
         </a:defRPr>
       </a:lvl6pPr>
-      <a:lvl7pPr algn="l" defTabSz="914400" eaLnBrk="1" hangingPunct="1" indent="-228600" latinLnBrk="0" marL="2971800" rtl="0">
-        <a:lnSpc>
-          <a:spcPct val="90000"/>
-        </a:lnSpc>
+      <a:lvl7pPr algn="l" defTabSz="342900" eaLnBrk="1" hangingPunct="1" indent="-342900" latinLnBrk="0" marL="2400300" rtl="0">
         <a:spcBef>
-          <a:spcPts val="500"/>
+          <a:spcPct val="20000"/>
         </a:spcBef>
-        <a:buFont charset="0" panose="020B0604020202020204" pitchFamily="34" typeface="Arial"/>
+        <a:buFont typeface="Arial"/>
         <a:buChar char="•"/>
-        <a:defRPr kern="1200" sz="1800">
+        <a:defRPr kern="1200" sz="1500">
           <a:solidFill>
             <a:schemeClr val="tx1"/>
           </a:solidFill>
@@ -3196,16 +2966,13 @@
           <a:cs typeface="+mn-cs"/>
         </a:defRPr>
       </a:lvl7pPr>
-      <a:lvl8pPr algn="l" defTabSz="914400" eaLnBrk="1" hangingPunct="1" indent="-228600" latinLnBrk="0" marL="3429000" rtl="0">
-        <a:lnSpc>
-          <a:spcPct val="90000"/>
-        </a:lnSpc>
+      <a:lvl8pPr algn="l" defTabSz="342900" eaLnBrk="1" hangingPunct="1" indent="-342900" latinLnBrk="0" marL="2743200" rtl="0">
         <a:spcBef>
-          <a:spcPts val="500"/>
+          <a:spcPct val="20000"/>
         </a:spcBef>
-        <a:buFont charset="0" panose="020B0604020202020204" pitchFamily="34" typeface="Arial"/>
+        <a:buFont typeface="Arial"/>
         <a:buChar char="•"/>
-        <a:defRPr kern="1200" sz="1800">
+        <a:defRPr kern="1200" sz="1500">
           <a:solidFill>
             <a:schemeClr val="tx1"/>
           </a:solidFill>
@@ -3214,16 +2981,13 @@
           <a:cs typeface="+mn-cs"/>
         </a:defRPr>
       </a:lvl8pPr>
-      <a:lvl9pPr algn="l" defTabSz="914400" eaLnBrk="1" hangingPunct="1" indent="-228600" latinLnBrk="0" marL="3886200" rtl="0">
-        <a:lnSpc>
-          <a:spcPct val="90000"/>
-        </a:lnSpc>
+      <a:lvl9pPr algn="l" defTabSz="342900" eaLnBrk="1" hangingPunct="1" indent="-342900" latinLnBrk="0" marL="3086100" rtl="0">
         <a:spcBef>
-          <a:spcPts val="500"/>
+          <a:spcPct val="20000"/>
         </a:spcBef>
-        <a:buFont charset="0" panose="020B0604020202020204" pitchFamily="34" typeface="Arial"/>
+        <a:buFont typeface="Arial"/>
         <a:buChar char="•"/>
-        <a:defRPr kern="1200" sz="1800">
+        <a:defRPr kern="1200" sz="1500">
           <a:solidFill>
             <a:schemeClr val="tx1"/>
           </a:solidFill>
@@ -3237,8 +3001,8 @@
       <a:defPPr>
         <a:defRPr lang="en-US"/>
       </a:defPPr>
-      <a:lvl1pPr algn="l" defTabSz="914400" eaLnBrk="1" hangingPunct="1" latinLnBrk="0" marL="0" rtl="0">
-        <a:defRPr kern="1200" sz="1800">
+      <a:lvl1pPr algn="l" defTabSz="342900" eaLnBrk="1" hangingPunct="1" latinLnBrk="0" marL="0" rtl="0">
+        <a:defRPr kern="1200" sz="1350">
           <a:solidFill>
             <a:schemeClr val="tx1"/>
           </a:solidFill>
@@ -3247,8 +3011,8 @@
           <a:cs typeface="+mn-cs"/>
         </a:defRPr>
       </a:lvl1pPr>
-      <a:lvl2pPr algn="l" defTabSz="914400" eaLnBrk="1" hangingPunct="1" latinLnBrk="0" marL="457200" rtl="0">
-        <a:defRPr kern="1200" sz="1800">
+      <a:lvl2pPr algn="l" defTabSz="342900" eaLnBrk="1" hangingPunct="1" latinLnBrk="0" marL="342900" rtl="0">
+        <a:defRPr kern="1200" sz="1350">
           <a:solidFill>
             <a:schemeClr val="tx1"/>
           </a:solidFill>
@@ -3257,8 +3021,8 @@
           <a:cs typeface="+mn-cs"/>
         </a:defRPr>
       </a:lvl2pPr>
-      <a:lvl3pPr algn="l" defTabSz="914400" eaLnBrk="1" hangingPunct="1" latinLnBrk="0" marL="914400" rtl="0">
-        <a:defRPr kern="1200" sz="1800">
+      <a:lvl3pPr algn="l" defTabSz="342900" eaLnBrk="1" hangingPunct="1" latinLnBrk="0" marL="685800" rtl="0">
+        <a:defRPr kern="1200" sz="1350">
           <a:solidFill>
             <a:schemeClr val="tx1"/>
           </a:solidFill>
@@ -3267,8 +3031,8 @@
           <a:cs typeface="+mn-cs"/>
         </a:defRPr>
       </a:lvl3pPr>
-      <a:lvl4pPr algn="l" defTabSz="914400" eaLnBrk="1" hangingPunct="1" latinLnBrk="0" marL="1371600" rtl="0">
-        <a:defRPr kern="1200" sz="1800">
+      <a:lvl4pPr algn="l" defTabSz="342900" eaLnBrk="1" hangingPunct="1" latinLnBrk="0" marL="1028700" rtl="0">
+        <a:defRPr kern="1200" sz="1350">
           <a:solidFill>
             <a:schemeClr val="tx1"/>
           </a:solidFill>
@@ -3277,8 +3041,8 @@
           <a:cs typeface="+mn-cs"/>
         </a:defRPr>
       </a:lvl4pPr>
-      <a:lvl5pPr algn="l" defTabSz="914400" eaLnBrk="1" hangingPunct="1" latinLnBrk="0" marL="1828800" rtl="0">
-        <a:defRPr kern="1200" sz="1800">
+      <a:lvl5pPr algn="l" defTabSz="342900" eaLnBrk="1" hangingPunct="1" latinLnBrk="0" marL="1371600" rtl="0">
+        <a:defRPr kern="1200" sz="1350">
           <a:solidFill>
             <a:schemeClr val="tx1"/>
           </a:solidFill>
@@ -3287,8 +3051,8 @@
           <a:cs typeface="+mn-cs"/>
         </a:defRPr>
       </a:lvl5pPr>
-      <a:lvl6pPr algn="l" defTabSz="914400" eaLnBrk="1" hangingPunct="1" latinLnBrk="0" marL="2286000" rtl="0">
-        <a:defRPr kern="1200" sz="1800">
+      <a:lvl6pPr algn="l" defTabSz="342900" eaLnBrk="1" hangingPunct="1" latinLnBrk="0" marL="1714500" rtl="0">
+        <a:defRPr kern="1200" sz="1350">
           <a:solidFill>
             <a:schemeClr val="tx1"/>
           </a:solidFill>
@@ -3297,8 +3061,8 @@
           <a:cs typeface="+mn-cs"/>
         </a:defRPr>
       </a:lvl6pPr>
-      <a:lvl7pPr algn="l" defTabSz="914400" eaLnBrk="1" hangingPunct="1" latinLnBrk="0" marL="2743200" rtl="0">
-        <a:defRPr kern="1200" sz="1800">
+      <a:lvl7pPr algn="l" defTabSz="342900" eaLnBrk="1" hangingPunct="1" latinLnBrk="0" marL="2057400" rtl="0">
+        <a:defRPr kern="1200" sz="1350">
           <a:solidFill>
             <a:schemeClr val="tx1"/>
           </a:solidFill>
@@ -3307,8 +3071,8 @@
           <a:cs typeface="+mn-cs"/>
         </a:defRPr>
       </a:lvl7pPr>
-      <a:lvl8pPr algn="l" defTabSz="914400" eaLnBrk="1" hangingPunct="1" latinLnBrk="0" marL="3200400" rtl="0">
-        <a:defRPr kern="1200" sz="1800">
+      <a:lvl8pPr algn="l" defTabSz="342900" eaLnBrk="1" hangingPunct="1" latinLnBrk="0" marL="2400300" rtl="0">
+        <a:defRPr kern="1200" sz="1350">
           <a:solidFill>
             <a:schemeClr val="tx1"/>
           </a:solidFill>
@@ -3317,8 +3081,8 @@
           <a:cs typeface="+mn-cs"/>
         </a:defRPr>
       </a:lvl8pPr>
-      <a:lvl9pPr algn="l" defTabSz="914400" eaLnBrk="1" hangingPunct="1" latinLnBrk="0" marL="3657600" rtl="0">
-        <a:defRPr kern="1200" sz="1800">
+      <a:lvl9pPr algn="l" defTabSz="342900" eaLnBrk="1" hangingPunct="1" latinLnBrk="0" marL="2743200" rtl="0">
+        <a:defRPr kern="1200" sz="1350">
           <a:solidFill>
             <a:schemeClr val="tx1"/>
           </a:solidFill>
@@ -3351,13 +3115,7 @@
       </p:grpSpPr>
       <p:sp>
         <p:nvSpPr>
-          <p:cNvPr id="2" name="Title 1">
-            <a:extLst>
-              <a:ext uri="{FF2B5EF4-FFF2-40B4-BE49-F238E27FC236}">
-                <a16:creationId xmlns:a16="http://schemas.microsoft.com/office/drawing/2014/main" id="{54A9766F-B35E-DD24-6EE8-5B4A00B11314}"/>
-              </a:ext>
-            </a:extLst>
-          </p:cNvPr>
+          <p:cNvPr id="2" name="Title 1"/>
           <p:cNvSpPr>
             <a:spLocks noGrp="1"/>
           </p:cNvSpPr>
@@ -3367,8 +3125,8 @@
         </p:nvSpPr>
         <p:spPr>
           <a:xfrm>
-            <a:off x="1524000" y="1122363"/>
-            <a:ext cx="9144000" cy="2387600"/>
+            <a:off x="685800" y="1597819"/>
+            <a:ext cx="7772400" cy="1102519"/>
           </a:xfrm>
         </p:spPr>
         <p:txBody>
@@ -3387,13 +3145,7 @@
       </p:sp>
       <p:sp>
         <p:nvSpPr>
-          <p:cNvPr id="3" name="Subtitle 2">
-            <a:extLst>
-              <a:ext uri="{FF2B5EF4-FFF2-40B4-BE49-F238E27FC236}">
-                <a16:creationId xmlns:a16="http://schemas.microsoft.com/office/drawing/2014/main" id="{AC3D4351-CC8D-D79B-1ED3-78F1614FAB0F}"/>
-              </a:ext>
-            </a:extLst>
-          </p:cNvPr>
+          <p:cNvPr id="3" name="Subtitle 2"/>
           <p:cNvSpPr>
             <a:spLocks noGrp="1"/>
           </p:cNvSpPr>
@@ -3403,8 +3155,8 @@
         </p:nvSpPr>
         <p:spPr>
           <a:xfrm>
-            <a:off x="1524000" y="3602038"/>
-            <a:ext cx="9144000" cy="1655762"/>
+            <a:off x="1371600" y="2914650"/>
+            <a:ext cx="6400800" cy="1314450"/>
           </a:xfrm>
         </p:spPr>
         <p:txBody>
@@ -3425,13 +3177,7 @@
       </p:sp>
       <p:sp>
         <p:nvSpPr>
-          <p:cNvPr id="4" name="Date Placeholder 3">
-            <a:extLst>
-              <a:ext uri="{FF2B5EF4-FFF2-40B4-BE49-F238E27FC236}">
-                <a16:creationId xmlns:a16="http://schemas.microsoft.com/office/drawing/2014/main" id="{A9F1E45F-B0E7-448F-0809-45CCE5CB7755}"/>
-              </a:ext>
-            </a:extLst>
-          </p:cNvPr>
+          <p:cNvPr id="4" name="Date Placeholder 3"/>
           <p:cNvSpPr>
             <a:spLocks noGrp="1"/>
           </p:cNvSpPr>
@@ -3478,13 +3224,7 @@
       </p:grpSpPr>
       <p:sp>
         <p:nvSpPr>
-          <p:cNvPr id="2" name="Title 1">
-            <a:extLst>
-              <a:ext uri="{FF2B5EF4-FFF2-40B4-BE49-F238E27FC236}">
-                <a16:creationId xmlns:a16="http://schemas.microsoft.com/office/drawing/2014/main" id="{80A0CCEB-5AA3-9405-44C4-629E4B8A8924}"/>
-              </a:ext>
-            </a:extLst>
-          </p:cNvPr>
+          <p:cNvPr id="2" name="Title 1"/>
           <p:cNvSpPr>
             <a:spLocks noGrp="1"/>
           </p:cNvSpPr>
@@ -3494,8 +3234,8 @@
         </p:nvSpPr>
         <p:spPr>
           <a:xfrm>
-            <a:off x="831850" y="1709738"/>
-            <a:ext cx="10515600" cy="2852737"/>
+            <a:off x="722313" y="3305176"/>
+            <a:ext cx="7772400" cy="1021556"/>
           </a:xfrm>
         </p:spPr>
         <p:txBody>
@@ -3536,13 +3276,7 @@
       </p:grpSpPr>
       <p:sp>
         <p:nvSpPr>
-          <p:cNvPr id="2" name="Title 1">
-            <a:extLst>
-              <a:ext uri="{FF2B5EF4-FFF2-40B4-BE49-F238E27FC236}">
-                <a16:creationId xmlns:a16="http://schemas.microsoft.com/office/drawing/2014/main" id="{7DE2BA23-27DE-9A84-D049-94BD2FDDFB12}"/>
-              </a:ext>
-            </a:extLst>
-          </p:cNvPr>
+          <p:cNvPr id="2" name="Title 1"/>
           <p:cNvSpPr>
             <a:spLocks noGrp="1"/>
           </p:cNvSpPr>
@@ -3567,13 +3301,7 @@
       </p:sp>
       <p:sp>
         <p:nvSpPr>
-          <p:cNvPr id="3" name="Content Placeholder 2">
-            <a:extLst>
-              <a:ext uri="{FF2B5EF4-FFF2-40B4-BE49-F238E27FC236}">
-                <a16:creationId xmlns:a16="http://schemas.microsoft.com/office/drawing/2014/main" id="{45969992-D875-2929-E350-487E7B6CD246}"/>
-              </a:ext>
-            </a:extLst>
-          </p:cNvPr>
+          <p:cNvPr id="3" name="Content Placeholder 2"/>
           <p:cNvSpPr>
             <a:spLocks noGrp="1"/>
           </p:cNvSpPr>
@@ -3666,13 +3394,7 @@
       </p:grpSpPr>
       <p:sp>
         <p:nvSpPr>
-          <p:cNvPr id="2" name="Title 1">
-            <a:extLst>
-              <a:ext uri="{FF2B5EF4-FFF2-40B4-BE49-F238E27FC236}">
-                <a16:creationId xmlns:a16="http://schemas.microsoft.com/office/drawing/2014/main" id="{7DE2BA23-27DE-9A84-D049-94BD2FDDFB12}"/>
-              </a:ext>
-            </a:extLst>
-          </p:cNvPr>
+          <p:cNvPr id="2" name="Title 1"/>
           <p:cNvSpPr>
             <a:spLocks noGrp="1"/>
           </p:cNvSpPr>
@@ -3697,13 +3419,7 @@
       </p:sp>
       <p:sp>
         <p:nvSpPr>
-          <p:cNvPr id="3" name="Content Placeholder 2">
-            <a:extLst>
-              <a:ext uri="{FF2B5EF4-FFF2-40B4-BE49-F238E27FC236}">
-                <a16:creationId xmlns:a16="http://schemas.microsoft.com/office/drawing/2014/main" id="{45969992-D875-2929-E350-487E7B6CD246}"/>
-              </a:ext>
-            </a:extLst>
-          </p:cNvPr>
+          <p:cNvPr id="3" name="Content Placeholder 2"/>
           <p:cNvSpPr>
             <a:spLocks noGrp="1"/>
           </p:cNvSpPr>
@@ -3766,13 +3482,7 @@
       </p:grpSpPr>
       <p:sp>
         <p:nvSpPr>
-          <p:cNvPr id="2" name="Title 1">
-            <a:extLst>
-              <a:ext uri="{FF2B5EF4-FFF2-40B4-BE49-F238E27FC236}">
-                <a16:creationId xmlns:a16="http://schemas.microsoft.com/office/drawing/2014/main" id="{7DE2BA23-27DE-9A84-D049-94BD2FDDFB12}"/>
-              </a:ext>
-            </a:extLst>
-          </p:cNvPr>
+          <p:cNvPr id="2" name="Title 1"/>
           <p:cNvSpPr>
             <a:spLocks noGrp="1"/>
           </p:cNvSpPr>
@@ -3797,13 +3507,7 @@
       </p:sp>
       <p:sp>
         <p:nvSpPr>
-          <p:cNvPr id="3" name="Content Placeholder 2">
-            <a:extLst>
-              <a:ext uri="{FF2B5EF4-FFF2-40B4-BE49-F238E27FC236}">
-                <a16:creationId xmlns:a16="http://schemas.microsoft.com/office/drawing/2014/main" id="{45969992-D875-2929-E350-487E7B6CD246}"/>
-              </a:ext>
-            </a:extLst>
-          </p:cNvPr>
+          <p:cNvPr id="3" name="Content Placeholder 2"/>
           <p:cNvSpPr>
             <a:spLocks noGrp="1"/>
           </p:cNvSpPr>
@@ -3862,13 +3566,7 @@
       </p:grpSpPr>
       <p:sp>
         <p:nvSpPr>
-          <p:cNvPr id="2" name="Title 1">
-            <a:extLst>
-              <a:ext uri="{FF2B5EF4-FFF2-40B4-BE49-F238E27FC236}">
-                <a16:creationId xmlns:a16="http://schemas.microsoft.com/office/drawing/2014/main" id="{7DE2BA23-27DE-9A84-D049-94BD2FDDFB12}"/>
-              </a:ext>
-            </a:extLst>
-          </p:cNvPr>
+          <p:cNvPr id="2" name="Title 1"/>
           <p:cNvSpPr>
             <a:spLocks noGrp="1"/>
           </p:cNvSpPr>
@@ -3893,13 +3591,7 @@
       </p:sp>
       <p:sp>
         <p:nvSpPr>
-          <p:cNvPr id="3" name="Content Placeholder 2">
-            <a:extLst>
-              <a:ext uri="{FF2B5EF4-FFF2-40B4-BE49-F238E27FC236}">
-                <a16:creationId xmlns:a16="http://schemas.microsoft.com/office/drawing/2014/main" id="{45969992-D875-2929-E350-487E7B6CD246}"/>
-              </a:ext>
-            </a:extLst>
-          </p:cNvPr>
+          <p:cNvPr id="3" name="Content Placeholder 2"/>
           <p:cNvSpPr>
             <a:spLocks noGrp="1"/>
           </p:cNvSpPr>
@@ -3978,13 +3670,7 @@
       </p:grpSpPr>
       <p:sp>
         <p:nvSpPr>
-          <p:cNvPr id="2" name="Title 1">
-            <a:extLst>
-              <a:ext uri="{FF2B5EF4-FFF2-40B4-BE49-F238E27FC236}">
-                <a16:creationId xmlns:a16="http://schemas.microsoft.com/office/drawing/2014/main" id="{7DE2BA23-27DE-9A84-D049-94BD2FDDFB12}"/>
-              </a:ext>
-            </a:extLst>
-          </p:cNvPr>
+          <p:cNvPr id="2" name="Title 1"/>
           <p:cNvSpPr>
             <a:spLocks noGrp="1"/>
           </p:cNvSpPr>
@@ -4009,13 +3695,7 @@
       </p:sp>
       <p:sp>
         <p:nvSpPr>
-          <p:cNvPr id="3" name="Content Placeholder 2">
-            <a:extLst>
-              <a:ext uri="{FF2B5EF4-FFF2-40B4-BE49-F238E27FC236}">
-                <a16:creationId xmlns:a16="http://schemas.microsoft.com/office/drawing/2014/main" id="{45969992-D875-2929-E350-487E7B6CD246}"/>
-              </a:ext>
-            </a:extLst>
-          </p:cNvPr>
+          <p:cNvPr id="3" name="Content Placeholder 2"/>
           <p:cNvSpPr>
             <a:spLocks noGrp="1"/>
           </p:cNvSpPr>
@@ -4073,13 +3753,7 @@
       </p:grpSpPr>
       <p:sp>
         <p:nvSpPr>
-          <p:cNvPr id="2" name="Title 1">
-            <a:extLst>
-              <a:ext uri="{FF2B5EF4-FFF2-40B4-BE49-F238E27FC236}">
-                <a16:creationId xmlns:a16="http://schemas.microsoft.com/office/drawing/2014/main" id="{7DE2BA23-27DE-9A84-D049-94BD2FDDFB12}"/>
-              </a:ext>
-            </a:extLst>
-          </p:cNvPr>
+          <p:cNvPr id="2" name="Title 1"/>
           <p:cNvSpPr>
             <a:spLocks noGrp="1"/>
           </p:cNvSpPr>
@@ -4104,13 +3778,7 @@
       </p:sp>
       <p:sp>
         <p:nvSpPr>
-          <p:cNvPr id="3" name="Content Placeholder 2">
-            <a:extLst>
-              <a:ext uri="{FF2B5EF4-FFF2-40B4-BE49-F238E27FC236}">
-                <a16:creationId xmlns:a16="http://schemas.microsoft.com/office/drawing/2014/main" id="{45969992-D875-2929-E350-487E7B6CD246}"/>
-              </a:ext>
-            </a:extLst>
-          </p:cNvPr>
+          <p:cNvPr id="3" name="Content Placeholder 2"/>
           <p:cNvSpPr>
             <a:spLocks noGrp="1"/>
           </p:cNvSpPr>
@@ -4169,13 +3837,7 @@
       </p:grpSpPr>
       <p:sp>
         <p:nvSpPr>
-          <p:cNvPr id="2" name="Title 1">
-            <a:extLst>
-              <a:ext uri="{FF2B5EF4-FFF2-40B4-BE49-F238E27FC236}">
-                <a16:creationId xmlns:a16="http://schemas.microsoft.com/office/drawing/2014/main" id="{7DE2BA23-27DE-9A84-D049-94BD2FDDFB12}"/>
-              </a:ext>
-            </a:extLst>
-          </p:cNvPr>
+          <p:cNvPr id="2" name="Title 1"/>
           <p:cNvSpPr>
             <a:spLocks noGrp="1"/>
           </p:cNvSpPr>
@@ -4200,13 +3862,7 @@
       </p:sp>
       <p:sp>
         <p:nvSpPr>
-          <p:cNvPr id="3" name="Content Placeholder 2">
-            <a:extLst>
-              <a:ext uri="{FF2B5EF4-FFF2-40B4-BE49-F238E27FC236}">
-                <a16:creationId xmlns:a16="http://schemas.microsoft.com/office/drawing/2014/main" id="{45969992-D875-2929-E350-487E7B6CD246}"/>
-              </a:ext>
-            </a:extLst>
-          </p:cNvPr>
+          <p:cNvPr id="3" name="Content Placeholder 2"/>
           <p:cNvSpPr>
             <a:spLocks noGrp="1"/>
           </p:cNvSpPr>
@@ -4291,13 +3947,7 @@
       </p:grpSpPr>
       <p:sp>
         <p:nvSpPr>
-          <p:cNvPr id="2" name="Title 1">
-            <a:extLst>
-              <a:ext uri="{FF2B5EF4-FFF2-40B4-BE49-F238E27FC236}">
-                <a16:creationId xmlns:a16="http://schemas.microsoft.com/office/drawing/2014/main" id="{80A0CCEB-5AA3-9405-44C4-629E4B8A8924}"/>
-              </a:ext>
-            </a:extLst>
-          </p:cNvPr>
+          <p:cNvPr id="2" name="Title 1"/>
           <p:cNvSpPr>
             <a:spLocks noGrp="1"/>
           </p:cNvSpPr>
@@ -4307,8 +3957,8 @@
         </p:nvSpPr>
         <p:spPr>
           <a:xfrm>
-            <a:off x="831850" y="1709738"/>
-            <a:ext cx="10515600" cy="2852737"/>
+            <a:off x="722313" y="3305176"/>
+            <a:ext cx="7772400" cy="1021556"/>
           </a:xfrm>
         </p:spPr>
         <p:txBody>
@@ -4349,13 +3999,7 @@
       </p:grpSpPr>
       <p:sp>
         <p:nvSpPr>
-          <p:cNvPr id="2" name="Title 1">
-            <a:extLst>
-              <a:ext uri="{FF2B5EF4-FFF2-40B4-BE49-F238E27FC236}">
-                <a16:creationId xmlns:a16="http://schemas.microsoft.com/office/drawing/2014/main" id="{7DE2BA23-27DE-9A84-D049-94BD2FDDFB12}"/>
-              </a:ext>
-            </a:extLst>
-          </p:cNvPr>
+          <p:cNvPr id="2" name="Title 1"/>
           <p:cNvSpPr>
             <a:spLocks noGrp="1"/>
           </p:cNvSpPr>
@@ -4380,13 +4024,7 @@
       </p:sp>
       <p:sp>
         <p:nvSpPr>
-          <p:cNvPr id="3" name="Content Placeholder 2">
-            <a:extLst>
-              <a:ext uri="{FF2B5EF4-FFF2-40B4-BE49-F238E27FC236}">
-                <a16:creationId xmlns:a16="http://schemas.microsoft.com/office/drawing/2014/main" id="{45969992-D875-2929-E350-487E7B6CD246}"/>
-              </a:ext>
-            </a:extLst>
-          </p:cNvPr>
+          <p:cNvPr id="3" name="Content Placeholder 2"/>
           <p:cNvSpPr>
             <a:spLocks noGrp="1"/>
           </p:cNvSpPr>
@@ -4451,13 +4089,7 @@
       </p:grpSpPr>
       <p:sp>
         <p:nvSpPr>
-          <p:cNvPr id="2" name="Title 1">
-            <a:extLst>
-              <a:ext uri="{FF2B5EF4-FFF2-40B4-BE49-F238E27FC236}">
-                <a16:creationId xmlns:a16="http://schemas.microsoft.com/office/drawing/2014/main" id="{80A0CCEB-5AA3-9405-44C4-629E4B8A8924}"/>
-              </a:ext>
-            </a:extLst>
-          </p:cNvPr>
+          <p:cNvPr id="2" name="Title 1"/>
           <p:cNvSpPr>
             <a:spLocks noGrp="1"/>
           </p:cNvSpPr>
@@ -4467,8 +4099,8 @@
         </p:nvSpPr>
         <p:spPr>
           <a:xfrm>
-            <a:off x="831850" y="1709738"/>
-            <a:ext cx="10515600" cy="2852737"/>
+            <a:off x="722313" y="3305176"/>
+            <a:ext cx="7772400" cy="1021556"/>
           </a:xfrm>
         </p:spPr>
         <p:txBody>
@@ -4509,13 +4141,7 @@
       </p:grpSpPr>
       <p:sp>
         <p:nvSpPr>
-          <p:cNvPr id="2" name="Title 1">
-            <a:extLst>
-              <a:ext uri="{FF2B5EF4-FFF2-40B4-BE49-F238E27FC236}">
-                <a16:creationId xmlns:a16="http://schemas.microsoft.com/office/drawing/2014/main" id="{7DE2BA23-27DE-9A84-D049-94BD2FDDFB12}"/>
-              </a:ext>
-            </a:extLst>
-          </p:cNvPr>
+          <p:cNvPr id="2" name="Title 1"/>
           <p:cNvSpPr>
             <a:spLocks noGrp="1"/>
           </p:cNvSpPr>
@@ -4540,13 +4166,7 @@
       </p:sp>
       <p:sp>
         <p:nvSpPr>
-          <p:cNvPr id="3" name="Content Placeholder 2">
-            <a:extLst>
-              <a:ext uri="{FF2B5EF4-FFF2-40B4-BE49-F238E27FC236}">
-                <a16:creationId xmlns:a16="http://schemas.microsoft.com/office/drawing/2014/main" id="{45969992-D875-2929-E350-487E7B6CD246}"/>
-              </a:ext>
-            </a:extLst>
-          </p:cNvPr>
+          <p:cNvPr id="3" name="Content Placeholder 2"/>
           <p:cNvSpPr>
             <a:spLocks noGrp="1"/>
           </p:cNvSpPr>
@@ -4625,13 +4245,7 @@
       </p:grpSpPr>
       <p:sp>
         <p:nvSpPr>
-          <p:cNvPr id="2" name="Title 1">
-            <a:extLst>
-              <a:ext uri="{FF2B5EF4-FFF2-40B4-BE49-F238E27FC236}">
-                <a16:creationId xmlns:a16="http://schemas.microsoft.com/office/drawing/2014/main" id="{7DE2BA23-27DE-9A84-D049-94BD2FDDFB12}"/>
-              </a:ext>
-            </a:extLst>
-          </p:cNvPr>
+          <p:cNvPr id="2" name="Title 1"/>
           <p:cNvSpPr>
             <a:spLocks noGrp="1"/>
           </p:cNvSpPr>
@@ -4656,13 +4270,7 @@
       </p:sp>
       <p:sp>
         <p:nvSpPr>
-          <p:cNvPr id="3" name="Content Placeholder 2">
-            <a:extLst>
-              <a:ext uri="{FF2B5EF4-FFF2-40B4-BE49-F238E27FC236}">
-                <a16:creationId xmlns:a16="http://schemas.microsoft.com/office/drawing/2014/main" id="{45969992-D875-2929-E350-487E7B6CD246}"/>
-              </a:ext>
-            </a:extLst>
-          </p:cNvPr>
+          <p:cNvPr id="3" name="Content Placeholder 2"/>
           <p:cNvSpPr>
             <a:spLocks noGrp="1"/>
           </p:cNvSpPr>
@@ -4734,13 +4342,7 @@
       </p:grpSpPr>
       <p:sp>
         <p:nvSpPr>
-          <p:cNvPr id="2" name="Title 1">
-            <a:extLst>
-              <a:ext uri="{FF2B5EF4-FFF2-40B4-BE49-F238E27FC236}">
-                <a16:creationId xmlns:a16="http://schemas.microsoft.com/office/drawing/2014/main" id="{7DE2BA23-27DE-9A84-D049-94BD2FDDFB12}"/>
-              </a:ext>
-            </a:extLst>
-          </p:cNvPr>
+          <p:cNvPr id="2" name="Title 1"/>
           <p:cNvSpPr>
             <a:spLocks noGrp="1"/>
           </p:cNvSpPr>
@@ -4765,13 +4367,7 @@
       </p:sp>
       <p:sp>
         <p:nvSpPr>
-          <p:cNvPr id="3" name="Content Placeholder 2">
-            <a:extLst>
-              <a:ext uri="{FF2B5EF4-FFF2-40B4-BE49-F238E27FC236}">
-                <a16:creationId xmlns:a16="http://schemas.microsoft.com/office/drawing/2014/main" id="{45969992-D875-2929-E350-487E7B6CD246}"/>
-              </a:ext>
-            </a:extLst>
-          </p:cNvPr>
+          <p:cNvPr id="3" name="Content Placeholder 2"/>
           <p:cNvSpPr>
             <a:spLocks noGrp="1"/>
           </p:cNvSpPr>
@@ -4871,13 +4467,7 @@
       </p:grpSpPr>
       <p:sp>
         <p:nvSpPr>
-          <p:cNvPr id="2" name="Title 1">
-            <a:extLst>
-              <a:ext uri="{FF2B5EF4-FFF2-40B4-BE49-F238E27FC236}">
-                <a16:creationId xmlns:a16="http://schemas.microsoft.com/office/drawing/2014/main" id="{7DE2BA23-27DE-9A84-D049-94BD2FDDFB12}"/>
-              </a:ext>
-            </a:extLst>
-          </p:cNvPr>
+          <p:cNvPr id="2" name="Title 1"/>
           <p:cNvSpPr>
             <a:spLocks noGrp="1"/>
           </p:cNvSpPr>
@@ -4902,13 +4492,7 @@
       </p:sp>
       <p:sp>
         <p:nvSpPr>
-          <p:cNvPr id="3" name="Content Placeholder 2">
-            <a:extLst>
-              <a:ext uri="{FF2B5EF4-FFF2-40B4-BE49-F238E27FC236}">
-                <a16:creationId xmlns:a16="http://schemas.microsoft.com/office/drawing/2014/main" id="{45969992-D875-2929-E350-487E7B6CD246}"/>
-              </a:ext>
-            </a:extLst>
-          </p:cNvPr>
+          <p:cNvPr id="3" name="Content Placeholder 2"/>
           <p:cNvSpPr>
             <a:spLocks noGrp="1"/>
           </p:cNvSpPr>
@@ -4974,13 +4558,7 @@
       </p:grpSpPr>
       <p:sp>
         <p:nvSpPr>
-          <p:cNvPr id="2" name="Title 1">
-            <a:extLst>
-              <a:ext uri="{FF2B5EF4-FFF2-40B4-BE49-F238E27FC236}">
-                <a16:creationId xmlns:a16="http://schemas.microsoft.com/office/drawing/2014/main" id="{7DE2BA23-27DE-9A84-D049-94BD2FDDFB12}"/>
-              </a:ext>
-            </a:extLst>
-          </p:cNvPr>
+          <p:cNvPr id="2" name="Title 1"/>
           <p:cNvSpPr>
             <a:spLocks noGrp="1"/>
           </p:cNvSpPr>
@@ -5005,13 +4583,7 @@
       </p:sp>
       <p:sp>
         <p:nvSpPr>
-          <p:cNvPr id="3" name="Content Placeholder 2">
-            <a:extLst>
-              <a:ext uri="{FF2B5EF4-FFF2-40B4-BE49-F238E27FC236}">
-                <a16:creationId xmlns:a16="http://schemas.microsoft.com/office/drawing/2014/main" id="{45969992-D875-2929-E350-487E7B6CD246}"/>
-              </a:ext>
-            </a:extLst>
-          </p:cNvPr>
+          <p:cNvPr id="3" name="Content Placeholder 2"/>
           <p:cNvSpPr>
             <a:spLocks noGrp="1"/>
           </p:cNvSpPr>
@@ -5093,13 +4665,7 @@
       </p:grpSpPr>
       <p:sp>
         <p:nvSpPr>
-          <p:cNvPr id="2" name="Title 1">
-            <a:extLst>
-              <a:ext uri="{FF2B5EF4-FFF2-40B4-BE49-F238E27FC236}">
-                <a16:creationId xmlns:a16="http://schemas.microsoft.com/office/drawing/2014/main" id="{7DE2BA23-27DE-9A84-D049-94BD2FDDFB12}"/>
-              </a:ext>
-            </a:extLst>
-          </p:cNvPr>
+          <p:cNvPr id="2" name="Title 1"/>
           <p:cNvSpPr>
             <a:spLocks noGrp="1"/>
           </p:cNvSpPr>
@@ -5124,13 +4690,7 @@
       </p:sp>
       <p:sp>
         <p:nvSpPr>
-          <p:cNvPr id="3" name="Content Placeholder 2">
-            <a:extLst>
-              <a:ext uri="{FF2B5EF4-FFF2-40B4-BE49-F238E27FC236}">
-                <a16:creationId xmlns:a16="http://schemas.microsoft.com/office/drawing/2014/main" id="{45969992-D875-2929-E350-487E7B6CD246}"/>
-              </a:ext>
-            </a:extLst>
-          </p:cNvPr>
+          <p:cNvPr id="3" name="Content Placeholder 2"/>
           <p:cNvSpPr>
             <a:spLocks noGrp="1"/>
           </p:cNvSpPr>
@@ -5189,13 +4749,7 @@
       </p:grpSpPr>
       <p:sp>
         <p:nvSpPr>
-          <p:cNvPr id="2" name="Title 1">
-            <a:extLst>
-              <a:ext uri="{FF2B5EF4-FFF2-40B4-BE49-F238E27FC236}">
-                <a16:creationId xmlns:a16="http://schemas.microsoft.com/office/drawing/2014/main" id="{7DE2BA23-27DE-9A84-D049-94BD2FDDFB12}"/>
-              </a:ext>
-            </a:extLst>
-          </p:cNvPr>
+          <p:cNvPr id="2" name="Title 1"/>
           <p:cNvSpPr>
             <a:spLocks noGrp="1"/>
           </p:cNvSpPr>
@@ -5220,13 +4774,7 @@
       </p:sp>
       <p:sp>
         <p:nvSpPr>
-          <p:cNvPr id="3" name="Content Placeholder 2">
-            <a:extLst>
-              <a:ext uri="{FF2B5EF4-FFF2-40B4-BE49-F238E27FC236}">
-                <a16:creationId xmlns:a16="http://schemas.microsoft.com/office/drawing/2014/main" id="{45969992-D875-2929-E350-487E7B6CD246}"/>
-              </a:ext>
-            </a:extLst>
-          </p:cNvPr>
+          <p:cNvPr id="3" name="Content Placeholder 2"/>
           <p:cNvSpPr>
             <a:spLocks noGrp="1"/>
           </p:cNvSpPr>
@@ -5273,13 +4821,7 @@
       </p:grpSpPr>
       <p:sp>
         <p:nvSpPr>
-          <p:cNvPr id="2" name="Title 1">
-            <a:extLst>
-              <a:ext uri="{FF2B5EF4-FFF2-40B4-BE49-F238E27FC236}">
-                <a16:creationId xmlns:a16="http://schemas.microsoft.com/office/drawing/2014/main" id="{7DE2BA23-27DE-9A84-D049-94BD2FDDFB12}"/>
-              </a:ext>
-            </a:extLst>
-          </p:cNvPr>
+          <p:cNvPr id="2" name="Title 1"/>
           <p:cNvSpPr>
             <a:spLocks noGrp="1"/>
           </p:cNvSpPr>
@@ -5318,8 +4860,8 @@
         </p:blipFill>
         <p:spPr bwMode="auto">
           <a:xfrm>
-            <a:off x="1143000" y="1816100"/>
-            <a:ext cx="9893300" cy="3835400"/>
+            <a:off x="850900" y="1193800"/>
+            <a:ext cx="7442200" cy="2882900"/>
           </a:xfrm>
           <a:prstGeom prst="rect">
             <a:avLst/>
@@ -5340,8 +4882,8 @@
         </p:nvSpPr>
         <p:spPr>
           <a:xfrm>
-            <a:off x="838200" y="5651500"/>
-            <a:ext cx="10515600" cy="508000"/>
+            <a:off x="457200" y="4076700"/>
+            <a:ext cx="8229600" cy="508000"/>
           </a:xfrm>
           <a:prstGeom prst="rect">
             <a:avLst/>
@@ -5386,13 +4928,7 @@
       </p:grpSpPr>
       <p:sp>
         <p:nvSpPr>
-          <p:cNvPr id="2" name="Title 1">
-            <a:extLst>
-              <a:ext uri="{FF2B5EF4-FFF2-40B4-BE49-F238E27FC236}">
-                <a16:creationId xmlns:a16="http://schemas.microsoft.com/office/drawing/2014/main" id="{7DE2BA23-27DE-9A84-D049-94BD2FDDFB12}"/>
-              </a:ext>
-            </a:extLst>
-          </p:cNvPr>
+          <p:cNvPr id="2" name="Title 1"/>
           <p:cNvSpPr>
             <a:spLocks noGrp="1"/>
           </p:cNvSpPr>
@@ -5431,8 +4967,8 @@
         </p:blipFill>
         <p:spPr bwMode="auto">
           <a:xfrm>
-            <a:off x="1066800" y="1816100"/>
-            <a:ext cx="10058400" cy="3835400"/>
+            <a:off x="787400" y="1193800"/>
+            <a:ext cx="7556500" cy="2882900"/>
           </a:xfrm>
           <a:prstGeom prst="rect">
             <a:avLst/>
@@ -5453,8 +4989,8 @@
         </p:nvSpPr>
         <p:spPr>
           <a:xfrm>
-            <a:off x="838200" y="5651500"/>
-            <a:ext cx="10515600" cy="508000"/>
+            <a:off x="457200" y="4076700"/>
+            <a:ext cx="8229600" cy="508000"/>
           </a:xfrm>
           <a:prstGeom prst="rect">
             <a:avLst/>
@@ -5499,13 +5035,7 @@
       </p:grpSpPr>
       <p:sp>
         <p:nvSpPr>
-          <p:cNvPr id="2" name="Title 1">
-            <a:extLst>
-              <a:ext uri="{FF2B5EF4-FFF2-40B4-BE49-F238E27FC236}">
-                <a16:creationId xmlns:a16="http://schemas.microsoft.com/office/drawing/2014/main" id="{7DE2BA23-27DE-9A84-D049-94BD2FDDFB12}"/>
-              </a:ext>
-            </a:extLst>
-          </p:cNvPr>
+          <p:cNvPr id="2" name="Title 1"/>
           <p:cNvSpPr>
             <a:spLocks noGrp="1"/>
           </p:cNvSpPr>
@@ -5530,13 +5060,7 @@
       </p:sp>
       <p:sp>
         <p:nvSpPr>
-          <p:cNvPr id="3" name="Content Placeholder 2">
-            <a:extLst>
-              <a:ext uri="{FF2B5EF4-FFF2-40B4-BE49-F238E27FC236}">
-                <a16:creationId xmlns:a16="http://schemas.microsoft.com/office/drawing/2014/main" id="{45969992-D875-2929-E350-487E7B6CD246}"/>
-              </a:ext>
-            </a:extLst>
-          </p:cNvPr>
+          <p:cNvPr id="3" name="Content Placeholder 2"/>
           <p:cNvSpPr>
             <a:spLocks noGrp="1"/>
           </p:cNvSpPr>
@@ -5595,13 +5119,7 @@
       </p:grpSpPr>
       <p:sp>
         <p:nvSpPr>
-          <p:cNvPr id="2" name="Title 1">
-            <a:extLst>
-              <a:ext uri="{FF2B5EF4-FFF2-40B4-BE49-F238E27FC236}">
-                <a16:creationId xmlns:a16="http://schemas.microsoft.com/office/drawing/2014/main" id="{80A0CCEB-5AA3-9405-44C4-629E4B8A8924}"/>
-              </a:ext>
-            </a:extLst>
-          </p:cNvPr>
+          <p:cNvPr id="2" name="Title 1"/>
           <p:cNvSpPr>
             <a:spLocks noGrp="1"/>
           </p:cNvSpPr>
@@ -5611,8 +5129,8 @@
         </p:nvSpPr>
         <p:spPr>
           <a:xfrm>
-            <a:off x="831850" y="1709738"/>
-            <a:ext cx="10515600" cy="2852737"/>
+            <a:off x="722313" y="3305176"/>
+            <a:ext cx="7772400" cy="1021556"/>
           </a:xfrm>
         </p:spPr>
         <p:txBody>
@@ -5653,13 +5171,7 @@
       </p:grpSpPr>
       <p:sp>
         <p:nvSpPr>
-          <p:cNvPr id="2" name="Title 1">
-            <a:extLst>
-              <a:ext uri="{FF2B5EF4-FFF2-40B4-BE49-F238E27FC236}">
-                <a16:creationId xmlns:a16="http://schemas.microsoft.com/office/drawing/2014/main" id="{7DE2BA23-27DE-9A84-D049-94BD2FDDFB12}"/>
-              </a:ext>
-            </a:extLst>
-          </p:cNvPr>
+          <p:cNvPr id="2" name="Title 1"/>
           <p:cNvSpPr>
             <a:spLocks noGrp="1"/>
           </p:cNvSpPr>
@@ -5684,13 +5196,7 @@
       </p:sp>
       <p:sp>
         <p:nvSpPr>
-          <p:cNvPr id="3" name="Content Placeholder 2">
-            <a:extLst>
-              <a:ext uri="{FF2B5EF4-FFF2-40B4-BE49-F238E27FC236}">
-                <a16:creationId xmlns:a16="http://schemas.microsoft.com/office/drawing/2014/main" id="{45969992-D875-2929-E350-487E7B6CD246}"/>
-              </a:ext>
-            </a:extLst>
-          </p:cNvPr>
+          <p:cNvPr id="3" name="Content Placeholder 2"/>
           <p:cNvSpPr>
             <a:spLocks noGrp="1"/>
           </p:cNvSpPr>
@@ -5729,44 +5235,44 @@
         <a:sysClr val="window" lastClr="FFFFFF"/>
       </a:lt1>
       <a:dk2>
-        <a:srgbClr val="44546A"/>
+        <a:srgbClr val="1F497D"/>
       </a:dk2>
       <a:lt2>
-        <a:srgbClr val="E7E6E6"/>
+        <a:srgbClr val="EEECE1"/>
       </a:lt2>
       <a:accent1>
-        <a:srgbClr val="4472C4"/>
+        <a:srgbClr val="4F81BD"/>
       </a:accent1>
       <a:accent2>
-        <a:srgbClr val="ED7D31"/>
+        <a:srgbClr val="C0504D"/>
       </a:accent2>
       <a:accent3>
-        <a:srgbClr val="A5A5A5"/>
+        <a:srgbClr val="9BBB59"/>
       </a:accent3>
       <a:accent4>
-        <a:srgbClr val="FFC000"/>
+        <a:srgbClr val="8064A2"/>
       </a:accent4>
       <a:accent5>
-        <a:srgbClr val="5B9BD5"/>
+        <a:srgbClr val="4BACC6"/>
       </a:accent5>
       <a:accent6>
-        <a:srgbClr val="70AD47"/>
+        <a:srgbClr val="F79646"/>
       </a:accent6>
       <a:hlink>
-        <a:srgbClr val="0563C1"/>
+        <a:srgbClr val="0000FF"/>
       </a:hlink>
       <a:folHlink>
-        <a:srgbClr val="954F72"/>
+        <a:srgbClr val="800080"/>
       </a:folHlink>
     </a:clrScheme>
     <a:fontScheme name="Office">
       <a:majorFont>
-        <a:latin typeface="Calibri Light" panose="020F0302020204030204"/>
+        <a:latin typeface="Calibri"/>
         <a:ea typeface=""/>
         <a:cs typeface=""/>
-        <a:font script="Jpan" typeface="游ゴシック Light"/>
+        <a:font script="Jpan" typeface="ＭＳ Ｐゴシック"/>
         <a:font script="Hang" typeface="맑은 고딕"/>
-        <a:font script="Hans" typeface="等线 Light"/>
+        <a:font script="Hans" typeface="宋体"/>
         <a:font script="Hant" typeface="新細明體"/>
         <a:font script="Arab" typeface="Times New Roman"/>
         <a:font script="Hebr" typeface="Times New Roman"/>
@@ -5794,31 +5300,14 @@
         <a:font script="Viet" typeface="Times New Roman"/>
         <a:font script="Uigh" typeface="Microsoft Uighur"/>
         <a:font script="Geor" typeface="Sylfaen"/>
-        <a:font script="Armn" typeface="Arial"/>
-        <a:font script="Bugi" typeface="Leelawadee UI"/>
-        <a:font script="Bopo" typeface="Microsoft JhengHei"/>
-        <a:font script="Java" typeface="Javanese Text"/>
-        <a:font script="Lisu" typeface="Segoe UI"/>
-        <a:font script="Mymr" typeface="Myanmar Text"/>
-        <a:font script="Nkoo" typeface="Ebrima"/>
-        <a:font script="Olck" typeface="Nirmala UI"/>
-        <a:font script="Osma" typeface="Ebrima"/>
-        <a:font script="Phag" typeface="Phagspa"/>
-        <a:font script="Syrn" typeface="Estrangelo Edessa"/>
-        <a:font script="Syrj" typeface="Estrangelo Edessa"/>
-        <a:font script="Syre" typeface="Estrangelo Edessa"/>
-        <a:font script="Sora" typeface="Nirmala UI"/>
-        <a:font script="Tale" typeface="Microsoft Tai Le"/>
-        <a:font script="Talu" typeface="Microsoft New Tai Lue"/>
-        <a:font script="Tfng" typeface="Ebrima"/>
       </a:majorFont>
       <a:minorFont>
-        <a:latin typeface="Calibri" panose="020F0502020204030204"/>
+        <a:latin typeface="Calibri"/>
         <a:ea typeface=""/>
         <a:cs typeface=""/>
-        <a:font script="Jpan" typeface="游ゴシック"/>
+        <a:font script="Jpan" typeface="ＭＳ Ｐゴシック"/>
         <a:font script="Hang" typeface="맑은 고딕"/>
-        <a:font script="Hans" typeface="等线"/>
+        <a:font script="Hans" typeface="宋体"/>
         <a:font script="Hant" typeface="新細明體"/>
         <a:font script="Arab" typeface="Arial"/>
         <a:font script="Hebr" typeface="Arial"/>
@@ -5846,23 +5335,6 @@
         <a:font script="Viet" typeface="Arial"/>
         <a:font script="Uigh" typeface="Microsoft Uighur"/>
         <a:font script="Geor" typeface="Sylfaen"/>
-        <a:font script="Armn" typeface="Arial"/>
-        <a:font script="Bugi" typeface="Leelawadee UI"/>
-        <a:font script="Bopo" typeface="Microsoft JhengHei"/>
-        <a:font script="Java" typeface="Javanese Text"/>
-        <a:font script="Lisu" typeface="Segoe UI"/>
-        <a:font script="Mymr" typeface="Myanmar Text"/>
-        <a:font script="Nkoo" typeface="Ebrima"/>
-        <a:font script="Olck" typeface="Nirmala UI"/>
-        <a:font script="Osma" typeface="Ebrima"/>
-        <a:font script="Phag" typeface="Phagspa"/>
-        <a:font script="Syrn" typeface="Estrangelo Edessa"/>
-        <a:font script="Syrj" typeface="Estrangelo Edessa"/>
-        <a:font script="Syre" typeface="Estrangelo Edessa"/>
-        <a:font script="Sora" typeface="Nirmala UI"/>
-        <a:font script="Tale" typeface="Microsoft Tai Le"/>
-        <a:font script="Talu" typeface="Microsoft New Tai Lue"/>
-        <a:font script="Tfng" typeface="Ebrima"/>
       </a:minorFont>
     </a:fontScheme>
     <a:fmtScheme name="Office">
@@ -5874,142 +5346,201 @@
           <a:gsLst>
             <a:gs pos="0">
               <a:schemeClr val="phClr">
-                <a:lumMod val="110000"/>
-                <a:satMod val="105000"/>
-                <a:tint val="67000"/>
+                <a:tint val="50000"/>
+                <a:satMod val="300000"/>
               </a:schemeClr>
             </a:gs>
-            <a:gs pos="50000">
+            <a:gs pos="35000">
               <a:schemeClr val="phClr">
-                <a:lumMod val="105000"/>
-                <a:satMod val="103000"/>
-                <a:tint val="73000"/>
+                <a:tint val="37000"/>
+                <a:satMod val="300000"/>
               </a:schemeClr>
             </a:gs>
             <a:gs pos="100000">
               <a:schemeClr val="phClr">
-                <a:lumMod val="105000"/>
-                <a:satMod val="109000"/>
-                <a:tint val="81000"/>
+                <a:tint val="15000"/>
+                <a:satMod val="350000"/>
               </a:schemeClr>
             </a:gs>
           </a:gsLst>
-          <a:lin ang="5400000" scaled="0"/>
+          <a:lin ang="16200000" scaled="1"/>
         </a:gradFill>
         <a:gradFill rotWithShape="1">
           <a:gsLst>
             <a:gs pos="0">
               <a:schemeClr val="phClr">
-                <a:satMod val="103000"/>
-                <a:lumMod val="102000"/>
-                <a:tint val="94000"/>
-              </a:schemeClr>
-            </a:gs>
-            <a:gs pos="50000">
-              <a:schemeClr val="phClr">
-                <a:satMod val="110000"/>
-                <a:lumMod val="100000"/>
+                <a:tint val="100000"/>
                 <a:shade val="100000"/>
+                <a:satMod val="130000"/>
               </a:schemeClr>
             </a:gs>
             <a:gs pos="100000">
               <a:schemeClr val="phClr">
-                <a:lumMod val="99000"/>
-                <a:satMod val="120000"/>
-                <a:shade val="78000"/>
+                <a:tint val="50000"/>
+                <a:shade val="100000"/>
+                <a:satMod val="350000"/>
               </a:schemeClr>
             </a:gs>
           </a:gsLst>
-          <a:lin ang="5400000" scaled="0"/>
+          <a:lin ang="16200000" scaled="0"/>
         </a:gradFill>
       </a:fillStyleLst>
       <a:lnStyleLst>
-        <a:ln w="6350" cap="flat" cmpd="sng" algn="ctr">
+        <a:ln w="9525" cap="flat" cmpd="sng" algn="ctr">
+          <a:solidFill>
+            <a:schemeClr val="phClr">
+              <a:shade val="95000"/>
+              <a:satMod val="105000"/>
+            </a:schemeClr>
+          </a:solidFill>
+          <a:prstDash val="solid"/>
+        </a:ln>
+        <a:ln w="25400" cap="flat" cmpd="sng" algn="ctr">
           <a:solidFill>
             <a:schemeClr val="phClr"/>
           </a:solidFill>
           <a:prstDash val="solid"/>
-          <a:miter lim="800000"/>
         </a:ln>
-        <a:ln w="12700" cap="flat" cmpd="sng" algn="ctr">
+        <a:ln w="38100" cap="flat" cmpd="sng" algn="ctr">
           <a:solidFill>
             <a:schemeClr val="phClr"/>
           </a:solidFill>
           <a:prstDash val="solid"/>
-          <a:miter lim="800000"/>
-        </a:ln>
-        <a:ln w="19050" cap="flat" cmpd="sng" algn="ctr">
-          <a:solidFill>
-            <a:schemeClr val="phClr"/>
-          </a:solidFill>
-          <a:prstDash val="solid"/>
-          <a:miter lim="800000"/>
         </a:ln>
       </a:lnStyleLst>
       <a:effectStyleLst>
         <a:effectStyle>
-          <a:effectLst/>
-        </a:effectStyle>
-        <a:effectStyle>
-          <a:effectLst/>
+          <a:effectLst>
+            <a:outerShdw blurRad="40000" dist="20000" dir="5400000" rotWithShape="0">
+              <a:srgbClr val="000000">
+                <a:alpha val="38000"/>
+              </a:srgbClr>
+            </a:outerShdw>
+          </a:effectLst>
         </a:effectStyle>
         <a:effectStyle>
           <a:effectLst>
-            <a:outerShdw blurRad="57150" dist="19050" dir="5400000" algn="ctr" rotWithShape="0">
+            <a:outerShdw blurRad="40000" dist="23000" dir="5400000" rotWithShape="0">
               <a:srgbClr val="000000">
-                <a:alpha val="63000"/>
+                <a:alpha val="35000"/>
               </a:srgbClr>
             </a:outerShdw>
           </a:effectLst>
+        </a:effectStyle>
+        <a:effectStyle>
+          <a:effectLst>
+            <a:outerShdw blurRad="40000" dist="23000" dir="5400000" rotWithShape="0">
+              <a:srgbClr val="000000">
+                <a:alpha val="35000"/>
+              </a:srgbClr>
+            </a:outerShdw>
+          </a:effectLst>
+          <a:scene3d>
+            <a:camera prst="orthographicFront">
+              <a:rot lat="0" lon="0" rev="0"/>
+            </a:camera>
+            <a:lightRig rig="threePt" dir="t">
+              <a:rot lat="0" lon="0" rev="1200000"/>
+            </a:lightRig>
+          </a:scene3d>
+          <a:sp3d>
+            <a:bevelT w="63500" h="25400"/>
+          </a:sp3d>
         </a:effectStyle>
       </a:effectStyleLst>
       <a:bgFillStyleLst>
         <a:solidFill>
           <a:schemeClr val="phClr"/>
         </a:solidFill>
-        <a:solidFill>
-          <a:schemeClr val="phClr">
-            <a:tint val="95000"/>
-            <a:satMod val="170000"/>
-          </a:schemeClr>
-        </a:solidFill>
         <a:gradFill rotWithShape="1">
           <a:gsLst>
             <a:gs pos="0">
               <a:schemeClr val="phClr">
-                <a:tint val="93000"/>
-                <a:satMod val="150000"/>
-                <a:shade val="98000"/>
-                <a:lumMod val="102000"/>
+                <a:tint val="40000"/>
+                <a:satMod val="350000"/>
               </a:schemeClr>
             </a:gs>
-            <a:gs pos="50000">
+            <a:gs pos="40000">
               <a:schemeClr val="phClr">
-                <a:tint val="98000"/>
-                <a:satMod val="130000"/>
-                <a:shade val="90000"/>
-                <a:lumMod val="103000"/>
+                <a:tint val="45000"/>
+                <a:shade val="99000"/>
+                <a:satMod val="350000"/>
               </a:schemeClr>
             </a:gs>
             <a:gs pos="100000">
               <a:schemeClr val="phClr">
-                <a:shade val="63000"/>
-                <a:satMod val="120000"/>
+                <a:shade val="20000"/>
+                <a:satMod val="255000"/>
               </a:schemeClr>
             </a:gs>
           </a:gsLst>
-          <a:lin ang="5400000" scaled="0"/>
+          <a:path path="circle">
+            <a:fillToRect l="50000" t="-80000" r="50000" b="180000"/>
+          </a:path>
+        </a:gradFill>
+        <a:gradFill rotWithShape="1">
+          <a:gsLst>
+            <a:gs pos="0">
+              <a:schemeClr val="phClr">
+                <a:tint val="80000"/>
+                <a:satMod val="300000"/>
+              </a:schemeClr>
+            </a:gs>
+            <a:gs pos="100000">
+              <a:schemeClr val="phClr">
+                <a:shade val="30000"/>
+                <a:satMod val="200000"/>
+              </a:schemeClr>
+            </a:gs>
+          </a:gsLst>
+          <a:path path="circle">
+            <a:fillToRect l="50000" t="50000" r="50000" b="50000"/>
+          </a:path>
         </a:gradFill>
       </a:bgFillStyleLst>
     </a:fmtScheme>
   </a:themeElements>
-  <a:objectDefaults/>
+  <a:objectDefaults>
+    <a:spDef>
+      <a:spPr/>
+      <a:bodyPr/>
+      <a:lstStyle/>
+      <a:style>
+        <a:lnRef idx="1">
+          <a:schemeClr val="accent1"/>
+        </a:lnRef>
+        <a:fillRef idx="3">
+          <a:schemeClr val="accent1"/>
+        </a:fillRef>
+        <a:effectRef idx="2">
+          <a:schemeClr val="accent1"/>
+        </a:effectRef>
+        <a:fontRef idx="minor">
+          <a:schemeClr val="lt1"/>
+        </a:fontRef>
+      </a:style>
+    </a:spDef>
+    <a:lnDef>
+      <a:spPr/>
+      <a:bodyPr/>
+      <a:lstStyle/>
+      <a:style>
+        <a:lnRef idx="2">
+          <a:schemeClr val="accent1"/>
+        </a:lnRef>
+        <a:fillRef idx="0">
+          <a:schemeClr val="accent1"/>
+        </a:fillRef>
+        <a:effectRef idx="1">
+          <a:schemeClr val="accent1"/>
+        </a:effectRef>
+        <a:fontRef idx="minor">
+          <a:schemeClr val="tx1"/>
+        </a:fontRef>
+      </a:style>
+    </a:lnDef>
+  </a:objectDefaults>
   <a:extraClrSchemeLst/>
-  <a:extLst>
-    <a:ext uri="{05A4C25C-085E-4340-85A3-A5531E510DB2}">
-      <thm15:themeFamily xmlns:thm15="http://schemas.microsoft.com/office/thememl/2012/main" name="Office Theme" id="{62F939B6-93AF-4DB8-9C6B-D6C7DFDC589F}" vid="{4A3C46E8-61CC-4603-A589-7422A47A8E4A}"/>
-    </a:ext>
-  </a:extLst>
 </a:theme>
 </file>
 

</xml_diff>